<commit_message>
corrected mistakes in intro, started objects
</commit_message>
<xml_diff>
--- a/Intro/Wprowadzenie.pptx
+++ b/Intro/Wprowadzenie.pptx
@@ -10110,6 +10110,55 @@
           </a:prstGeom>
         </p:spPr>
       </p:pic>
+      <p:sp>
+        <p:nvSpPr>
+          <p:cNvPr id="1224624000" name=""/>
+          <p:cNvSpPr txBox="1"/>
+          <p:nvPr/>
+        </p:nvSpPr>
+        <p:spPr bwMode="auto">
+          <a:xfrm flipH="0" flipV="0">
+            <a:off x="9766383" y="5881456"/>
+            <a:ext cx="2118413" cy="640440"/>
+          </a:xfrm>
+          <a:prstGeom prst="rect">
+            <a:avLst/>
+          </a:prstGeom>
+          <a:noFill/>
+        </p:spPr>
+        <p:txBody>
+          <a:bodyPr vertOverflow="overflow" horzOverflow="overflow" vert="horz" wrap="square" lIns="91440" tIns="45720" rIns="91440" bIns="45720" numCol="1" spcCol="0" rtlCol="0" fromWordArt="0" anchor="t" anchorCtr="0" forceAA="0" upright="0" compatLnSpc="0">
+            <a:spAutoFit/>
+          </a:bodyPr>
+          <a:p>
+            <a:pPr>
+              <a:defRPr/>
+            </a:pPr>
+            <a:r>
+              <a:rPr>
+                <a:latin typeface="Nimbus Mono PS"/>
+                <a:ea typeface="Nimbus Mono PS"/>
+                <a:cs typeface="Nimbus Mono PS"/>
+              </a:rPr>
+              <a:t>name_dict.py</a:t>
+            </a:r>
+            <a:endParaRPr>
+              <a:latin typeface="Nimbus Mono PS"/>
+              <a:ea typeface="Nimbus Mono PS"/>
+              <a:cs typeface="Nimbus Mono PS"/>
+            </a:endParaRPr>
+          </a:p>
+          <a:p>
+            <a:pPr>
+              <a:defRPr/>
+            </a:pPr>
+            <a:endParaRPr>
+              <a:latin typeface="Nimbus Mono PS"/>
+              <a:cs typeface="Nimbus Mono PS"/>
+            </a:endParaRPr>
+          </a:p>
+        </p:txBody>
+      </p:sp>
     </p:spTree>
   </p:cSld>
   <p:clrMapOvr>
@@ -10451,6 +10500,45 @@
           </a:prstGeom>
         </p:spPr>
       </p:pic>
+      <p:sp>
+        <p:nvSpPr>
+          <p:cNvPr id="763682637" name=""/>
+          <p:cNvSpPr txBox="1"/>
+          <p:nvPr/>
+        </p:nvSpPr>
+        <p:spPr bwMode="auto">
+          <a:xfrm flipH="0" flipV="0">
+            <a:off x="8906358" y="6380825"/>
+            <a:ext cx="2168971" cy="366120"/>
+          </a:xfrm>
+          <a:prstGeom prst="rect">
+            <a:avLst/>
+          </a:prstGeom>
+          <a:noFill/>
+        </p:spPr>
+        <p:txBody>
+          <a:bodyPr vertOverflow="overflow" horzOverflow="overflow" vert="horz" wrap="square" lIns="91440" tIns="45720" rIns="91440" bIns="45720" numCol="1" spcCol="0" rtlCol="0" fromWordArt="0" anchor="t" anchorCtr="0" forceAA="0" upright="0" compatLnSpc="0">
+            <a:spAutoFit/>
+          </a:bodyPr>
+          <a:p>
+            <a:pPr>
+              <a:defRPr/>
+            </a:pPr>
+            <a:r>
+              <a:rPr>
+                <a:latin typeface="Nimbus Mono PS"/>
+                <a:ea typeface="Nimbus Mono PS"/>
+                <a:cs typeface="Nimbus Mono PS"/>
+              </a:rPr>
+              <a:t>recursion.py</a:t>
+            </a:r>
+            <a:endParaRPr>
+              <a:latin typeface="Nimbus Mono PS"/>
+              <a:cs typeface="Nimbus Mono PS"/>
+            </a:endParaRPr>
+          </a:p>
+        </p:txBody>
+      </p:sp>
     </p:spTree>
   </p:cSld>
   <p:clrMapOvr>
@@ -10574,6 +10662,34 @@
             </a:r>
             <a:endParaRPr/>
           </a:p>
+          <a:p>
+            <a:pPr>
+              <a:defRPr/>
+            </a:pPr>
+            <a:endParaRPr/>
+          </a:p>
+        </p:txBody>
+      </p:sp>
+      <p:sp>
+        <p:nvSpPr>
+          <p:cNvPr id="540200537" name=""/>
+          <p:cNvSpPr txBox="1"/>
+          <p:nvPr/>
+        </p:nvSpPr>
+        <p:spPr bwMode="auto">
+          <a:xfrm flipH="0" flipV="0">
+            <a:off x="8758397" y="6156991"/>
+            <a:ext cx="2815221" cy="366119"/>
+          </a:xfrm>
+          <a:prstGeom prst="rect">
+            <a:avLst/>
+          </a:prstGeom>
+          <a:noFill/>
+        </p:spPr>
+        <p:txBody>
+          <a:bodyPr vertOverflow="overflow" horzOverflow="overflow" vert="horz" wrap="square" lIns="91440" tIns="45720" rIns="91440" bIns="45720" numCol="1" spcCol="0" rtlCol="0" fromWordArt="0" anchor="t" anchorCtr="0" forceAA="0" upright="0" compatLnSpc="0">
+            <a:spAutoFit/>
+          </a:bodyPr>
           <a:p>
             <a:pPr>
               <a:defRPr/>
@@ -10798,6 +10914,42 @@
             <a:r>
               <a:rPr/>
               <a:t>Obsługa wyjątku</a:t>
+            </a:r>
+            <a:endParaRPr/>
+          </a:p>
+        </p:txBody>
+      </p:sp>
+      <p:sp>
+        <p:nvSpPr>
+          <p:cNvPr id="1243457973" name=""/>
+          <p:cNvSpPr txBox="1"/>
+          <p:nvPr/>
+        </p:nvSpPr>
+        <p:spPr bwMode="auto">
+          <a:xfrm flipH="0" flipV="0">
+            <a:off x="8892009" y="6084923"/>
+            <a:ext cx="1417998" cy="366120"/>
+          </a:xfrm>
+          <a:prstGeom prst="rect">
+            <a:avLst/>
+          </a:prstGeom>
+          <a:noFill/>
+        </p:spPr>
+        <p:txBody>
+          <a:bodyPr vertOverflow="overflow" horzOverflow="overflow" vert="horz" wrap="square" lIns="91440" tIns="45720" rIns="91440" bIns="45720" numCol="1" spcCol="0" rtlCol="0" fromWordArt="0" anchor="t" anchorCtr="0" forceAA="0" upright="0" compatLnSpc="0">
+            <a:spAutoFit/>
+          </a:bodyPr>
+          <a:p>
+            <a:pPr algn="l">
+              <a:defRPr/>
+            </a:pPr>
+            <a:r>
+              <a:rPr>
+                <a:latin typeface="Nimbus Mono PS"/>
+                <a:ea typeface="Nimbus Mono PS"/>
+                <a:cs typeface="Nimbus Mono PS"/>
+              </a:rPr>
+              <a:t>except.py</a:t>
             </a:r>
             <a:endParaRPr/>
           </a:p>
@@ -11842,6 +11994,53 @@
           </a:prstGeom>
         </p:spPr>
       </p:pic>
+      <p:sp>
+        <p:nvSpPr>
+          <p:cNvPr id="1137458727" name=""/>
+          <p:cNvSpPr txBox="1"/>
+          <p:nvPr/>
+        </p:nvSpPr>
+        <p:spPr bwMode="auto">
+          <a:xfrm flipH="0" flipV="0">
+            <a:off x="8406990" y="5805944"/>
+            <a:ext cx="2719506" cy="640440"/>
+          </a:xfrm>
+          <a:prstGeom prst="rect">
+            <a:avLst/>
+          </a:prstGeom>
+          <a:noFill/>
+        </p:spPr>
+        <p:txBody>
+          <a:bodyPr vertOverflow="overflow" horzOverflow="overflow" vert="horz" wrap="square" lIns="91440" tIns="45720" rIns="91440" bIns="45720" numCol="1" spcCol="0" rtlCol="0" fromWordArt="0" anchor="t" anchorCtr="0" forceAA="0" upright="0" compatLnSpc="0">
+            <a:spAutoFit/>
+          </a:bodyPr>
+          <a:p>
+            <a:pPr>
+              <a:defRPr/>
+            </a:pPr>
+            <a:endParaRPr sz="1800"/>
+          </a:p>
+          <a:p>
+            <a:pPr>
+              <a:defRPr/>
+            </a:pPr>
+            <a:r>
+              <a:rPr lang="pl-PL" sz="1800" b="0" i="0" u="none" strike="noStrike" cap="none" spc="0">
+                <a:solidFill>
+                  <a:schemeClr val="accent6">
+                    <a:lumMod val="50000"/>
+                  </a:schemeClr>
+                </a:solidFill>
+                <a:latin typeface="Nimbus Mono PS"/>
+                <a:ea typeface="Nimbus Mono PS"/>
+                <a:cs typeface="Nimbus Mono PS"/>
+              </a:rPr>
+              <a:t>module_example.py</a:t>
+            </a:r>
+            <a:endParaRPr/>
+          </a:p>
+        </p:txBody>
+      </p:sp>
     </p:spTree>
   </p:cSld>
   <p:clrMapOvr>
@@ -11921,35 +12120,56 @@
             </a:pPr>
             <a:r>
               <a:rPr/>
-              <a:t>Python zna nazwy swoich funkcji i zmiennych (w odróżnieniu od języków niższego poziomu)</a:t>
-            </a:r>
-            <a:endParaRPr/>
-          </a:p>
-          <a:p>
-            <a:pPr>
-              <a:defRPr/>
-            </a:pPr>
-            <a:r>
-              <a:rPr/>
-              <a:t>Funkcja __main__() jest pierwszą funkcją, która wywołuje się po uruchomieniu interpretera</a:t>
-            </a:r>
-            <a:endParaRPr/>
-          </a:p>
-          <a:p>
-            <a:pPr>
-              <a:defRPr/>
-            </a:pPr>
-            <a:r>
-              <a:rPr/>
-              <a:t>Sprawdźmy zatem, czy jesteśmy w funkcji __main__()</a:t>
-            </a:r>
-            <a:endParaRPr/>
-          </a:p>
-          <a:p>
-            <a:pPr>
-              <a:defRPr/>
-            </a:pPr>
-            <a:endParaRPr/>
+              <a:t>Python zna nazwy swoich funkcji i zmiennych (w odróżnieniu od języków niższego poziomu). Wie także który moduł wywołał funkcję</a:t>
+            </a:r>
+            <a:endParaRPr/>
+          </a:p>
+          <a:p>
+            <a:pPr>
+              <a:defRPr/>
+            </a:pPr>
+            <a:r>
+              <a:rPr/>
+              <a:t>__main__ to moduł, w ramach którego ma miejsce uruchomienie głównego programu.</a:t>
+            </a:r>
+            <a:endParaRPr/>
+          </a:p>
+          <a:p>
+            <a:pPr>
+              <a:defRPr/>
+            </a:pPr>
+            <a:endParaRPr/>
+          </a:p>
+        </p:txBody>
+      </p:sp>
+      <p:sp>
+        <p:nvSpPr>
+          <p:cNvPr id="1093987019" name=""/>
+          <p:cNvSpPr txBox="1"/>
+          <p:nvPr/>
+        </p:nvSpPr>
+        <p:spPr bwMode="auto">
+          <a:xfrm flipH="0" flipV="0">
+            <a:off x="7121577" y="5760045"/>
+            <a:ext cx="3622640" cy="366120"/>
+          </a:xfrm>
+          <a:prstGeom prst="rect">
+            <a:avLst/>
+          </a:prstGeom>
+          <a:noFill/>
+        </p:spPr>
+        <p:txBody>
+          <a:bodyPr vertOverflow="overflow" horzOverflow="overflow" vert="horz" wrap="square" lIns="91440" tIns="45720" rIns="91440" bIns="45720" numCol="1" spcCol="0" rtlCol="0" fromWordArt="0" anchor="t" anchorCtr="0" forceAA="0" upright="0" compatLnSpc="0">
+            <a:spAutoFit/>
+          </a:bodyPr>
+          <a:p>
+            <a:pPr>
+              <a:defRPr/>
+            </a:pPr>
+            <a:endParaRPr>
+              <a:latin typeface="Nimbus Mono PS"/>
+              <a:cs typeface="Nimbus Mono PS"/>
+            </a:endParaRPr>
           </a:p>
         </p:txBody>
       </p:sp>
@@ -12041,25 +12261,28 @@
               <a:defRPr/>
             </a:pPr>
             <a:r>
-              <a:rPr/>
-              <a:t>Funkcja __main__() jest pierwszą funkcją, która wywołuje się po uruchomieniu interpretera</a:t>
-            </a:r>
-            <a:endParaRPr/>
-          </a:p>
-          <a:p>
-            <a:pPr>
-              <a:defRPr/>
-            </a:pPr>
-            <a:r>
-              <a:rPr/>
-              <a:t>Sprawdźmy zatem, czy jesteśmy w funkcji __main__()</a:t>
-            </a:r>
-            <a:endParaRPr/>
-          </a:p>
-          <a:p>
-            <a:pPr>
-              <a:defRPr/>
-            </a:pPr>
+              <a:rPr lang="pl-PL" sz="3200" b="0" i="0" u="none" strike="noStrike" cap="none" spc="0">
+                <a:solidFill>
+                  <a:schemeClr val="accent6">
+                    <a:lumMod val="50000"/>
+                  </a:schemeClr>
+                </a:solidFill>
+                <a:latin typeface="+mn-lt"/>
+                <a:ea typeface="+mn-ea"/>
+                <a:cs typeface="+mn-cs"/>
+              </a:rPr>
+              <a:t>__main__ to moduł, w ramach którego ma miejsce uruchomienie głównego programu.</a:t>
+            </a:r>
+            <a:endParaRPr/>
+          </a:p>
+          <a:p>
+            <a:pPr>
+              <a:defRPr/>
+            </a:pPr>
+            <a:r>
+              <a:rPr/>
+              <a:t>Sprawdźmy zatem w którym module jesteśmy</a:t>
+            </a:r>
             <a:endParaRPr/>
           </a:p>
           <a:p>
@@ -12136,6 +12359,55 @@
           </a:prstGeom>
         </p:spPr>
       </p:pic>
+      <p:sp>
+        <p:nvSpPr>
+          <p:cNvPr id="423990798" name=""/>
+          <p:cNvSpPr txBox="1"/>
+          <p:nvPr/>
+        </p:nvSpPr>
+        <p:spPr bwMode="auto">
+          <a:xfrm flipH="0" flipV="0">
+            <a:off x="306115" y="5830226"/>
+            <a:ext cx="3554667" cy="640440"/>
+          </a:xfrm>
+          <a:prstGeom prst="rect">
+            <a:avLst/>
+          </a:prstGeom>
+          <a:noFill/>
+        </p:spPr>
+        <p:txBody>
+          <a:bodyPr vertOverflow="overflow" horzOverflow="overflow" vert="horz" wrap="square" lIns="91440" tIns="45720" rIns="91440" bIns="45720" numCol="1" spcCol="0" rtlCol="0" fromWordArt="0" anchor="t" anchorCtr="0" forceAA="0" upright="0" compatLnSpc="0">
+            <a:spAutoFit/>
+          </a:bodyPr>
+          <a:p>
+            <a:pPr algn="l">
+              <a:defRPr/>
+            </a:pPr>
+            <a:endParaRPr/>
+          </a:p>
+          <a:p>
+            <a:pPr marL="457200" lvl="1" indent="0" algn="l">
+              <a:buFont typeface="Arial"/>
+              <a:buNone/>
+              <a:defRPr/>
+            </a:pPr>
+            <a:r>
+              <a:rPr lang="pl-PL" b="0" i="0" u="none" strike="noStrike" cap="none" spc="0">
+                <a:solidFill>
+                  <a:schemeClr val="accent6">
+                    <a:lumMod val="50000"/>
+                  </a:schemeClr>
+                </a:solidFill>
+                <a:latin typeface="Nimbus Mono PS"/>
+                <a:ea typeface="Nimbus Mono PS"/>
+                <a:cs typeface="Nimbus Mono PS"/>
+              </a:rPr>
+              <a:t>module_example_2.py</a:t>
+            </a:r>
+            <a:endParaRPr/>
+          </a:p>
+        </p:txBody>
+      </p:sp>
     </p:spTree>
   </p:cSld>
   <p:clrMapOvr>
@@ -16773,8 +17045,8 @@
         </p:nvSpPr>
         <p:spPr bwMode="auto">
           <a:xfrm flipH="0" flipV="0">
-            <a:off x="5904418" y="4529912"/>
-            <a:ext cx="5238536" cy="1189079"/>
+            <a:off x="5904417" y="4529911"/>
+            <a:ext cx="5245735" cy="2012039"/>
           </a:xfrm>
           <a:prstGeom prst="rect">
             <a:avLst/>
@@ -16808,6 +17080,39 @@
               <a:t>Warto sprawdzić różne typy danych, funkcje wbudowane, deklaracje klasy...</a:t>
             </a:r>
             <a:endParaRPr/>
+          </a:p>
+          <a:p>
+            <a:pPr marL="283878" indent="-283878">
+              <a:buFont typeface="Arial"/>
+              <a:buChar char="•"/>
+              <a:defRPr/>
+            </a:pPr>
+            <a:endParaRPr/>
+          </a:p>
+          <a:p>
+            <a:pPr marL="283878" indent="-283878">
+              <a:buFont typeface="Arial"/>
+              <a:buChar char="•"/>
+              <a:defRPr/>
+            </a:pPr>
+            <a:endParaRPr/>
+          </a:p>
+          <a:p>
+            <a:pPr>
+              <a:defRPr/>
+            </a:pPr>
+            <a:r>
+              <a:rPr>
+                <a:latin typeface="Nimbus Mono PS"/>
+                <a:ea typeface="Nimbus Mono PS"/>
+                <a:cs typeface="Nimbus Mono PS"/>
+              </a:rPr>
+              <a:t>to_decompile.py</a:t>
+            </a:r>
+            <a:endParaRPr>
+              <a:latin typeface="Nimbus Mono PS"/>
+              <a:cs typeface="Nimbus Mono PS"/>
+            </a:endParaRPr>
           </a:p>
         </p:txBody>
       </p:sp>

</xml_diff>

<commit_message>
further updated to objects
</commit_message>
<xml_diff>
--- a/Intro/Wprowadzenie.pptx
+++ b/Intro/Wprowadzenie.pptx
@@ -5,7 +5,7 @@
     <p:sldMasterId id="2147483648" r:id="rId1"/>
   </p:sldMasterIdLst>
   <p:notesMasterIdLst>
-    <p:notesMasterId r:id="rId42"/>
+    <p:notesMasterId r:id="rId44"/>
   </p:notesMasterIdLst>
   <p:sldIdLst>
     <p:sldId id="256" r:id="rId4"/>
@@ -46,6 +46,8 @@
     <p:sldId id="291" r:id="rId39"/>
     <p:sldId id="292" r:id="rId40"/>
     <p:sldId id="293" r:id="rId41"/>
+    <p:sldId id="294" r:id="rId42"/>
+    <p:sldId id="295" r:id="rId43"/>
   </p:sldIdLst>
   <p:sldSz cx="12192000" cy="6858000"/>
   <p:notesSz cx="6858000" cy="9144000"/>
@@ -926,7 +928,7 @@
             <a:pPr>
               <a:defRPr/>
             </a:pPr>
-            <a:fld id="{53ACFCD6-7C3F-A6D2-CE12-C09A2224D4C6}" type="slidenum">
+            <a:fld id="{ED4B42D7-844F-C164-E9FE-86627618E0F2}" type="slidenum">
               <a:rPr/>
               <a:t/>
             </a:fld>
@@ -958,7 +960,7 @@
       </p:grpSpPr>
       <p:sp>
         <p:nvSpPr>
-          <p:cNvPr id="49127995" name="Slide Image Placeholder 1"/>
+          <p:cNvPr id="1683774609" name="Slide Image Placeholder 1"/>
           <p:cNvSpPr>
             <a:spLocks noChangeAspect="1" noGrp="1" noRot="1"/>
           </p:cNvSpPr>
@@ -970,7 +972,7 @@
       </p:sp>
       <p:sp>
         <p:nvSpPr>
-          <p:cNvPr id="1461247893" name="Notes Placeholder 2"/>
+          <p:cNvPr id="990807161" name="Notes Placeholder 2"/>
           <p:cNvSpPr>
             <a:spLocks noGrp="1"/>
           </p:cNvSpPr>
@@ -992,7 +994,7 @@
       </p:sp>
       <p:sp>
         <p:nvSpPr>
-          <p:cNvPr id="2015589708" name="Slide Number Placeholder 3"/>
+          <p:cNvPr id="1765943011" name="Slide Number Placeholder 3"/>
           <p:cNvSpPr>
             <a:spLocks noGrp="1"/>
           </p:cNvSpPr>
@@ -1008,7 +1010,7 @@
             <a:pPr>
               <a:defRPr/>
             </a:pPr>
-            <a:fld id="{C0BABE2E-8B96-E4B8-8C0B-8A141FE90195}" type="slidenum">
+            <a:fld id="{1579A95C-0D7B-C70F-7C4F-D9B062FF1B60}" type="slidenum">
               <a:rPr/>
               <a:t/>
             </a:fld>
@@ -1090,7 +1092,7 @@
             <a:pPr>
               <a:defRPr/>
             </a:pPr>
-            <a:fld id="{CA4EE5E0-3991-C850-0F9D-DF8F230DEA8C}" type="slidenum">
+            <a:fld id="{53ACFCD6-7C3F-A6D2-CE12-C09A2224D4C6}" type="slidenum">
               <a:rPr/>
               <a:t/>
             </a:fld>
@@ -1122,7 +1124,7 @@
       </p:grpSpPr>
       <p:sp>
         <p:nvSpPr>
-          <p:cNvPr id="2" name="Slide Image Placeholder 1"/>
+          <p:cNvPr id="49127995" name="Slide Image Placeholder 1"/>
           <p:cNvSpPr>
             <a:spLocks noChangeAspect="1" noGrp="1" noRot="1"/>
           </p:cNvSpPr>
@@ -1134,7 +1136,7 @@
       </p:sp>
       <p:sp>
         <p:nvSpPr>
-          <p:cNvPr id="3" name="Notes Placeholder 2"/>
+          <p:cNvPr id="1461247893" name="Notes Placeholder 2"/>
           <p:cNvSpPr>
             <a:spLocks noGrp="1"/>
           </p:cNvSpPr>
@@ -1156,7 +1158,7 @@
       </p:sp>
       <p:sp>
         <p:nvSpPr>
-          <p:cNvPr id="4" name="Slide Number Placeholder 3"/>
+          <p:cNvPr id="2015589708" name="Slide Number Placeholder 3"/>
           <p:cNvSpPr>
             <a:spLocks noGrp="1"/>
           </p:cNvSpPr>
@@ -1172,7 +1174,7 @@
             <a:pPr>
               <a:defRPr/>
             </a:pPr>
-            <a:fld id="{E4C667BC-B419-6305-6330-FA4221BC3D85}" type="slidenum">
+            <a:fld id="{C0BABE2E-8B96-E4B8-8C0B-8A141FE90195}" type="slidenum">
               <a:rPr/>
               <a:t/>
             </a:fld>
@@ -1254,7 +1256,7 @@
             <a:pPr>
               <a:defRPr/>
             </a:pPr>
-            <a:fld id="{F519065A-47AF-E6DD-1A5F-A6A98D766278}" type="slidenum">
+            <a:fld id="{CA4EE5E0-3991-C850-0F9D-DF8F230DEA8C}" type="slidenum">
               <a:rPr/>
               <a:t/>
             </a:fld>
@@ -1286,7 +1288,7 @@
       </p:grpSpPr>
       <p:sp>
         <p:nvSpPr>
-          <p:cNvPr id="1945884399" name="Slide Image Placeholder 1"/>
+          <p:cNvPr id="2" name="Slide Image Placeholder 1"/>
           <p:cNvSpPr>
             <a:spLocks noChangeAspect="1" noGrp="1" noRot="1"/>
           </p:cNvSpPr>
@@ -1298,7 +1300,7 @@
       </p:sp>
       <p:sp>
         <p:nvSpPr>
-          <p:cNvPr id="523600165" name="Notes Placeholder 2"/>
+          <p:cNvPr id="3" name="Notes Placeholder 2"/>
           <p:cNvSpPr>
             <a:spLocks noGrp="1"/>
           </p:cNvSpPr>
@@ -1320,7 +1322,7 @@
       </p:sp>
       <p:sp>
         <p:nvSpPr>
-          <p:cNvPr id="1358234312" name="Slide Number Placeholder 3"/>
+          <p:cNvPr id="4" name="Slide Number Placeholder 3"/>
           <p:cNvSpPr>
             <a:spLocks noGrp="1"/>
           </p:cNvSpPr>
@@ -1336,7 +1338,7 @@
             <a:pPr>
               <a:defRPr/>
             </a:pPr>
-            <a:fld id="{8F65B1F5-AEB1-4C21-E920-2B50243F0AF5}" type="slidenum">
+            <a:fld id="{E4C667BC-B419-6305-6330-FA4221BC3D85}" type="slidenum">
               <a:rPr/>
               <a:t/>
             </a:fld>
@@ -1418,7 +1420,7 @@
             <a:pPr>
               <a:defRPr/>
             </a:pPr>
-            <a:fld id="{35B4C1BB-7107-AA91-2BB9-A082CCDE7A4D}" type="slidenum">
+            <a:fld id="{F519065A-47AF-E6DD-1A5F-A6A98D766278}" type="slidenum">
               <a:rPr/>
               <a:t/>
             </a:fld>
@@ -1532,7 +1534,7 @@
       </p:grpSpPr>
       <p:sp>
         <p:nvSpPr>
-          <p:cNvPr id="2" name="Slide Image Placeholder 1"/>
+          <p:cNvPr id="1945884399" name="Slide Image Placeholder 1"/>
           <p:cNvSpPr>
             <a:spLocks noChangeAspect="1" noGrp="1" noRot="1"/>
           </p:cNvSpPr>
@@ -1544,7 +1546,7 @@
       </p:sp>
       <p:sp>
         <p:nvSpPr>
-          <p:cNvPr id="3" name="Notes Placeholder 2"/>
+          <p:cNvPr id="523600165" name="Notes Placeholder 2"/>
           <p:cNvSpPr>
             <a:spLocks noGrp="1"/>
           </p:cNvSpPr>
@@ -1566,7 +1568,7 @@
       </p:sp>
       <p:sp>
         <p:nvSpPr>
-          <p:cNvPr id="4" name="Slide Number Placeholder 3"/>
+          <p:cNvPr id="1358234312" name="Slide Number Placeholder 3"/>
           <p:cNvSpPr>
             <a:spLocks noGrp="1"/>
           </p:cNvSpPr>
@@ -1582,7 +1584,7 @@
             <a:pPr>
               <a:defRPr/>
             </a:pPr>
-            <a:fld id="{F18F1AF6-8771-329D-5EEC-F350DEA02CDC}" type="slidenum">
+            <a:fld id="{8F65B1F5-AEB1-4C21-E920-2B50243F0AF5}" type="slidenum">
               <a:rPr/>
               <a:t/>
             </a:fld>
@@ -1664,7 +1666,7 @@
             <a:pPr>
               <a:defRPr/>
             </a:pPr>
-            <a:fld id="{10F40710-0101-DDDE-85AF-6A4849D955A1}" type="slidenum">
+            <a:fld id="{35B4C1BB-7107-AA91-2BB9-A082CCDE7A4D}" type="slidenum">
               <a:rPr/>
               <a:t/>
             </a:fld>
@@ -1746,7 +1748,7 @@
             <a:pPr>
               <a:defRPr/>
             </a:pPr>
-            <a:fld id="{544389D6-4F2A-8F5B-67FC-5FC89887C67F}" type="slidenum">
+            <a:fld id="{F18F1AF6-8771-329D-5EEC-F350DEA02CDC}" type="slidenum">
               <a:rPr/>
               <a:t/>
             </a:fld>
@@ -1778,7 +1780,7 @@
       </p:grpSpPr>
       <p:sp>
         <p:nvSpPr>
-          <p:cNvPr id="1162446655" name="Slide Image Placeholder 1"/>
+          <p:cNvPr id="2" name="Slide Image Placeholder 1"/>
           <p:cNvSpPr>
             <a:spLocks noChangeAspect="1" noGrp="1" noRot="1"/>
           </p:cNvSpPr>
@@ -1790,7 +1792,7 @@
       </p:sp>
       <p:sp>
         <p:nvSpPr>
-          <p:cNvPr id="1583307574" name="Notes Placeholder 2"/>
+          <p:cNvPr id="3" name="Notes Placeholder 2"/>
           <p:cNvSpPr>
             <a:spLocks noGrp="1"/>
           </p:cNvSpPr>
@@ -1812,7 +1814,7 @@
       </p:sp>
       <p:sp>
         <p:nvSpPr>
-          <p:cNvPr id="1474496720" name="Slide Number Placeholder 3"/>
+          <p:cNvPr id="4" name="Slide Number Placeholder 3"/>
           <p:cNvSpPr>
             <a:spLocks noGrp="1"/>
           </p:cNvSpPr>
@@ -1828,7 +1830,7 @@
             <a:pPr>
               <a:defRPr/>
             </a:pPr>
-            <a:fld id="{CDBDACA2-F9BB-D0F5-E497-4F6655E08BC9}" type="slidenum">
+            <a:fld id="{10F40710-0101-DDDE-85AF-6A4849D955A1}" type="slidenum">
               <a:rPr/>
               <a:t/>
             </a:fld>
@@ -1910,7 +1912,7 @@
             <a:pPr>
               <a:defRPr/>
             </a:pPr>
-            <a:fld id="{1205EA4F-9CF9-25C7-12A9-46941CB22CBA}" type="slidenum">
+            <a:fld id="{544389D6-4F2A-8F5B-67FC-5FC89887C67F}" type="slidenum">
               <a:rPr/>
               <a:t/>
             </a:fld>
@@ -1942,7 +1944,7 @@
       </p:grpSpPr>
       <p:sp>
         <p:nvSpPr>
-          <p:cNvPr id="831491424" name="Slide Image Placeholder 1"/>
+          <p:cNvPr id="1162446655" name="Slide Image Placeholder 1"/>
           <p:cNvSpPr>
             <a:spLocks noChangeAspect="1" noGrp="1" noRot="1"/>
           </p:cNvSpPr>
@@ -1954,7 +1956,7 @@
       </p:sp>
       <p:sp>
         <p:nvSpPr>
-          <p:cNvPr id="1955905537" name="Notes Placeholder 2"/>
+          <p:cNvPr id="1583307574" name="Notes Placeholder 2"/>
           <p:cNvSpPr>
             <a:spLocks noGrp="1"/>
           </p:cNvSpPr>
@@ -1976,7 +1978,7 @@
       </p:sp>
       <p:sp>
         <p:nvSpPr>
-          <p:cNvPr id="973997702" name="Slide Number Placeholder 3"/>
+          <p:cNvPr id="1474496720" name="Slide Number Placeholder 3"/>
           <p:cNvSpPr>
             <a:spLocks noGrp="1"/>
           </p:cNvSpPr>
@@ -1992,7 +1994,7 @@
             <a:pPr>
               <a:defRPr/>
             </a:pPr>
-            <a:fld id="{0911C461-0EF6-BA35-0CBB-F7D6489C0D64}" type="slidenum">
+            <a:fld id="{CDBDACA2-F9BB-D0F5-E497-4F6655E08BC9}" type="slidenum">
               <a:rPr/>
               <a:t/>
             </a:fld>
@@ -2074,7 +2076,7 @@
             <a:pPr>
               <a:defRPr/>
             </a:pPr>
-            <a:fld id="{F4922A4F-E559-F73A-63FC-3EE99EB87A09}" type="slidenum">
+            <a:fld id="{1205EA4F-9CF9-25C7-12A9-46941CB22CBA}" type="slidenum">
               <a:rPr/>
               <a:t/>
             </a:fld>
@@ -2106,7 +2108,7 @@
       </p:grpSpPr>
       <p:sp>
         <p:nvSpPr>
-          <p:cNvPr id="2" name="Slide Image Placeholder 1"/>
+          <p:cNvPr id="831491424" name="Slide Image Placeholder 1"/>
           <p:cNvSpPr>
             <a:spLocks noChangeAspect="1" noGrp="1" noRot="1"/>
           </p:cNvSpPr>
@@ -2118,7 +2120,7 @@
       </p:sp>
       <p:sp>
         <p:nvSpPr>
-          <p:cNvPr id="3" name="Notes Placeholder 2"/>
+          <p:cNvPr id="1955905537" name="Notes Placeholder 2"/>
           <p:cNvSpPr>
             <a:spLocks noGrp="1"/>
           </p:cNvSpPr>
@@ -2140,7 +2142,7 @@
       </p:sp>
       <p:sp>
         <p:nvSpPr>
-          <p:cNvPr id="4" name="Slide Number Placeholder 3"/>
+          <p:cNvPr id="973997702" name="Slide Number Placeholder 3"/>
           <p:cNvSpPr>
             <a:spLocks noGrp="1"/>
           </p:cNvSpPr>
@@ -2156,7 +2158,7 @@
             <a:pPr>
               <a:defRPr/>
             </a:pPr>
-            <a:fld id="{B67FA3F6-20C3-EB15-C574-312F30B5F729}" type="slidenum">
+            <a:fld id="{0911C461-0EF6-BA35-0CBB-F7D6489C0D64}" type="slidenum">
               <a:rPr/>
               <a:t/>
             </a:fld>
@@ -2238,7 +2240,7 @@
             <a:pPr>
               <a:defRPr/>
             </a:pPr>
-            <a:fld id="{B084B34D-D8CF-765D-8765-CB0B042B2C1C}" type="slidenum">
+            <a:fld id="{F4922A4F-E559-F73A-63FC-3EE99EB87A09}" type="slidenum">
               <a:rPr/>
               <a:t/>
             </a:fld>
@@ -2320,7 +2322,7 @@
             <a:pPr>
               <a:defRPr/>
             </a:pPr>
-            <a:fld id="{5E8D529E-A364-3A1E-0507-FCFEDD3F1C8D}" type="slidenum">
+            <a:fld id="{B67FA3F6-20C3-EB15-C574-312F30B5F729}" type="slidenum">
               <a:rPr/>
               <a:t/>
             </a:fld>
@@ -2484,7 +2486,7 @@
             <a:pPr>
               <a:defRPr/>
             </a:pPr>
-            <a:fld id="{C90309F1-D857-97CF-A8F2-E7A1DA435989}" type="slidenum">
+            <a:fld id="{B084B34D-D8CF-765D-8765-CB0B042B2C1C}" type="slidenum">
               <a:rPr/>
               <a:t/>
             </a:fld>
@@ -2516,7 +2518,7 @@
       </p:grpSpPr>
       <p:sp>
         <p:nvSpPr>
-          <p:cNvPr id="1832963400" name="Slide Image Placeholder 1"/>
+          <p:cNvPr id="2" name="Slide Image Placeholder 1"/>
           <p:cNvSpPr>
             <a:spLocks noChangeAspect="1" noGrp="1" noRot="1"/>
           </p:cNvSpPr>
@@ -2528,7 +2530,7 @@
       </p:sp>
       <p:sp>
         <p:nvSpPr>
-          <p:cNvPr id="649600240" name="Notes Placeholder 2"/>
+          <p:cNvPr id="3" name="Notes Placeholder 2"/>
           <p:cNvSpPr>
             <a:spLocks noGrp="1"/>
           </p:cNvSpPr>
@@ -2550,7 +2552,7 @@
       </p:sp>
       <p:sp>
         <p:nvSpPr>
-          <p:cNvPr id="1576096929" name="Slide Number Placeholder 3"/>
+          <p:cNvPr id="4" name="Slide Number Placeholder 3"/>
           <p:cNvSpPr>
             <a:spLocks noGrp="1"/>
           </p:cNvSpPr>
@@ -2566,7 +2568,7 @@
             <a:pPr>
               <a:defRPr/>
             </a:pPr>
-            <a:fld id="{A7F4BB80-CF71-87CB-57CE-09CAB9C9B29B}" type="slidenum">
+            <a:fld id="{5E8D529E-A364-3A1E-0507-FCFEDD3F1C8D}" type="slidenum">
               <a:rPr/>
               <a:t/>
             </a:fld>
@@ -2648,7 +2650,7 @@
             <a:pPr>
               <a:defRPr/>
             </a:pPr>
-            <a:fld id="{321914E6-ECE9-F368-EC83-52A280F30465}" type="slidenum">
+            <a:fld id="{C90309F1-D857-97CF-A8F2-E7A1DA435989}" type="slidenum">
               <a:rPr/>
               <a:t/>
             </a:fld>
@@ -2680,7 +2682,7 @@
       </p:grpSpPr>
       <p:sp>
         <p:nvSpPr>
-          <p:cNvPr id="253690914" name="Slide Image Placeholder 1"/>
+          <p:cNvPr id="1832963400" name="Slide Image Placeholder 1"/>
           <p:cNvSpPr>
             <a:spLocks noChangeAspect="1" noGrp="1" noRot="1"/>
           </p:cNvSpPr>
@@ -2692,7 +2694,7 @@
       </p:sp>
       <p:sp>
         <p:nvSpPr>
-          <p:cNvPr id="887009488" name="Notes Placeholder 2"/>
+          <p:cNvPr id="649600240" name="Notes Placeholder 2"/>
           <p:cNvSpPr>
             <a:spLocks noGrp="1"/>
           </p:cNvSpPr>
@@ -2714,7 +2716,7 @@
       </p:sp>
       <p:sp>
         <p:nvSpPr>
-          <p:cNvPr id="1582130491" name="Slide Number Placeholder 3"/>
+          <p:cNvPr id="1576096929" name="Slide Number Placeholder 3"/>
           <p:cNvSpPr>
             <a:spLocks noGrp="1"/>
           </p:cNvSpPr>
@@ -2730,7 +2732,7 @@
             <a:pPr>
               <a:defRPr/>
             </a:pPr>
-            <a:fld id="{C270A305-5AA8-B1BA-5D92-1155D0D02711}" type="slidenum">
+            <a:fld id="{A7F4BB80-CF71-87CB-57CE-09CAB9C9B29B}" type="slidenum">
               <a:rPr/>
               <a:t/>
             </a:fld>
@@ -2812,7 +2814,7 @@
             <a:pPr>
               <a:defRPr/>
             </a:pPr>
-            <a:fld id="{31C577E8-1A64-9739-B627-01D4818BF1F9}" type="slidenum">
+            <a:fld id="{321914E6-ECE9-F368-EC83-52A280F30465}" type="slidenum">
               <a:rPr/>
               <a:t/>
             </a:fld>
@@ -2844,7 +2846,7 @@
       </p:grpSpPr>
       <p:sp>
         <p:nvSpPr>
-          <p:cNvPr id="122500585" name="Slide Image Placeholder 1"/>
+          <p:cNvPr id="253690914" name="Slide Image Placeholder 1"/>
           <p:cNvSpPr>
             <a:spLocks noChangeAspect="1" noGrp="1" noRot="1"/>
           </p:cNvSpPr>
@@ -2856,7 +2858,7 @@
       </p:sp>
       <p:sp>
         <p:nvSpPr>
-          <p:cNvPr id="1710338001" name="Notes Placeholder 2"/>
+          <p:cNvPr id="887009488" name="Notes Placeholder 2"/>
           <p:cNvSpPr>
             <a:spLocks noGrp="1"/>
           </p:cNvSpPr>
@@ -2878,7 +2880,7 @@
       </p:sp>
       <p:sp>
         <p:nvSpPr>
-          <p:cNvPr id="1023967649" name="Slide Number Placeholder 3"/>
+          <p:cNvPr id="1582130491" name="Slide Number Placeholder 3"/>
           <p:cNvSpPr>
             <a:spLocks noGrp="1"/>
           </p:cNvSpPr>
@@ -2894,7 +2896,7 @@
             <a:pPr>
               <a:defRPr/>
             </a:pPr>
-            <a:fld id="{BB691204-E308-6797-8F27-5FF90807768B}" type="slidenum">
+            <a:fld id="{C270A305-5AA8-B1BA-5D92-1155D0D02711}" type="slidenum">
               <a:rPr/>
               <a:t/>
             </a:fld>
@@ -2976,7 +2978,7 @@
             <a:pPr>
               <a:defRPr/>
             </a:pPr>
-            <a:fld id="{A50F6841-4201-DCB9-0044-D9E55EBDC0E9}" type="slidenum">
+            <a:fld id="{31C577E8-1A64-9739-B627-01D4818BF1F9}" type="slidenum">
               <a:rPr/>
               <a:t/>
             </a:fld>
@@ -3008,7 +3010,7 @@
       </p:grpSpPr>
       <p:sp>
         <p:nvSpPr>
-          <p:cNvPr id="1020839069" name="Slide Image Placeholder 1"/>
+          <p:cNvPr id="122500585" name="Slide Image Placeholder 1"/>
           <p:cNvSpPr>
             <a:spLocks noChangeAspect="1" noGrp="1" noRot="1"/>
           </p:cNvSpPr>
@@ -3020,7 +3022,7 @@
       </p:sp>
       <p:sp>
         <p:nvSpPr>
-          <p:cNvPr id="1523445719" name="Notes Placeholder 2"/>
+          <p:cNvPr id="1710338001" name="Notes Placeholder 2"/>
           <p:cNvSpPr>
             <a:spLocks noGrp="1"/>
           </p:cNvSpPr>
@@ -3042,7 +3044,7 @@
       </p:sp>
       <p:sp>
         <p:nvSpPr>
-          <p:cNvPr id="19616828" name="Slide Number Placeholder 3"/>
+          <p:cNvPr id="1023967649" name="Slide Number Placeholder 3"/>
           <p:cNvSpPr>
             <a:spLocks noGrp="1"/>
           </p:cNvSpPr>
@@ -3058,7 +3060,7 @@
             <a:pPr>
               <a:defRPr/>
             </a:pPr>
-            <a:fld id="{EF8366F8-54E2-0E63-0D09-567DE5BE63A9}" type="slidenum">
+            <a:fld id="{BB691204-E308-6797-8F27-5FF90807768B}" type="slidenum">
               <a:rPr/>
               <a:t/>
             </a:fld>
@@ -3140,7 +3142,89 @@
             <a:pPr>
               <a:defRPr/>
             </a:pPr>
-            <a:fld id="{40037315-2481-F44F-D227-6D6EB5858E8D}" type="slidenum">
+            <a:fld id="{A50F6841-4201-DCB9-0044-D9E55EBDC0E9}" type="slidenum">
+              <a:rPr/>
+              <a:t/>
+            </a:fld>
+            <a:endParaRPr/>
+          </a:p>
+        </p:txBody>
+      </p:sp>
+    </p:spTree>
+  </p:cSld>
+</p:notes>
+</file>
+
+<file path=ppt/notesSlides/notesSlide39.xml><?xml version="1.0" encoding="utf-8"?>
+<p:notes xmlns:a="http://schemas.openxmlformats.org/drawingml/2006/main" xmlns:r="http://schemas.openxmlformats.org/officeDocument/2006/relationships" xmlns:p="http://schemas.openxmlformats.org/presentationml/2006/main" xmlns:m="http://schemas.openxmlformats.org/officeDocument/2006/math" xmlns:w="http://schemas.openxmlformats.org/wordprocessingml/2006/main">
+  <p:cSld name="">
+    <p:spTree>
+      <p:nvGrpSpPr>
+        <p:cNvPr id="1" name=""/>
+        <p:cNvGrpSpPr/>
+        <p:nvPr/>
+      </p:nvGrpSpPr>
+      <p:grpSpPr bwMode="auto">
+        <a:xfrm>
+          <a:off x="0" y="0"/>
+          <a:ext cx="0" cy="0"/>
+          <a:chOff x="0" y="0"/>
+          <a:chExt cx="0" cy="0"/>
+        </a:xfrm>
+      </p:grpSpPr>
+      <p:sp>
+        <p:nvSpPr>
+          <p:cNvPr id="1020839069" name="Slide Image Placeholder 1"/>
+          <p:cNvSpPr>
+            <a:spLocks noChangeAspect="1" noGrp="1" noRot="1"/>
+          </p:cNvSpPr>
+          <p:nvPr>
+            <p:ph type="sldImg"/>
+          </p:nvPr>
+        </p:nvSpPr>
+        <p:spPr bwMode="auto"/>
+      </p:sp>
+      <p:sp>
+        <p:nvSpPr>
+          <p:cNvPr id="1523445719" name="Notes Placeholder 2"/>
+          <p:cNvSpPr>
+            <a:spLocks noGrp="1"/>
+          </p:cNvSpPr>
+          <p:nvPr>
+            <p:ph type="body" idx="1"/>
+          </p:nvPr>
+        </p:nvSpPr>
+        <p:spPr bwMode="auto"/>
+        <p:txBody>
+          <a:bodyPr/>
+          <a:lstStyle/>
+          <a:p>
+            <a:pPr>
+              <a:defRPr/>
+            </a:pPr>
+            <a:endParaRPr/>
+          </a:p>
+        </p:txBody>
+      </p:sp>
+      <p:sp>
+        <p:nvSpPr>
+          <p:cNvPr id="19616828" name="Slide Number Placeholder 3"/>
+          <p:cNvSpPr>
+            <a:spLocks noGrp="1"/>
+          </p:cNvSpPr>
+          <p:nvPr>
+            <p:ph type="sldNum" sz="quarter" idx="10"/>
+          </p:nvPr>
+        </p:nvSpPr>
+        <p:spPr bwMode="auto"/>
+        <p:txBody>
+          <a:bodyPr/>
+          <a:lstStyle/>
+          <a:p>
+            <a:pPr>
+              <a:defRPr/>
+            </a:pPr>
+            <a:fld id="{EF8366F8-54E2-0E63-0D09-567DE5BE63A9}" type="slidenum">
               <a:rPr/>
               <a:t/>
             </a:fld>
@@ -3223,6 +3307,88 @@
               <a:defRPr/>
             </a:pPr>
             <a:fld id="{1D77ABC4-5DF0-0ACC-6661-492466E755DF}" type="slidenum">
+              <a:rPr/>
+              <a:t/>
+            </a:fld>
+            <a:endParaRPr/>
+          </a:p>
+        </p:txBody>
+      </p:sp>
+    </p:spTree>
+  </p:cSld>
+</p:notes>
+</file>
+
+<file path=ppt/notesSlides/notesSlide40.xml><?xml version="1.0" encoding="utf-8"?>
+<p:notes xmlns:a="http://schemas.openxmlformats.org/drawingml/2006/main" xmlns:r="http://schemas.openxmlformats.org/officeDocument/2006/relationships" xmlns:p="http://schemas.openxmlformats.org/presentationml/2006/main" xmlns:m="http://schemas.openxmlformats.org/officeDocument/2006/math" xmlns:w="http://schemas.openxmlformats.org/wordprocessingml/2006/main">
+  <p:cSld name="">
+    <p:spTree>
+      <p:nvGrpSpPr>
+        <p:cNvPr id="1" name=""/>
+        <p:cNvGrpSpPr/>
+        <p:nvPr/>
+      </p:nvGrpSpPr>
+      <p:grpSpPr bwMode="auto">
+        <a:xfrm>
+          <a:off x="0" y="0"/>
+          <a:ext cx="0" cy="0"/>
+          <a:chOff x="0" y="0"/>
+          <a:chExt cx="0" cy="0"/>
+        </a:xfrm>
+      </p:grpSpPr>
+      <p:sp>
+        <p:nvSpPr>
+          <p:cNvPr id="2" name="Slide Image Placeholder 1"/>
+          <p:cNvSpPr>
+            <a:spLocks noChangeAspect="1" noGrp="1" noRot="1"/>
+          </p:cNvSpPr>
+          <p:nvPr>
+            <p:ph type="sldImg"/>
+          </p:nvPr>
+        </p:nvSpPr>
+        <p:spPr bwMode="auto"/>
+      </p:sp>
+      <p:sp>
+        <p:nvSpPr>
+          <p:cNvPr id="3" name="Notes Placeholder 2"/>
+          <p:cNvSpPr>
+            <a:spLocks noGrp="1"/>
+          </p:cNvSpPr>
+          <p:nvPr>
+            <p:ph type="body" idx="1"/>
+          </p:nvPr>
+        </p:nvSpPr>
+        <p:spPr bwMode="auto"/>
+        <p:txBody>
+          <a:bodyPr/>
+          <a:lstStyle/>
+          <a:p>
+            <a:pPr>
+              <a:defRPr/>
+            </a:pPr>
+            <a:endParaRPr/>
+          </a:p>
+        </p:txBody>
+      </p:sp>
+      <p:sp>
+        <p:nvSpPr>
+          <p:cNvPr id="4" name="Slide Number Placeholder 3"/>
+          <p:cNvSpPr>
+            <a:spLocks noGrp="1"/>
+          </p:cNvSpPr>
+          <p:nvPr>
+            <p:ph type="sldNum" sz="quarter" idx="10"/>
+          </p:nvPr>
+        </p:nvSpPr>
+        <p:spPr bwMode="auto"/>
+        <p:txBody>
+          <a:bodyPr/>
+          <a:lstStyle/>
+          <a:p>
+            <a:pPr>
+              <a:defRPr/>
+            </a:pPr>
+            <a:fld id="{40037315-2481-F44F-D227-6D6EB5858E8D}" type="slidenum">
               <a:rPr/>
               <a:t/>
             </a:fld>
@@ -10044,7 +10210,7 @@
             </a:pPr>
             <a:r>
               <a:rPr/>
-              <a:t>Python rozpoznaje zmienne po nazwie (nie po adresie)</a:t>
+              <a:t>Python rozpoznaje zmienne i funkcje po nazwie (nie po adresie)</a:t>
             </a:r>
             <a:endParaRPr/>
           </a:p>
@@ -10080,8 +10246,8 @@
         </p:blipFill>
         <p:spPr bwMode="auto">
           <a:xfrm flipH="0" flipV="0">
-            <a:off x="1168418" y="3191702"/>
-            <a:ext cx="4347305" cy="3488745"/>
+            <a:off x="1647014" y="3831914"/>
+            <a:ext cx="3561063" cy="2857780"/>
           </a:xfrm>
           <a:prstGeom prst="rect">
             <a:avLst/>
@@ -10102,8 +10268,8 @@
         </p:blipFill>
         <p:spPr bwMode="auto">
           <a:xfrm flipH="0" flipV="0">
-            <a:off x="5760765" y="2763281"/>
-            <a:ext cx="3687839" cy="3917167"/>
+            <a:off x="5615728" y="3354521"/>
+            <a:ext cx="3244392" cy="3446144"/>
           </a:xfrm>
           <a:prstGeom prst="rect">
             <a:avLst/>
@@ -10176,6 +10342,274 @@
 </file>
 
 <file path=ppt/slides/slide13.xml><?xml version="1.0" encoding="utf-8"?>
+<p:sld xmlns:a="http://schemas.openxmlformats.org/drawingml/2006/main" xmlns:r="http://schemas.openxmlformats.org/officeDocument/2006/relationships" xmlns:p="http://schemas.openxmlformats.org/presentationml/2006/main" xmlns:m="http://schemas.openxmlformats.org/officeDocument/2006/math" xmlns:w="http://schemas.openxmlformats.org/wordprocessingml/2006/main" showMasterPhAnim="0" show="1">
+  <p:cSld name="">
+    <p:spTree>
+      <p:nvGrpSpPr>
+        <p:cNvPr id="1" name=""/>
+        <p:cNvGrpSpPr/>
+        <p:nvPr/>
+      </p:nvGrpSpPr>
+      <p:grpSpPr bwMode="auto">
+        <a:xfrm>
+          <a:off x="0" y="0"/>
+          <a:ext cx="0" cy="0"/>
+          <a:chOff x="0" y="0"/>
+          <a:chExt cx="0" cy="0"/>
+        </a:xfrm>
+      </p:grpSpPr>
+      <p:sp>
+        <p:nvSpPr>
+          <p:cNvPr id="882813157" name="Заголовок 1"/>
+          <p:cNvSpPr>
+            <a:spLocks noGrp="1"/>
+          </p:cNvSpPr>
+          <p:nvPr>
+            <p:ph type="title"/>
+          </p:nvPr>
+        </p:nvSpPr>
+        <p:spPr bwMode="auto"/>
+        <p:txBody>
+          <a:bodyPr/>
+          <a:lstStyle/>
+          <a:p>
+            <a:pPr>
+              <a:defRPr/>
+            </a:pPr>
+            <a:r>
+              <a:rPr/>
+              <a:t>Przeciążanie funkcji</a:t>
+            </a:r>
+            <a:endParaRPr/>
+          </a:p>
+        </p:txBody>
+      </p:sp>
+      <p:sp>
+        <p:nvSpPr>
+          <p:cNvPr id="140871347" name="Объект 2"/>
+          <p:cNvSpPr>
+            <a:spLocks noGrp="1"/>
+          </p:cNvSpPr>
+          <p:nvPr>
+            <p:ph idx="1"/>
+          </p:nvPr>
+        </p:nvSpPr>
+        <p:spPr bwMode="auto"/>
+        <p:txBody>
+          <a:bodyPr/>
+          <a:lstStyle/>
+          <a:p>
+            <a:pPr>
+              <a:defRPr/>
+            </a:pPr>
+            <a:r>
+              <a:rPr/>
+              <a:t>Zadanie: napisać funkcję, która potęguje podaną liczbę. Jeśli podamy tylko liczbę, to funkcja zwróci jej kwadrat. Jeśli podamy dwie, to </a:t>
+            </a:r>
+            <a:r>
+              <a:rPr/>
+              <a:t>druga jest traktowana jak wykładnik.</a:t>
+            </a:r>
+            <a:endParaRPr/>
+          </a:p>
+        </p:txBody>
+      </p:sp>
+    </p:spTree>
+  </p:cSld>
+  <p:clrMapOvr>
+    <a:masterClrMapping/>
+  </p:clrMapOvr>
+  <mc:AlternateContent xmlns:mc="http://schemas.openxmlformats.org/markup-compatibility/2006">
+    <mc:Choice xmlns:p159="http://schemas.microsoft.com/office/powerpoint/2015/09/main" xmlns:p14="http://schemas.microsoft.com/office/powerpoint/2010/main" Requires="p159">
+      <p:transition p14:dur="2000" advClick="1"/>
+    </mc:Choice>
+    <mc:Fallback>
+      <p:transition advClick="1"/>
+    </mc:Fallback>
+  </mc:AlternateContent>
+</p:sld>
+</file>
+
+<file path=ppt/slides/slide14.xml><?xml version="1.0" encoding="utf-8"?>
+<p:sld xmlns:a="http://schemas.openxmlformats.org/drawingml/2006/main" xmlns:r="http://schemas.openxmlformats.org/officeDocument/2006/relationships" xmlns:p="http://schemas.openxmlformats.org/presentationml/2006/main" xmlns:m="http://schemas.openxmlformats.org/officeDocument/2006/math" xmlns:w="http://schemas.openxmlformats.org/wordprocessingml/2006/main" showMasterPhAnim="0" show="1">
+  <p:cSld name="">
+    <p:spTree>
+      <p:nvGrpSpPr>
+        <p:cNvPr id="1" name=""/>
+        <p:cNvGrpSpPr/>
+        <p:nvPr/>
+      </p:nvGrpSpPr>
+      <p:grpSpPr bwMode="auto">
+        <a:xfrm>
+          <a:off x="0" y="0"/>
+          <a:ext cx="0" cy="0"/>
+          <a:chOff x="0" y="0"/>
+          <a:chExt cx="0" cy="0"/>
+        </a:xfrm>
+      </p:grpSpPr>
+      <p:sp>
+        <p:nvSpPr>
+          <p:cNvPr id="1144049806" name="Заголовок 1"/>
+          <p:cNvSpPr>
+            <a:spLocks noGrp="1"/>
+          </p:cNvSpPr>
+          <p:nvPr>
+            <p:ph type="title"/>
+          </p:nvPr>
+        </p:nvSpPr>
+        <p:spPr bwMode="auto"/>
+        <p:txBody>
+          <a:bodyPr/>
+          <a:lstStyle/>
+          <a:p>
+            <a:pPr>
+              <a:defRPr/>
+            </a:pPr>
+            <a:r>
+              <a:rPr/>
+              <a:t>Przeciążanie funkcji</a:t>
+            </a:r>
+            <a:endParaRPr/>
+          </a:p>
+        </p:txBody>
+      </p:sp>
+      <p:sp>
+        <p:nvSpPr>
+          <p:cNvPr id="305719956" name="Объект 2"/>
+          <p:cNvSpPr>
+            <a:spLocks noGrp="1"/>
+          </p:cNvSpPr>
+          <p:nvPr>
+            <p:ph idx="1"/>
+          </p:nvPr>
+        </p:nvSpPr>
+        <p:spPr bwMode="auto"/>
+        <p:txBody>
+          <a:bodyPr vertOverflow="overflow" horzOverflow="overflow" vert="horz" wrap="square" lIns="91440" tIns="45720" rIns="91440" bIns="45720" numCol="1" spcCol="0" rtlCol="0" fromWordArt="0" anchor="t" anchorCtr="0" forceAA="0" upright="0" compatLnSpc="0">
+            <a:normAutofit fontScale="85000" lnSpcReduction="3000"/>
+          </a:bodyPr>
+          <a:lstStyle/>
+          <a:p>
+            <a:pPr>
+              <a:defRPr/>
+            </a:pPr>
+            <a:r>
+              <a:rPr/>
+              <a:t>Python zakłada, że dana nazwa jest przypisana do jednego obiektu.</a:t>
+            </a:r>
+            <a:endParaRPr/>
+          </a:p>
+          <a:p>
+            <a:pPr>
+              <a:defRPr/>
+            </a:pPr>
+            <a:r>
+              <a:rPr/>
+              <a:t>Przeciążenie musimy realizować </a:t>
+            </a:r>
+            <a:r>
+              <a:rPr/>
+              <a:t>przy pomocy argumentów domyślnych i odwołań do parametrów przez nazwy.</a:t>
+            </a:r>
+            <a:endParaRPr/>
+          </a:p>
+          <a:p>
+            <a:pPr>
+              <a:defRPr/>
+            </a:pPr>
+            <a:r>
+              <a:rPr/>
+              <a:t>Parametry pozycyjne muszą znajdować się przed parametrami z nazwami</a:t>
+            </a:r>
+            <a:endParaRPr/>
+          </a:p>
+          <a:p>
+            <a:pPr>
+              <a:defRPr/>
+            </a:pPr>
+            <a:r>
+              <a:rPr/>
+              <a:t>Python pozwala na stworzenie funkcji o zmiennej liczbie argumentów – oznaczamy to używając znacznika **</a:t>
+            </a:r>
+            <a:endParaRPr/>
+          </a:p>
+          <a:p>
+            <a:pPr>
+              <a:defRPr/>
+            </a:pPr>
+            <a:r>
+              <a:rPr/>
+              <a:t>** tworzy słownik z argumentów podanych na końcu</a:t>
+            </a:r>
+            <a:endParaRPr/>
+          </a:p>
+          <a:p>
+            <a:pPr>
+              <a:defRPr/>
+            </a:pPr>
+            <a:endParaRPr/>
+          </a:p>
+          <a:p>
+            <a:pPr>
+              <a:defRPr/>
+            </a:pPr>
+            <a:endParaRPr/>
+          </a:p>
+        </p:txBody>
+      </p:sp>
+      <p:sp>
+        <p:nvSpPr>
+          <p:cNvPr id="219838185" name=""/>
+          <p:cNvSpPr txBox="1"/>
+          <p:nvPr/>
+        </p:nvSpPr>
+        <p:spPr bwMode="auto">
+          <a:xfrm flipH="0" flipV="0">
+            <a:off x="8207075" y="5498522"/>
+            <a:ext cx="3169509" cy="366120"/>
+          </a:xfrm>
+          <a:prstGeom prst="rect">
+            <a:avLst/>
+          </a:prstGeom>
+          <a:noFill/>
+        </p:spPr>
+        <p:txBody>
+          <a:bodyPr vertOverflow="overflow" horzOverflow="overflow" vert="horz" wrap="square" lIns="91440" tIns="45720" rIns="91440" bIns="45720" numCol="1" spcCol="0" rtlCol="0" fromWordArt="0" anchor="t" anchorCtr="0" forceAA="0" upright="0" compatLnSpc="0">
+            <a:spAutoFit/>
+          </a:bodyPr>
+          <a:p>
+            <a:pPr>
+              <a:defRPr/>
+            </a:pPr>
+            <a:r>
+              <a:rPr>
+                <a:latin typeface="Nimbus Mono PS"/>
+                <a:ea typeface="Nimbus Mono PS"/>
+                <a:cs typeface="Nimbus Mono PS"/>
+              </a:rPr>
+              <a:t>overloadExample.py</a:t>
+            </a:r>
+            <a:endParaRPr/>
+          </a:p>
+        </p:txBody>
+      </p:sp>
+    </p:spTree>
+  </p:cSld>
+  <p:clrMapOvr>
+    <a:masterClrMapping/>
+  </p:clrMapOvr>
+  <mc:AlternateContent xmlns:mc="http://schemas.openxmlformats.org/markup-compatibility/2006">
+    <mc:Choice xmlns:p159="http://schemas.microsoft.com/office/powerpoint/2015/09/main" xmlns:p14="http://schemas.microsoft.com/office/powerpoint/2010/main" Requires="p159">
+      <p:transition p14:dur="2000" advClick="1"/>
+    </mc:Choice>
+    <mc:Fallback>
+      <p:transition advClick="1"/>
+    </mc:Fallback>
+  </mc:AlternateContent>
+</p:sld>
+</file>
+
+<file path=ppt/slides/slide15.xml><?xml version="1.0" encoding="utf-8"?>
 <p:sld xmlns:a="http://schemas.openxmlformats.org/drawingml/2006/main" xmlns:r="http://schemas.openxmlformats.org/officeDocument/2006/relationships" xmlns:p="http://schemas.openxmlformats.org/presentationml/2006/main" xmlns:m="http://schemas.openxmlformats.org/officeDocument/2006/math" xmlns:w="http://schemas.openxmlformats.org/wordprocessingml/2006/main" showMasterPhAnim="0" show="1">
   <p:cSld name="">
     <p:spTree>
@@ -10291,7 +10725,7 @@
 </p:sld>
 </file>
 
-<file path=ppt/slides/slide14.xml><?xml version="1.0" encoding="utf-8"?>
+<file path=ppt/slides/slide16.xml><?xml version="1.0" encoding="utf-8"?>
 <p:sld xmlns:a="http://schemas.openxmlformats.org/drawingml/2006/main" xmlns:r="http://schemas.openxmlformats.org/officeDocument/2006/relationships" xmlns:p="http://schemas.openxmlformats.org/presentationml/2006/main" xmlns:m="http://schemas.openxmlformats.org/officeDocument/2006/math" xmlns:w="http://schemas.openxmlformats.org/wordprocessingml/2006/main" showMasterPhAnim="0" show="1">
   <p:cSld name="">
     <p:spTree>
@@ -10386,7 +10820,7 @@
 </p:sld>
 </file>
 
-<file path=ppt/slides/slide15.xml><?xml version="1.0" encoding="utf-8"?>
+<file path=ppt/slides/slide17.xml><?xml version="1.0" encoding="utf-8"?>
 <p:sld xmlns:a="http://schemas.openxmlformats.org/drawingml/2006/main" xmlns:r="http://schemas.openxmlformats.org/officeDocument/2006/relationships" xmlns:p="http://schemas.openxmlformats.org/presentationml/2006/main" xmlns:m="http://schemas.openxmlformats.org/officeDocument/2006/math" xmlns:w="http://schemas.openxmlformats.org/wordprocessingml/2006/main" showMasterPhAnim="0" show="1">
   <p:cSld name="">
     <p:spTree>
@@ -10555,7 +10989,7 @@
 </p:sld>
 </file>
 
-<file path=ppt/slides/slide16.xml><?xml version="1.0" encoding="utf-8"?>
+<file path=ppt/slides/slide18.xml><?xml version="1.0" encoding="utf-8"?>
 <p:sld xmlns:a="http://schemas.openxmlformats.org/drawingml/2006/main" xmlns:r="http://schemas.openxmlformats.org/officeDocument/2006/relationships" xmlns:p="http://schemas.openxmlformats.org/presentationml/2006/main" xmlns:m="http://schemas.openxmlformats.org/officeDocument/2006/math" xmlns:w="http://schemas.openxmlformats.org/wordprocessingml/2006/main" showMasterPhAnim="0" show="1">
   <p:cSld name="">
     <p:spTree>
@@ -10714,7 +11148,7 @@
 </p:sld>
 </file>
 
-<file path=ppt/slides/slide17.xml><?xml version="1.0" encoding="utf-8"?>
+<file path=ppt/slides/slide19.xml><?xml version="1.0" encoding="utf-8"?>
 <p:sld xmlns:a="http://schemas.openxmlformats.org/drawingml/2006/main" xmlns:r="http://schemas.openxmlformats.org/officeDocument/2006/relationships" xmlns:p="http://schemas.openxmlformats.org/presentationml/2006/main" xmlns:m="http://schemas.openxmlformats.org/officeDocument/2006/math" xmlns:w="http://schemas.openxmlformats.org/wordprocessingml/2006/main" showMasterPhAnim="0" show="1">
   <p:cSld name="">
     <p:spTree>
@@ -10971,7 +11405,160 @@
 </p:sld>
 </file>
 
-<file path=ppt/slides/slide18.xml><?xml version="1.0" encoding="utf-8"?>
+<file path=ppt/slides/slide2.xml><?xml version="1.0" encoding="utf-8"?>
+<p:sld xmlns:a="http://schemas.openxmlformats.org/drawingml/2006/main" xmlns:r="http://schemas.openxmlformats.org/officeDocument/2006/relationships" xmlns:p="http://schemas.openxmlformats.org/presentationml/2006/main" xmlns:m="http://schemas.openxmlformats.org/officeDocument/2006/math" xmlns:w="http://schemas.openxmlformats.org/wordprocessingml/2006/main" showMasterPhAnim="0" show="1">
+  <p:cSld name="">
+    <p:spTree>
+      <p:nvGrpSpPr>
+        <p:cNvPr id="1" name=""/>
+        <p:cNvGrpSpPr/>
+        <p:nvPr/>
+      </p:nvGrpSpPr>
+      <p:grpSpPr bwMode="auto">
+        <a:xfrm>
+          <a:off x="0" y="0"/>
+          <a:ext cx="0" cy="0"/>
+          <a:chOff x="0" y="0"/>
+          <a:chExt cx="0" cy="0"/>
+        </a:xfrm>
+      </p:grpSpPr>
+      <p:sp>
+        <p:nvSpPr>
+          <p:cNvPr id="136928690" name="Заголовок 1"/>
+          <p:cNvSpPr>
+            <a:spLocks noGrp="1"/>
+          </p:cNvSpPr>
+          <p:nvPr>
+            <p:ph type="title"/>
+          </p:nvPr>
+        </p:nvSpPr>
+        <p:spPr bwMode="auto"/>
+        <p:txBody>
+          <a:bodyPr/>
+          <a:lstStyle/>
+          <a:p>
+            <a:pPr>
+              <a:defRPr/>
+            </a:pPr>
+            <a:r>
+              <a:rPr lang="pl-PL"/>
+              <a:t>Poznaj węża</a:t>
+            </a:r>
+            <a:endParaRPr lang="pl-PL"/>
+          </a:p>
+        </p:txBody>
+      </p:sp>
+      <p:sp>
+        <p:nvSpPr>
+          <p:cNvPr id="1794408519" name="Объект 2"/>
+          <p:cNvSpPr>
+            <a:spLocks noGrp="1"/>
+          </p:cNvSpPr>
+          <p:nvPr>
+            <p:ph idx="1"/>
+          </p:nvPr>
+        </p:nvSpPr>
+        <p:spPr bwMode="auto"/>
+        <p:txBody>
+          <a:bodyPr/>
+          <a:lstStyle/>
+          <a:p>
+            <a:pPr>
+              <a:defRPr/>
+            </a:pPr>
+            <a:r>
+              <a:rPr lang="pl-PL"/>
+              <a:t>Python to język programowania</a:t>
+            </a:r>
+            <a:endParaRPr lang="pl-PL"/>
+          </a:p>
+          <a:p>
+            <a:pPr lvl="1">
+              <a:defRPr/>
+            </a:pPr>
+            <a:r>
+              <a:rPr lang="pl-PL"/>
+              <a:t>Interpretowany</a:t>
+            </a:r>
+            <a:endParaRPr lang="pl-PL"/>
+          </a:p>
+          <a:p>
+            <a:pPr lvl="1">
+              <a:defRPr/>
+            </a:pPr>
+            <a:r>
+              <a:rPr lang="pl-PL"/>
+              <a:t>Wysokiego poziomu</a:t>
+            </a:r>
+            <a:endParaRPr lang="pl-PL"/>
+          </a:p>
+          <a:p>
+            <a:pPr lvl="1">
+              <a:defRPr/>
+            </a:pPr>
+            <a:r>
+              <a:rPr lang="pl-PL"/>
+              <a:t>Dynamicznie typowany</a:t>
+            </a:r>
+            <a:endParaRPr lang="pl-PL"/>
+          </a:p>
+          <a:p>
+            <a:pPr lvl="1">
+              <a:defRPr/>
+            </a:pPr>
+            <a:r>
+              <a:rPr lang="pl-PL"/>
+              <a:t>Z automatycznym zarządzaniem pamięcią</a:t>
+            </a:r>
+            <a:endParaRPr lang="pl-PL"/>
+          </a:p>
+          <a:p>
+            <a:pPr lvl="1">
+              <a:defRPr/>
+            </a:pPr>
+            <a:endParaRPr lang="pl-PL"/>
+          </a:p>
+        </p:txBody>
+      </p:sp>
+      <p:pic>
+        <p:nvPicPr>
+          <p:cNvPr id="1517184247" name=""/>
+          <p:cNvPicPr>
+            <a:picLocks noChangeAspect="1"/>
+          </p:cNvPicPr>
+          <p:nvPr/>
+        </p:nvPicPr>
+        <p:blipFill>
+          <a:blip r:embed="rId3"/>
+          <a:stretch/>
+        </p:blipFill>
+        <p:spPr bwMode="auto">
+          <a:xfrm flipH="0" flipV="0">
+            <a:off x="4354913" y="3863185"/>
+            <a:ext cx="2920845" cy="2920845"/>
+          </a:xfrm>
+          <a:prstGeom prst="rect">
+            <a:avLst/>
+          </a:prstGeom>
+        </p:spPr>
+      </p:pic>
+    </p:spTree>
+  </p:cSld>
+  <p:clrMapOvr>
+    <a:masterClrMapping/>
+  </p:clrMapOvr>
+  <mc:AlternateContent xmlns:mc="http://schemas.openxmlformats.org/markup-compatibility/2006">
+    <mc:Choice xmlns:p159="http://schemas.microsoft.com/office/powerpoint/2015/09/main" xmlns:p14="http://schemas.microsoft.com/office/powerpoint/2010/main" Requires="p159">
+      <p:transition p14:dur="2000" advClick="1"/>
+    </mc:Choice>
+    <mc:Fallback>
+      <p:transition advClick="1"/>
+    </mc:Fallback>
+  </mc:AlternateContent>
+</p:sld>
+</file>
+
+<file path=ppt/slides/slide20.xml><?xml version="1.0" encoding="utf-8"?>
 <p:sld xmlns:a="http://schemas.openxmlformats.org/drawingml/2006/main" xmlns:r="http://schemas.openxmlformats.org/officeDocument/2006/relationships" xmlns:p="http://schemas.openxmlformats.org/presentationml/2006/main" xmlns:m="http://schemas.openxmlformats.org/officeDocument/2006/math" xmlns:w="http://schemas.openxmlformats.org/wordprocessingml/2006/main" showMasterPhAnim="0" show="1">
   <p:cSld name="">
     <p:spTree>
@@ -11234,7 +11821,7 @@
 </p:sld>
 </file>
 
-<file path=ppt/slides/slide19.xml><?xml version="1.0" encoding="utf-8"?>
+<file path=ppt/slides/slide21.xml><?xml version="1.0" encoding="utf-8"?>
 <p:sld xmlns:a="http://schemas.openxmlformats.org/drawingml/2006/main" xmlns:r="http://schemas.openxmlformats.org/officeDocument/2006/relationships" xmlns:p="http://schemas.openxmlformats.org/presentationml/2006/main" xmlns:m="http://schemas.openxmlformats.org/officeDocument/2006/math" xmlns:w="http://schemas.openxmlformats.org/wordprocessingml/2006/main" showMasterPhAnim="0" show="1">
   <p:cSld name="">
     <p:spTree>
@@ -11445,160 +12032,7 @@
 </p:sld>
 </file>
 
-<file path=ppt/slides/slide2.xml><?xml version="1.0" encoding="utf-8"?>
-<p:sld xmlns:a="http://schemas.openxmlformats.org/drawingml/2006/main" xmlns:r="http://schemas.openxmlformats.org/officeDocument/2006/relationships" xmlns:p="http://schemas.openxmlformats.org/presentationml/2006/main" xmlns:m="http://schemas.openxmlformats.org/officeDocument/2006/math" xmlns:w="http://schemas.openxmlformats.org/wordprocessingml/2006/main" showMasterPhAnim="0" show="1">
-  <p:cSld name="">
-    <p:spTree>
-      <p:nvGrpSpPr>
-        <p:cNvPr id="1" name=""/>
-        <p:cNvGrpSpPr/>
-        <p:nvPr/>
-      </p:nvGrpSpPr>
-      <p:grpSpPr bwMode="auto">
-        <a:xfrm>
-          <a:off x="0" y="0"/>
-          <a:ext cx="0" cy="0"/>
-          <a:chOff x="0" y="0"/>
-          <a:chExt cx="0" cy="0"/>
-        </a:xfrm>
-      </p:grpSpPr>
-      <p:sp>
-        <p:nvSpPr>
-          <p:cNvPr id="136928690" name="Заголовок 1"/>
-          <p:cNvSpPr>
-            <a:spLocks noGrp="1"/>
-          </p:cNvSpPr>
-          <p:nvPr>
-            <p:ph type="title"/>
-          </p:nvPr>
-        </p:nvSpPr>
-        <p:spPr bwMode="auto"/>
-        <p:txBody>
-          <a:bodyPr/>
-          <a:lstStyle/>
-          <a:p>
-            <a:pPr>
-              <a:defRPr/>
-            </a:pPr>
-            <a:r>
-              <a:rPr lang="pl-PL"/>
-              <a:t>Poznaj węża</a:t>
-            </a:r>
-            <a:endParaRPr lang="pl-PL"/>
-          </a:p>
-        </p:txBody>
-      </p:sp>
-      <p:sp>
-        <p:nvSpPr>
-          <p:cNvPr id="1794408519" name="Объект 2"/>
-          <p:cNvSpPr>
-            <a:spLocks noGrp="1"/>
-          </p:cNvSpPr>
-          <p:nvPr>
-            <p:ph idx="1"/>
-          </p:nvPr>
-        </p:nvSpPr>
-        <p:spPr bwMode="auto"/>
-        <p:txBody>
-          <a:bodyPr/>
-          <a:lstStyle/>
-          <a:p>
-            <a:pPr>
-              <a:defRPr/>
-            </a:pPr>
-            <a:r>
-              <a:rPr lang="pl-PL"/>
-              <a:t>Python to język programowania</a:t>
-            </a:r>
-            <a:endParaRPr lang="pl-PL"/>
-          </a:p>
-          <a:p>
-            <a:pPr lvl="1">
-              <a:defRPr/>
-            </a:pPr>
-            <a:r>
-              <a:rPr lang="pl-PL"/>
-              <a:t>Interpretowany</a:t>
-            </a:r>
-            <a:endParaRPr lang="pl-PL"/>
-          </a:p>
-          <a:p>
-            <a:pPr lvl="1">
-              <a:defRPr/>
-            </a:pPr>
-            <a:r>
-              <a:rPr lang="pl-PL"/>
-              <a:t>Wysokiego poziomu</a:t>
-            </a:r>
-            <a:endParaRPr lang="pl-PL"/>
-          </a:p>
-          <a:p>
-            <a:pPr lvl="1">
-              <a:defRPr/>
-            </a:pPr>
-            <a:r>
-              <a:rPr lang="pl-PL"/>
-              <a:t>Dynamicznie typowany</a:t>
-            </a:r>
-            <a:endParaRPr lang="pl-PL"/>
-          </a:p>
-          <a:p>
-            <a:pPr lvl="1">
-              <a:defRPr/>
-            </a:pPr>
-            <a:r>
-              <a:rPr lang="pl-PL"/>
-              <a:t>Z automatycznym zarządzaniem pamięcią</a:t>
-            </a:r>
-            <a:endParaRPr lang="pl-PL"/>
-          </a:p>
-          <a:p>
-            <a:pPr lvl="1">
-              <a:defRPr/>
-            </a:pPr>
-            <a:endParaRPr lang="pl-PL"/>
-          </a:p>
-        </p:txBody>
-      </p:sp>
-      <p:pic>
-        <p:nvPicPr>
-          <p:cNvPr id="1517184247" name=""/>
-          <p:cNvPicPr>
-            <a:picLocks noChangeAspect="1"/>
-          </p:cNvPicPr>
-          <p:nvPr/>
-        </p:nvPicPr>
-        <p:blipFill>
-          <a:blip r:embed="rId3"/>
-          <a:stretch/>
-        </p:blipFill>
-        <p:spPr bwMode="auto">
-          <a:xfrm flipH="0" flipV="0">
-            <a:off x="4354913" y="3863185"/>
-            <a:ext cx="2920845" cy="2920845"/>
-          </a:xfrm>
-          <a:prstGeom prst="rect">
-            <a:avLst/>
-          </a:prstGeom>
-        </p:spPr>
-      </p:pic>
-    </p:spTree>
-  </p:cSld>
-  <p:clrMapOvr>
-    <a:masterClrMapping/>
-  </p:clrMapOvr>
-  <mc:AlternateContent xmlns:mc="http://schemas.openxmlformats.org/markup-compatibility/2006">
-    <mc:Choice xmlns:p159="http://schemas.microsoft.com/office/powerpoint/2015/09/main" xmlns:p14="http://schemas.microsoft.com/office/powerpoint/2010/main" Requires="p159">
-      <p:transition p14:dur="2000" advClick="1"/>
-    </mc:Choice>
-    <mc:Fallback>
-      <p:transition advClick="1"/>
-    </mc:Fallback>
-  </mc:AlternateContent>
-</p:sld>
-</file>
-
-<file path=ppt/slides/slide20.xml><?xml version="1.0" encoding="utf-8"?>
+<file path=ppt/slides/slide22.xml><?xml version="1.0" encoding="utf-8"?>
 <p:sld xmlns:a="http://schemas.openxmlformats.org/drawingml/2006/main" xmlns:r="http://schemas.openxmlformats.org/officeDocument/2006/relationships" xmlns:p="http://schemas.openxmlformats.org/presentationml/2006/main" xmlns:m="http://schemas.openxmlformats.org/officeDocument/2006/math" xmlns:w="http://schemas.openxmlformats.org/wordprocessingml/2006/main" showMasterPhAnim="0" show="1">
   <p:cSld name="">
     <p:spTree>
@@ -11819,7 +12253,7 @@
 </p:sld>
 </file>
 
-<file path=ppt/slides/slide21.xml><?xml version="1.0" encoding="utf-8"?>
+<file path=ppt/slides/slide23.xml><?xml version="1.0" encoding="utf-8"?>
 <p:sld xmlns:a="http://schemas.openxmlformats.org/drawingml/2006/main" xmlns:r="http://schemas.openxmlformats.org/officeDocument/2006/relationships" xmlns:p="http://schemas.openxmlformats.org/presentationml/2006/main" xmlns:m="http://schemas.openxmlformats.org/officeDocument/2006/math" xmlns:w="http://schemas.openxmlformats.org/wordprocessingml/2006/main" showMasterPhAnim="0" show="1">
   <p:cSld name="">
     <p:spTree>
@@ -12057,7 +12491,7 @@
 </p:sld>
 </file>
 
-<file path=ppt/slides/slide22.xml><?xml version="1.0" encoding="utf-8"?>
+<file path=ppt/slides/slide24.xml><?xml version="1.0" encoding="utf-8"?>
 <p:sld xmlns:a="http://schemas.openxmlformats.org/drawingml/2006/main" xmlns:r="http://schemas.openxmlformats.org/officeDocument/2006/relationships" xmlns:p="http://schemas.openxmlformats.org/presentationml/2006/main" xmlns:m="http://schemas.openxmlformats.org/officeDocument/2006/math" xmlns:w="http://schemas.openxmlformats.org/wordprocessingml/2006/main" showMasterPhAnim="0" show="1">
   <p:cSld name="">
     <p:spTree>
@@ -12189,7 +12623,7 @@
 </p:sld>
 </file>
 
-<file path=ppt/slides/slide23.xml><?xml version="1.0" encoding="utf-8"?>
+<file path=ppt/slides/slide25.xml><?xml version="1.0" encoding="utf-8"?>
 <p:sld xmlns:a="http://schemas.openxmlformats.org/drawingml/2006/main" xmlns:r="http://schemas.openxmlformats.org/officeDocument/2006/relationships" xmlns:p="http://schemas.openxmlformats.org/presentationml/2006/main" xmlns:m="http://schemas.openxmlformats.org/officeDocument/2006/math" xmlns:w="http://schemas.openxmlformats.org/wordprocessingml/2006/main" showMasterPhAnim="0" show="1">
   <p:cSld name="">
     <p:spTree>
@@ -12424,274 +12858,6 @@
 </p:sld>
 </file>
 
-<file path=ppt/slides/slide24.xml><?xml version="1.0" encoding="utf-8"?>
-<p:sld xmlns:a="http://schemas.openxmlformats.org/drawingml/2006/main" xmlns:r="http://schemas.openxmlformats.org/officeDocument/2006/relationships" xmlns:p="http://schemas.openxmlformats.org/presentationml/2006/main" xmlns:m="http://schemas.openxmlformats.org/officeDocument/2006/math" xmlns:w="http://schemas.openxmlformats.org/wordprocessingml/2006/main" showMasterPhAnim="0" show="1">
-  <p:cSld name="">
-    <p:spTree>
-      <p:nvGrpSpPr>
-        <p:cNvPr id="1" name=""/>
-        <p:cNvGrpSpPr/>
-        <p:nvPr/>
-      </p:nvGrpSpPr>
-      <p:grpSpPr bwMode="auto">
-        <a:xfrm>
-          <a:off x="0" y="0"/>
-          <a:ext cx="0" cy="0"/>
-          <a:chOff x="0" y="0"/>
-          <a:chExt cx="0" cy="0"/>
-        </a:xfrm>
-      </p:grpSpPr>
-      <p:sp>
-        <p:nvSpPr>
-          <p:cNvPr id="748972936" name="Заголовок 1"/>
-          <p:cNvSpPr>
-            <a:spLocks noGrp="1"/>
-          </p:cNvSpPr>
-          <p:nvPr>
-            <p:ph type="title"/>
-          </p:nvPr>
-        </p:nvSpPr>
-        <p:spPr bwMode="auto"/>
-        <p:txBody>
-          <a:bodyPr/>
-          <a:lstStyle/>
-          <a:p>
-            <a:pPr>
-              <a:defRPr/>
-            </a:pPr>
-            <a:r>
-              <a:rPr/>
-              <a:t>Zalety i wady Pythona</a:t>
-            </a:r>
-            <a:endParaRPr/>
-          </a:p>
-        </p:txBody>
-      </p:sp>
-    </p:spTree>
-  </p:cSld>
-  <p:clrMapOvr>
-    <a:masterClrMapping/>
-  </p:clrMapOvr>
-  <mc:AlternateContent xmlns:mc="http://schemas.openxmlformats.org/markup-compatibility/2006">
-    <mc:Choice xmlns:p159="http://schemas.microsoft.com/office/powerpoint/2015/09/main" xmlns:p14="http://schemas.microsoft.com/office/powerpoint/2010/main" Requires="p159">
-      <p:transition p14:dur="2000" advClick="1"/>
-    </mc:Choice>
-    <mc:Fallback>
-      <p:transition advClick="1"/>
-    </mc:Fallback>
-  </mc:AlternateContent>
-</p:sld>
-</file>
-
-<file path=ppt/slides/slide25.xml><?xml version="1.0" encoding="utf-8"?>
-<p:sld xmlns:a="http://schemas.openxmlformats.org/drawingml/2006/main" xmlns:r="http://schemas.openxmlformats.org/officeDocument/2006/relationships" xmlns:p="http://schemas.openxmlformats.org/presentationml/2006/main" xmlns:m="http://schemas.openxmlformats.org/officeDocument/2006/math" xmlns:w="http://schemas.openxmlformats.org/wordprocessingml/2006/main" showMasterPhAnim="0" show="1">
-  <p:cSld name="">
-    <p:spTree>
-      <p:nvGrpSpPr>
-        <p:cNvPr id="1" name=""/>
-        <p:cNvGrpSpPr/>
-        <p:nvPr/>
-      </p:nvGrpSpPr>
-      <p:grpSpPr bwMode="auto">
-        <a:xfrm>
-          <a:off x="0" y="0"/>
-          <a:ext cx="0" cy="0"/>
-          <a:chOff x="0" y="0"/>
-          <a:chExt cx="0" cy="0"/>
-        </a:xfrm>
-      </p:grpSpPr>
-      <p:sp>
-        <p:nvSpPr>
-          <p:cNvPr id="574782330" name="Заголовок 1"/>
-          <p:cNvSpPr>
-            <a:spLocks noGrp="1"/>
-          </p:cNvSpPr>
-          <p:nvPr>
-            <p:ph type="title"/>
-          </p:nvPr>
-        </p:nvSpPr>
-        <p:spPr bwMode="auto"/>
-        <p:txBody>
-          <a:bodyPr/>
-          <a:lstStyle/>
-          <a:p>
-            <a:pPr>
-              <a:defRPr/>
-            </a:pPr>
-            <a:r>
-              <a:rPr/>
-              <a:t>Zalety i wady</a:t>
-            </a:r>
-            <a:r>
-              <a:rPr/>
-              <a:t> Pythona</a:t>
-            </a:r>
-            <a:endParaRPr/>
-          </a:p>
-        </p:txBody>
-      </p:sp>
-      <p:sp>
-        <p:nvSpPr>
-          <p:cNvPr id="908420451" name="Объект 2"/>
-          <p:cNvSpPr>
-            <a:spLocks noGrp="1"/>
-          </p:cNvSpPr>
-          <p:nvPr>
-            <p:ph idx="1"/>
-          </p:nvPr>
-        </p:nvSpPr>
-        <p:spPr bwMode="auto"/>
-        <p:txBody>
-          <a:bodyPr vertOverflow="overflow" horzOverflow="overflow" vert="horz" wrap="square" lIns="91440" tIns="45720" rIns="91440" bIns="45720" numCol="1" spcCol="0" rtlCol="0" fromWordArt="0" anchor="t" anchorCtr="0" forceAA="0" upright="0" compatLnSpc="0">
-            <a:normAutofit fontScale="85000" lnSpcReduction="3000"/>
-          </a:bodyPr>
-          <a:lstStyle/>
-          <a:p>
-            <a:pPr marL="0" indent="0">
-              <a:buFont typeface="Arial"/>
-              <a:buNone/>
-              <a:defRPr/>
-            </a:pPr>
-            <a:r>
-              <a:rPr lang="pl-PL"/>
-              <a:t>+ Przenośność</a:t>
-            </a:r>
-            <a:endParaRPr lang="pl-PL"/>
-          </a:p>
-          <a:p>
-            <a:pPr marL="0" indent="0">
-              <a:buFont typeface="Arial"/>
-              <a:buNone/>
-              <a:defRPr/>
-            </a:pPr>
-            <a:r>
-              <a:rPr lang="pl-PL"/>
-              <a:t>+ Zarządzanie pamięcią</a:t>
-            </a:r>
-            <a:endParaRPr lang="pl-PL"/>
-          </a:p>
-          <a:p>
-            <a:pPr marL="0" indent="0">
-              <a:buFont typeface="Arial"/>
-              <a:buNone/>
-              <a:defRPr/>
-            </a:pPr>
-            <a:r>
-              <a:rPr lang="pl-PL"/>
-              <a:t>+ Łatwość użycia</a:t>
-            </a:r>
-            <a:endParaRPr lang="pl-PL"/>
-          </a:p>
-          <a:p>
-            <a:pPr marL="0" indent="0">
-              <a:buFont typeface="Arial"/>
-              <a:buNone/>
-              <a:defRPr/>
-            </a:pPr>
-            <a:r>
-              <a:rPr lang="pl-PL"/>
-              <a:t>+ Dynamiczne typowanie</a:t>
-            </a:r>
-            <a:endParaRPr lang="pl-PL"/>
-          </a:p>
-          <a:p>
-            <a:pPr marL="0" indent="0">
-              <a:buFont typeface="Arial"/>
-              <a:buNone/>
-              <a:defRPr/>
-            </a:pPr>
-            <a:r>
-              <a:rPr lang="pl-PL"/>
-              <a:t>+ Odwołania po nazwach</a:t>
-            </a:r>
-            <a:endParaRPr lang="pl-PL"/>
-          </a:p>
-          <a:p>
-            <a:pPr marL="0" indent="0">
-              <a:buFont typeface="Arial"/>
-              <a:buNone/>
-              <a:defRPr/>
-            </a:pPr>
-            <a:r>
-              <a:rPr lang="pl-PL"/>
-              <a:t>+ Odporność na błędy (wyjątki, segmentation fault)</a:t>
-            </a:r>
-            <a:endParaRPr lang="pl-PL"/>
-          </a:p>
-          <a:p>
-            <a:pPr marL="0" indent="0">
-              <a:buFont typeface="Arial"/>
-              <a:buNone/>
-              <a:defRPr/>
-            </a:pPr>
-            <a:endParaRPr lang="pl-PL"/>
-          </a:p>
-          <a:p>
-            <a:pPr>
-              <a:buFont typeface="Arial"/>
-              <a:buChar char="–"/>
-              <a:defRPr/>
-            </a:pPr>
-            <a:r>
-              <a:rPr lang="pl-PL"/>
-              <a:t>Prędkość</a:t>
-            </a:r>
-            <a:endParaRPr lang="pl-PL"/>
-          </a:p>
-          <a:p>
-            <a:pPr>
-              <a:buFont typeface="Arial"/>
-              <a:buChar char="–"/>
-              <a:defRPr/>
-            </a:pPr>
-            <a:r>
-              <a:rPr lang="pl-PL"/>
-              <a:t>Złe nawyki</a:t>
-            </a:r>
-            <a:endParaRPr lang="pl-PL"/>
-          </a:p>
-          <a:p>
-            <a:pPr>
-              <a:buFont typeface="Arial"/>
-              <a:buChar char="–"/>
-              <a:defRPr/>
-            </a:pPr>
-            <a:r>
-              <a:rPr lang="pl-PL"/>
-              <a:t>Wymagania sprzętowe</a:t>
-            </a:r>
-            <a:endParaRPr lang="pl-PL"/>
-          </a:p>
-          <a:p>
-            <a:pPr>
-              <a:buFont typeface="Arial"/>
-              <a:buChar char="–"/>
-              <a:defRPr/>
-            </a:pPr>
-            <a:r>
-              <a:rPr lang="pl-PL"/>
-              <a:t>Podatność na błędy (dynamiczne typowanie)</a:t>
-            </a:r>
-            <a:endParaRPr lang="pl-PL"/>
-          </a:p>
-        </p:txBody>
-      </p:sp>
-    </p:spTree>
-  </p:cSld>
-  <p:clrMapOvr>
-    <a:masterClrMapping/>
-  </p:clrMapOvr>
-  <mc:AlternateContent xmlns:mc="http://schemas.openxmlformats.org/markup-compatibility/2006">
-    <mc:Choice xmlns:p159="http://schemas.microsoft.com/office/powerpoint/2015/09/main" xmlns:p14="http://schemas.microsoft.com/office/powerpoint/2010/main" Requires="p159">
-      <p:transition p14:dur="2000" advClick="1"/>
-    </mc:Choice>
-    <mc:Fallback>
-      <p:transition advClick="1"/>
-    </mc:Fallback>
-  </mc:AlternateContent>
-</p:sld>
-</file>
-
 <file path=ppt/slides/slide26.xml><?xml version="1.0" encoding="utf-8"?>
 <p:sld xmlns:a="http://schemas.openxmlformats.org/drawingml/2006/main" xmlns:r="http://schemas.openxmlformats.org/officeDocument/2006/relationships" xmlns:p="http://schemas.openxmlformats.org/presentationml/2006/main" xmlns:m="http://schemas.openxmlformats.org/officeDocument/2006/math" xmlns:w="http://schemas.openxmlformats.org/wordprocessingml/2006/main" showMasterPhAnim="0" show="1">
   <p:cSld name="">
@@ -12711,7 +12877,7 @@
       </p:grpSpPr>
       <p:sp>
         <p:nvSpPr>
-          <p:cNvPr id="679113678" name="Заголовок 1"/>
+          <p:cNvPr id="748972936" name="Заголовок 1"/>
           <p:cNvSpPr>
             <a:spLocks noGrp="1"/>
           </p:cNvSpPr>
@@ -12729,158 +12895,9 @@
             </a:pPr>
             <a:r>
               <a:rPr/>
-              <a:t>Tryb interaktywny</a:t>
-            </a:r>
-            <a:endParaRPr/>
-          </a:p>
-        </p:txBody>
-      </p:sp>
-      <p:sp>
-        <p:nvSpPr>
-          <p:cNvPr id="531753446" name="Объект 2"/>
-          <p:cNvSpPr>
-            <a:spLocks noGrp="1"/>
-          </p:cNvSpPr>
-          <p:nvPr>
-            <p:ph idx="1"/>
-          </p:nvPr>
-        </p:nvSpPr>
-        <p:spPr bwMode="auto"/>
-        <p:txBody>
-          <a:bodyPr vertOverflow="overflow" horzOverflow="overflow" vert="horz" wrap="square" lIns="91440" tIns="45720" rIns="91440" bIns="45720" numCol="1" spcCol="0" rtlCol="0" fromWordArt="0" anchor="t" anchorCtr="0" forceAA="0" upright="0" compatLnSpc="0">
-            <a:normAutofit fontScale="95000" lnSpcReduction="1000"/>
-          </a:bodyPr>
-          <a:lstStyle/>
-          <a:p>
-            <a:pPr algn="l">
-              <a:defRPr/>
-            </a:pPr>
-            <a:r>
-              <a:rPr lang="pl-PL"/>
-              <a:t>Uruchomienie: </a:t>
-            </a:r>
-            <a:endParaRPr lang="pl-PL"/>
-          </a:p>
-          <a:p>
-            <a:pPr marL="0" indent="0" algn="l">
-              <a:buFont typeface="Arial"/>
-              <a:buNone/>
-              <a:defRPr/>
-            </a:pPr>
-            <a:r>
-              <a:rPr lang="pl-PL"/>
-              <a:t>	</a:t>
-            </a:r>
-            <a:r>
-              <a:rPr lang="en-US" sz="3200" b="1" i="0" u="none" strike="noStrike" cap="none" spc="0">
-                <a:solidFill>
-                  <a:schemeClr val="accent6">
-                    <a:lumMod val="50000"/>
-                  </a:schemeClr>
-                </a:solidFill>
-                <a:latin typeface="Nimbus Mono PS"/>
-                <a:ea typeface="Nimbus Mono PS"/>
-                <a:cs typeface="Nimbus Mono PS"/>
-              </a:rPr>
-              <a:t>python</a:t>
-            </a:r>
-            <a:endParaRPr lang="en-US" sz="3200" b="1" i="0" u="none" strike="noStrike" cap="none" spc="0">
-              <a:solidFill>
-                <a:schemeClr val="accent6">
-                  <a:lumMod val="50000"/>
-                </a:schemeClr>
-              </a:solidFill>
-              <a:latin typeface="Times New Roman"/>
-              <a:cs typeface="Times New Roman"/>
-            </a:endParaRPr>
-          </a:p>
-          <a:p>
-            <a:pPr>
-              <a:defRPr/>
-            </a:pPr>
-            <a:r>
-              <a:rPr lang="pl-PL"/>
-              <a:t>Ostatnia uzyskana wartość: _</a:t>
-            </a:r>
-            <a:endParaRPr lang="pl-PL"/>
-          </a:p>
-          <a:p>
-            <a:pPr>
-              <a:defRPr/>
-            </a:pPr>
-            <a:r>
-              <a:rPr lang="pl-PL"/>
-              <a:t>Wprowadzenie nazwy zmiennej powoduje jej wyświetlenie</a:t>
-            </a:r>
-            <a:endParaRPr lang="pl-PL"/>
-          </a:p>
-          <a:p>
-            <a:pPr>
-              <a:defRPr/>
-            </a:pPr>
-            <a:r>
-              <a:rPr lang="pl-PL"/>
-              <a:t>Wywołanie funkcji wypisuje wynik</a:t>
-            </a:r>
-            <a:endParaRPr lang="pl-PL"/>
-          </a:p>
-          <a:p>
-            <a:pPr>
-              <a:defRPr/>
-            </a:pPr>
-            <a:r>
-              <a:rPr lang="pl-PL"/>
-              <a:t>Jeśli funkcja zwraca None, wynik nie jest wyświetlany </a:t>
-            </a:r>
-            <a:endParaRPr lang="pl-PL"/>
-          </a:p>
-          <a:p>
-            <a:pPr marL="457200" lvl="1" indent="0">
-              <a:buFont typeface="Arial"/>
-              <a:buNone/>
-              <a:defRPr/>
-            </a:pPr>
-            <a:r>
-              <a:rPr lang="pl-PL" sz="2500" b="1" i="0" u="none" strike="noStrike" cap="none" spc="0">
-                <a:solidFill>
-                  <a:schemeClr val="accent6">
-                    <a:lumMod val="50000"/>
-                  </a:schemeClr>
-                </a:solidFill>
-                <a:latin typeface="Nimbus Mono PS"/>
-                <a:ea typeface="Nimbus Mono PS"/>
-                <a:cs typeface="Nimbus Mono PS"/>
-              </a:rPr>
-              <a:t>print(print("text"))</a:t>
-            </a:r>
-            <a:endParaRPr>
-              <a:latin typeface="Nimbus Mono PS"/>
-              <a:cs typeface="Nimbus Mono PS"/>
-            </a:endParaRPr>
-          </a:p>
-          <a:p>
-            <a:pPr>
-              <a:defRPr/>
-            </a:pPr>
-            <a:r>
-              <a:rPr lang="pl-PL"/>
-              <a:t>Symbol „&gt;&gt;&gt;” oznacza początek komendy.</a:t>
-            </a:r>
-            <a:endParaRPr lang="pl-PL"/>
-          </a:p>
-          <a:p>
-            <a:pPr>
-              <a:defRPr/>
-            </a:pPr>
-            <a:r>
-              <a:rPr lang="pl-PL"/>
-              <a:t>Symbol „...” oznacza ciąg dalszy komendy</a:t>
-            </a:r>
-            <a:r>
-              <a:rPr lang="pl-PL"/>
-              <a:t> (dalej trzeba pamiętać o indentacji)</a:t>
-            </a:r>
-            <a:endParaRPr lang="pl-PL"/>
+              <a:t>Zalety i wady Pythona</a:t>
+            </a:r>
+            <a:endParaRPr/>
           </a:p>
         </p:txBody>
       </p:sp>
@@ -12919,7 +12936,7 @@
       </p:grpSpPr>
       <p:sp>
         <p:nvSpPr>
-          <p:cNvPr id="1127362944" name="Заголовок 1"/>
+          <p:cNvPr id="574782330" name="Заголовок 1"/>
           <p:cNvSpPr>
             <a:spLocks noGrp="1"/>
           </p:cNvSpPr>
@@ -12936,16 +12953,20 @@
               <a:defRPr/>
             </a:pPr>
             <a:r>
-              <a:rPr lang="pl-PL"/>
-              <a:t>Środowiska wirtualne</a:t>
-            </a:r>
-            <a:endParaRPr lang="pl-PL"/>
-          </a:p>
-        </p:txBody>
-      </p:sp>
-      <p:sp>
-        <p:nvSpPr>
-          <p:cNvPr id="1078348897" name="Объект 2"/>
+              <a:rPr/>
+              <a:t>Zalety i wady</a:t>
+            </a:r>
+            <a:r>
+              <a:rPr/>
+              <a:t> Pythona</a:t>
+            </a:r>
+            <a:endParaRPr/>
+          </a:p>
+        </p:txBody>
+      </p:sp>
+      <p:sp>
+        <p:nvSpPr>
+          <p:cNvPr id="908420451" name="Объект 2"/>
           <p:cNvSpPr>
             <a:spLocks noGrp="1"/>
           </p:cNvSpPr>
@@ -12955,68 +12976,136 @@
         </p:nvSpPr>
         <p:spPr bwMode="auto"/>
         <p:txBody>
-          <a:bodyPr/>
-          <a:lstStyle/>
-          <a:p>
-            <a:pPr>
-              <a:defRPr/>
-            </a:pPr>
-            <a:r>
-              <a:rPr lang="pl-PL"/>
-              <a:t>Środowisko </a:t>
-            </a:r>
-            <a:r>
-              <a:rPr lang="pl-PL"/>
-              <a:t>do uruchamiania skryptów</a:t>
-            </a:r>
-            <a:endParaRPr lang="pl-PL"/>
-          </a:p>
-          <a:p>
-            <a:pPr>
-              <a:defRPr/>
-            </a:pPr>
-            <a:r>
-              <a:rPr lang="pl-PL"/>
-              <a:t>Jest dołączone do konkretnego interpretera</a:t>
-            </a:r>
-            <a:endParaRPr lang="pl-PL"/>
-          </a:p>
-          <a:p>
-            <a:pPr>
-              <a:defRPr/>
-            </a:pPr>
-            <a:r>
-              <a:rPr lang="pl-PL"/>
-              <a:t>Zawiera zbiór bibliotek</a:t>
-            </a:r>
-            <a:endParaRPr lang="pl-PL"/>
-          </a:p>
-          <a:p>
-            <a:pPr>
-              <a:defRPr/>
-            </a:pPr>
-            <a:r>
-              <a:rPr lang="pl-PL"/>
-              <a:t>Łatwe do utworzenia</a:t>
-            </a:r>
-            <a:endParaRPr lang="pl-PL"/>
-          </a:p>
-          <a:p>
-            <a:pPr>
-              <a:defRPr/>
-            </a:pPr>
-            <a:r>
-              <a:rPr lang="pl-PL"/>
-              <a:t>Zależne od urządzenia (nieprzenośne)</a:t>
-            </a:r>
-            <a:endParaRPr lang="pl-PL"/>
-          </a:p>
+          <a:bodyPr vertOverflow="overflow" horzOverflow="overflow" vert="horz" wrap="square" lIns="91440" tIns="45720" rIns="91440" bIns="45720" numCol="1" spcCol="0" rtlCol="0" fromWordArt="0" anchor="t" anchorCtr="0" forceAA="0" upright="0" compatLnSpc="0">
+            <a:normAutofit fontScale="85000" lnSpcReduction="3000"/>
+          </a:bodyPr>
+          <a:lstStyle/>
           <a:p>
             <a:pPr marL="0" indent="0">
               <a:buFont typeface="Arial"/>
               <a:buNone/>
               <a:defRPr/>
             </a:pPr>
+            <a:r>
+              <a:rPr lang="pl-PL"/>
+              <a:t>+ Przenośność</a:t>
+            </a:r>
+            <a:endParaRPr lang="pl-PL"/>
+          </a:p>
+          <a:p>
+            <a:pPr marL="0" indent="0">
+              <a:buFont typeface="Arial"/>
+              <a:buNone/>
+              <a:defRPr/>
+            </a:pPr>
+            <a:r>
+              <a:rPr lang="pl-PL"/>
+              <a:t>+ Zarządzanie pamięcią</a:t>
+            </a:r>
+            <a:endParaRPr lang="pl-PL"/>
+          </a:p>
+          <a:p>
+            <a:pPr marL="0" indent="0">
+              <a:buFont typeface="Arial"/>
+              <a:buNone/>
+              <a:defRPr/>
+            </a:pPr>
+            <a:r>
+              <a:rPr lang="pl-PL"/>
+              <a:t>+ Łatwość użycia</a:t>
+            </a:r>
+            <a:endParaRPr lang="pl-PL"/>
+          </a:p>
+          <a:p>
+            <a:pPr marL="0" indent="0">
+              <a:buFont typeface="Arial"/>
+              <a:buNone/>
+              <a:defRPr/>
+            </a:pPr>
+            <a:r>
+              <a:rPr lang="pl-PL"/>
+              <a:t>+ Dynamiczne typowanie</a:t>
+            </a:r>
+            <a:endParaRPr lang="pl-PL"/>
+          </a:p>
+          <a:p>
+            <a:pPr marL="0" indent="0">
+              <a:buFont typeface="Arial"/>
+              <a:buNone/>
+              <a:defRPr/>
+            </a:pPr>
+            <a:r>
+              <a:rPr lang="pl-PL"/>
+              <a:t>+ Odwołania po nazwach</a:t>
+            </a:r>
+            <a:endParaRPr lang="pl-PL"/>
+          </a:p>
+          <a:p>
+            <a:pPr marL="0" indent="0">
+              <a:buFont typeface="Arial"/>
+              <a:buNone/>
+              <a:defRPr/>
+            </a:pPr>
+            <a:r>
+              <a:rPr lang="pl-PL"/>
+              <a:t>+ Odporność na błędy (wyjątki, segmentation fault)</a:t>
+            </a:r>
+            <a:endParaRPr lang="pl-PL"/>
+          </a:p>
+          <a:p>
+            <a:pPr marL="0" indent="0">
+              <a:buFont typeface="Arial"/>
+              <a:buNone/>
+              <a:defRPr/>
+            </a:pPr>
+            <a:endParaRPr lang="pl-PL"/>
+          </a:p>
+          <a:p>
+            <a:pPr>
+              <a:buFont typeface="Arial"/>
+              <a:buChar char="–"/>
+              <a:defRPr/>
+            </a:pPr>
+            <a:r>
+              <a:rPr lang="pl-PL"/>
+              <a:t>Prędkość</a:t>
+            </a:r>
+            <a:endParaRPr lang="pl-PL"/>
+          </a:p>
+          <a:p>
+            <a:pPr>
+              <a:buFont typeface="Arial"/>
+              <a:buChar char="–"/>
+              <a:defRPr/>
+            </a:pPr>
+            <a:r>
+              <a:rPr lang="pl-PL"/>
+              <a:t>Złe nawyki</a:t>
+            </a:r>
+            <a:endParaRPr lang="pl-PL"/>
+          </a:p>
+          <a:p>
+            <a:pPr>
+              <a:buFont typeface="Arial"/>
+              <a:buChar char="–"/>
+              <a:defRPr/>
+            </a:pPr>
+            <a:r>
+              <a:rPr lang="pl-PL"/>
+              <a:t>Wymagania sprzętowe</a:t>
+            </a:r>
+            <a:endParaRPr lang="pl-PL"/>
+          </a:p>
+          <a:p>
+            <a:pPr>
+              <a:buFont typeface="Arial"/>
+              <a:buChar char="–"/>
+              <a:defRPr/>
+            </a:pPr>
+            <a:r>
+              <a:rPr lang="pl-PL"/>
+              <a:t>Podatność na błędy (dynamiczne typowanie)</a:t>
+            </a:r>
             <a:endParaRPr lang="pl-PL"/>
           </a:p>
         </p:txBody>
@@ -13056,7 +13145,7 @@
       </p:grpSpPr>
       <p:sp>
         <p:nvSpPr>
-          <p:cNvPr id="594027759" name="Заголовок 1"/>
+          <p:cNvPr id="679113678" name="Заголовок 1"/>
           <p:cNvSpPr>
             <a:spLocks noGrp="1"/>
           </p:cNvSpPr>
@@ -13066,19 +13155,166 @@
         </p:nvSpPr>
         <p:spPr bwMode="auto"/>
         <p:txBody>
-          <a:bodyPr vertOverflow="overflow" horzOverflow="overflow" vert="horz" wrap="square" lIns="91440" tIns="45720" rIns="91440" bIns="45720" numCol="1" spcCol="0" rtlCol="0" fromWordArt="0" anchor="ctr" anchorCtr="0" forceAA="0" upright="0" compatLnSpc="0">
-            <a:normAutofit/>
+          <a:bodyPr/>
+          <a:lstStyle/>
+          <a:p>
+            <a:pPr>
+              <a:defRPr/>
+            </a:pPr>
+            <a:r>
+              <a:rPr/>
+              <a:t>Tryb interaktywny</a:t>
+            </a:r>
+            <a:endParaRPr/>
+          </a:p>
+        </p:txBody>
+      </p:sp>
+      <p:sp>
+        <p:nvSpPr>
+          <p:cNvPr id="531753446" name="Объект 2"/>
+          <p:cNvSpPr>
+            <a:spLocks noGrp="1"/>
+          </p:cNvSpPr>
+          <p:nvPr>
+            <p:ph idx="1"/>
+          </p:nvPr>
+        </p:nvSpPr>
+        <p:spPr bwMode="auto"/>
+        <p:txBody>
+          <a:bodyPr vertOverflow="overflow" horzOverflow="overflow" vert="horz" wrap="square" lIns="91440" tIns="45720" rIns="91440" bIns="45720" numCol="1" spcCol="0" rtlCol="0" fromWordArt="0" anchor="t" anchorCtr="0" forceAA="0" upright="0" compatLnSpc="0">
+            <a:normAutofit fontScale="95000" lnSpcReduction="1000"/>
           </a:bodyPr>
           <a:lstStyle/>
           <a:p>
-            <a:pPr>
+            <a:pPr algn="l">
               <a:defRPr/>
             </a:pPr>
             <a:r>
               <a:rPr lang="pl-PL"/>
-              <a:t>Środowiska wirtualne - zalety</a:t>
-            </a:r>
-            <a:endParaRPr/>
+              <a:t>Uruchomienie: </a:t>
+            </a:r>
+            <a:endParaRPr lang="pl-PL"/>
+          </a:p>
+          <a:p>
+            <a:pPr marL="0" indent="0" algn="l">
+              <a:buFont typeface="Arial"/>
+              <a:buNone/>
+              <a:defRPr/>
+            </a:pPr>
+            <a:r>
+              <a:rPr lang="pl-PL"/>
+              <a:t>	</a:t>
+            </a:r>
+            <a:r>
+              <a:rPr lang="en-US" sz="3200" b="1" i="0" u="none" strike="noStrike" cap="none" spc="0">
+                <a:solidFill>
+                  <a:schemeClr val="accent6">
+                    <a:lumMod val="50000"/>
+                  </a:schemeClr>
+                </a:solidFill>
+                <a:latin typeface="Nimbus Mono PS"/>
+                <a:ea typeface="Nimbus Mono PS"/>
+                <a:cs typeface="Nimbus Mono PS"/>
+              </a:rPr>
+              <a:t>python</a:t>
+            </a:r>
+            <a:endParaRPr lang="en-US" sz="3200" b="1" i="0" u="none" strike="noStrike" cap="none" spc="0">
+              <a:solidFill>
+                <a:schemeClr val="accent6">
+                  <a:lumMod val="50000"/>
+                </a:schemeClr>
+              </a:solidFill>
+              <a:latin typeface="Times New Roman"/>
+              <a:cs typeface="Times New Roman"/>
+            </a:endParaRPr>
+          </a:p>
+          <a:p>
+            <a:pPr>
+              <a:defRPr/>
+            </a:pPr>
+            <a:r>
+              <a:rPr lang="pl-PL"/>
+              <a:t>Ostatnia uzyskana wartość: _</a:t>
+            </a:r>
+            <a:endParaRPr lang="pl-PL"/>
+          </a:p>
+          <a:p>
+            <a:pPr>
+              <a:defRPr/>
+            </a:pPr>
+            <a:r>
+              <a:rPr lang="pl-PL"/>
+              <a:t>Wprowadzenie nazwy zmiennej powoduje jej wyświetlenie</a:t>
+            </a:r>
+            <a:endParaRPr lang="pl-PL"/>
+          </a:p>
+          <a:p>
+            <a:pPr>
+              <a:defRPr/>
+            </a:pPr>
+            <a:r>
+              <a:rPr lang="pl-PL"/>
+              <a:t>Wywołanie funkcji wypisuje wynik</a:t>
+            </a:r>
+            <a:endParaRPr lang="pl-PL"/>
+          </a:p>
+          <a:p>
+            <a:pPr>
+              <a:defRPr/>
+            </a:pPr>
+            <a:r>
+              <a:rPr lang="pl-PL"/>
+              <a:t>Jeśli funkcja zwraca None, wynik nie jest wyświetlany </a:t>
+            </a:r>
+            <a:endParaRPr lang="pl-PL"/>
+          </a:p>
+          <a:p>
+            <a:pPr marL="457200" lvl="1" indent="0">
+              <a:buFont typeface="Arial"/>
+              <a:buNone/>
+              <a:defRPr/>
+            </a:pPr>
+            <a:r>
+              <a:rPr lang="pl-PL" sz="2500" b="1" i="0" u="none" strike="noStrike" cap="none" spc="0">
+                <a:solidFill>
+                  <a:schemeClr val="accent6">
+                    <a:lumMod val="50000"/>
+                  </a:schemeClr>
+                </a:solidFill>
+                <a:latin typeface="Nimbus Mono PS"/>
+                <a:ea typeface="Nimbus Mono PS"/>
+                <a:cs typeface="Nimbus Mono PS"/>
+              </a:rPr>
+              <a:t>print(print("text"))</a:t>
+            </a:r>
+            <a:endParaRPr>
+              <a:latin typeface="Nimbus Mono PS"/>
+              <a:cs typeface="Nimbus Mono PS"/>
+            </a:endParaRPr>
+          </a:p>
+          <a:p>
+            <a:pPr>
+              <a:defRPr/>
+            </a:pPr>
+            <a:r>
+              <a:rPr lang="pl-PL"/>
+              <a:t>Symbol „&gt;&gt;&gt;” oznacza początek komendy.</a:t>
+            </a:r>
+            <a:endParaRPr lang="pl-PL"/>
+          </a:p>
+          <a:p>
+            <a:pPr>
+              <a:defRPr/>
+            </a:pPr>
+            <a:r>
+              <a:rPr lang="pl-PL"/>
+              <a:t>Symbol „...” oznacza ciąg dalszy komendy</a:t>
+            </a:r>
+            <a:r>
+              <a:rPr lang="pl-PL"/>
+              <a:t> (dalej trzeba pamiętać o indentacji)</a:t>
+            </a:r>
+            <a:endParaRPr lang="pl-PL"/>
           </a:p>
         </p:txBody>
       </p:sp>
@@ -13117,7 +13353,7 @@
       </p:grpSpPr>
       <p:sp>
         <p:nvSpPr>
-          <p:cNvPr id="1340848278" name="Заголовок 1"/>
+          <p:cNvPr id="1127362944" name="Заголовок 1"/>
           <p:cNvSpPr>
             <a:spLocks noGrp="1"/>
           </p:cNvSpPr>
@@ -13127,25 +13363,23 @@
         </p:nvSpPr>
         <p:spPr bwMode="auto"/>
         <p:txBody>
-          <a:bodyPr vertOverflow="overflow" horzOverflow="overflow" vert="horz" wrap="square" lIns="91440" tIns="45720" rIns="91440" bIns="45720" numCol="1" spcCol="0" rtlCol="0" fromWordArt="0" anchor="ctr" anchorCtr="0" forceAA="0" upright="0" compatLnSpc="0">
-            <a:normAutofit/>
-          </a:bodyPr>
-          <a:lstStyle/>
-          <a:p>
-            <a:pPr>
-              <a:defRPr/>
-            </a:pPr>
-            <a:r>
-              <a:rPr/>
-              <a:t>Środowiska wirtualne - zalety</a:t>
-            </a:r>
-            <a:endParaRPr/>
-          </a:p>
-        </p:txBody>
-      </p:sp>
-      <p:sp>
-        <p:nvSpPr>
-          <p:cNvPr id="1889484832" name="Объект 2"/>
+          <a:bodyPr/>
+          <a:lstStyle/>
+          <a:p>
+            <a:pPr>
+              <a:defRPr/>
+            </a:pPr>
+            <a:r>
+              <a:rPr lang="pl-PL"/>
+              <a:t>Środowiska wirtualne</a:t>
+            </a:r>
+            <a:endParaRPr lang="pl-PL"/>
+          </a:p>
+        </p:txBody>
+      </p:sp>
+      <p:sp>
+        <p:nvSpPr>
+          <p:cNvPr id="1078348897" name="Объект 2"/>
           <p:cNvSpPr>
             <a:spLocks noGrp="1"/>
           </p:cNvSpPr>
@@ -13163,7 +13397,11 @@
             </a:pPr>
             <a:r>
               <a:rPr lang="pl-PL"/>
-              <a:t>Wiele wersji danej biblioteki</a:t>
+              <a:t>Środowisko </a:t>
+            </a:r>
+            <a:r>
+              <a:rPr lang="pl-PL"/>
+              <a:t>do uruchamiania skryptów</a:t>
             </a:r>
             <a:endParaRPr lang="pl-PL"/>
           </a:p>
@@ -13173,7 +13411,7 @@
             </a:pPr>
             <a:r>
               <a:rPr lang="pl-PL"/>
-              <a:t>Biblioteki potrzebne dla jednego projektu</a:t>
+              <a:t>Jest dołączone do konkretnego interpretera</a:t>
             </a:r>
             <a:endParaRPr lang="pl-PL"/>
           </a:p>
@@ -13183,7 +13421,7 @@
             </a:pPr>
             <a:r>
               <a:rPr lang="pl-PL"/>
-              <a:t>Porządek w plikach</a:t>
+              <a:t>Zawiera zbiór bibliotek</a:t>
             </a:r>
             <a:endParaRPr lang="pl-PL"/>
           </a:p>
@@ -13193,7 +13431,7 @@
             </a:pPr>
             <a:r>
               <a:rPr lang="pl-PL"/>
-              <a:t>Łatwa konfiguracja środowiska</a:t>
+              <a:t>Łatwe do utworzenia</a:t>
             </a:r>
             <a:endParaRPr lang="pl-PL"/>
           </a:p>
@@ -13203,18 +13441,16 @@
             </a:pPr>
             <a:r>
               <a:rPr lang="pl-PL"/>
-              <a:t>Unikanie konfliktów</a:t>
+              <a:t>Zależne od urządzenia (nieprzenośne)</a:t>
             </a:r>
             <a:endParaRPr lang="pl-PL"/>
           </a:p>
           <a:p>
-            <a:pPr>
-              <a:defRPr/>
-            </a:pPr>
-            <a:r>
-              <a:rPr lang="pl-PL"/>
-              <a:t>Wybór interpretera</a:t>
-            </a:r>
+            <a:pPr marL="0" indent="0">
+              <a:buFont typeface="Arial"/>
+              <a:buNone/>
+              <a:defRPr/>
+            </a:pPr>
             <a:endParaRPr lang="pl-PL"/>
           </a:p>
         </p:txBody>
@@ -13602,7 +13838,7 @@
       </p:grpSpPr>
       <p:sp>
         <p:nvSpPr>
-          <p:cNvPr id="1486948386" name="Заголовок 1"/>
+          <p:cNvPr id="594027759" name="Заголовок 1"/>
           <p:cNvSpPr>
             <a:spLocks noGrp="1"/>
           </p:cNvSpPr>
@@ -13612,15 +13848,17 @@
         </p:nvSpPr>
         <p:spPr bwMode="auto"/>
         <p:txBody>
-          <a:bodyPr/>
-          <a:lstStyle/>
-          <a:p>
-            <a:pPr>
-              <a:defRPr/>
-            </a:pPr>
-            <a:r>
-              <a:rPr/>
-              <a:t>Środowiska wirtualne - wady</a:t>
+          <a:bodyPr vertOverflow="overflow" horzOverflow="overflow" vert="horz" wrap="square" lIns="91440" tIns="45720" rIns="91440" bIns="45720" numCol="1" spcCol="0" rtlCol="0" fromWordArt="0" anchor="ctr" anchorCtr="0" forceAA="0" upright="0" compatLnSpc="0">
+            <a:normAutofit/>
+          </a:bodyPr>
+          <a:lstStyle/>
+          <a:p>
+            <a:pPr>
+              <a:defRPr/>
+            </a:pPr>
+            <a:r>
+              <a:rPr lang="pl-PL"/>
+              <a:t>Środowiska wirtualne - zalety</a:t>
             </a:r>
             <a:endParaRPr/>
           </a:p>
@@ -13661,7 +13899,7 @@
       </p:grpSpPr>
       <p:sp>
         <p:nvSpPr>
-          <p:cNvPr id="1560566706" name="Заголовок 1"/>
+          <p:cNvPr id="1340848278" name="Заголовок 1"/>
           <p:cNvSpPr>
             <a:spLocks noGrp="1"/>
           </p:cNvSpPr>
@@ -13671,23 +13909,25 @@
         </p:nvSpPr>
         <p:spPr bwMode="auto"/>
         <p:txBody>
-          <a:bodyPr/>
-          <a:lstStyle/>
-          <a:p>
-            <a:pPr>
-              <a:defRPr/>
-            </a:pPr>
-            <a:r>
-              <a:rPr/>
-              <a:t>Środowiska wirtualne - wady</a:t>
-            </a:r>
-            <a:endParaRPr/>
-          </a:p>
-        </p:txBody>
-      </p:sp>
-      <p:sp>
-        <p:nvSpPr>
-          <p:cNvPr id="1473760466" name="Объект 2"/>
+          <a:bodyPr vertOverflow="overflow" horzOverflow="overflow" vert="horz" wrap="square" lIns="91440" tIns="45720" rIns="91440" bIns="45720" numCol="1" spcCol="0" rtlCol="0" fromWordArt="0" anchor="ctr" anchorCtr="0" forceAA="0" upright="0" compatLnSpc="0">
+            <a:normAutofit/>
+          </a:bodyPr>
+          <a:lstStyle/>
+          <a:p>
+            <a:pPr>
+              <a:defRPr/>
+            </a:pPr>
+            <a:r>
+              <a:rPr/>
+              <a:t>Środowiska wirtualne - zalety</a:t>
+            </a:r>
+            <a:endParaRPr/>
+          </a:p>
+        </p:txBody>
+      </p:sp>
+      <p:sp>
+        <p:nvSpPr>
+          <p:cNvPr id="1889484832" name="Объект 2"/>
           <p:cNvSpPr>
             <a:spLocks noGrp="1"/>
           </p:cNvSpPr>
@@ -13695,33 +13935,69 @@
             <p:ph idx="1"/>
           </p:nvPr>
         </p:nvSpPr>
-        <p:spPr bwMode="auto">
-          <a:xfrm flipH="0" flipV="0">
-            <a:off x="655270" y="2631557"/>
-            <a:ext cx="10577332" cy="2697164"/>
-          </a:xfrm>
-        </p:spPr>
-        <p:txBody>
-          <a:bodyPr/>
-          <a:lstStyle/>
-          <a:p>
-            <a:pPr marL="0" indent="0" algn="ctr">
-              <a:buFont typeface="Arial"/>
-              <a:buNone/>
-              <a:defRPr/>
-            </a:pPr>
-            <a:r>
-              <a:rPr sz="10000">
-                <a:latin typeface="Z003"/>
-                <a:ea typeface="Z003"/>
-                <a:cs typeface="Z003"/>
-              </a:rPr>
-              <a:t>Nie</a:t>
-            </a:r>
-            <a:endParaRPr>
-              <a:latin typeface="Z003"/>
-              <a:cs typeface="Z003"/>
-            </a:endParaRPr>
+        <p:spPr bwMode="auto"/>
+        <p:txBody>
+          <a:bodyPr/>
+          <a:lstStyle/>
+          <a:p>
+            <a:pPr>
+              <a:defRPr/>
+            </a:pPr>
+            <a:r>
+              <a:rPr lang="pl-PL"/>
+              <a:t>Wiele wersji danej biblioteki</a:t>
+            </a:r>
+            <a:endParaRPr lang="pl-PL"/>
+          </a:p>
+          <a:p>
+            <a:pPr>
+              <a:defRPr/>
+            </a:pPr>
+            <a:r>
+              <a:rPr lang="pl-PL"/>
+              <a:t>Biblioteki potrzebne dla jednego projektu</a:t>
+            </a:r>
+            <a:endParaRPr lang="pl-PL"/>
+          </a:p>
+          <a:p>
+            <a:pPr>
+              <a:defRPr/>
+            </a:pPr>
+            <a:r>
+              <a:rPr lang="pl-PL"/>
+              <a:t>Porządek w plikach</a:t>
+            </a:r>
+            <a:endParaRPr lang="pl-PL"/>
+          </a:p>
+          <a:p>
+            <a:pPr>
+              <a:defRPr/>
+            </a:pPr>
+            <a:r>
+              <a:rPr lang="pl-PL"/>
+              <a:t>Łatwa konfiguracja środowiska</a:t>
+            </a:r>
+            <a:endParaRPr lang="pl-PL"/>
+          </a:p>
+          <a:p>
+            <a:pPr>
+              <a:defRPr/>
+            </a:pPr>
+            <a:r>
+              <a:rPr lang="pl-PL"/>
+              <a:t>Unikanie konfliktów</a:t>
+            </a:r>
+            <a:endParaRPr lang="pl-PL"/>
+          </a:p>
+          <a:p>
+            <a:pPr>
+              <a:defRPr/>
+            </a:pPr>
+            <a:r>
+              <a:rPr lang="pl-PL"/>
+              <a:t>Wybór interpretera</a:t>
+            </a:r>
+            <a:endParaRPr lang="pl-PL"/>
           </a:p>
         </p:txBody>
       </p:sp>
@@ -13760,7 +14036,7 @@
       </p:grpSpPr>
       <p:sp>
         <p:nvSpPr>
-          <p:cNvPr id="803372487" name="Заголовок 1"/>
+          <p:cNvPr id="1486948386" name="Заголовок 1"/>
           <p:cNvSpPr>
             <a:spLocks noGrp="1"/>
           </p:cNvSpPr>
@@ -13778,242 +14054,9 @@
             </a:pPr>
             <a:r>
               <a:rPr/>
-              <a:t>Praca ze środowiskami wirtualnymi</a:t>
-            </a:r>
-            <a:endParaRPr/>
-          </a:p>
-        </p:txBody>
-      </p:sp>
-      <p:sp>
-        <p:nvSpPr>
-          <p:cNvPr id="407361843" name="Объект 2"/>
-          <p:cNvSpPr>
-            <a:spLocks noGrp="1"/>
-          </p:cNvSpPr>
-          <p:nvPr>
-            <p:ph idx="1"/>
-          </p:nvPr>
-        </p:nvSpPr>
-        <p:spPr bwMode="auto"/>
-        <p:txBody>
-          <a:bodyPr/>
-          <a:lstStyle/>
-          <a:p>
-            <a:pPr>
-              <a:defRPr/>
-            </a:pPr>
-            <a:r>
-              <a:rPr/>
-              <a:t>Utworzenie środowiska:</a:t>
-            </a:r>
-            <a:endParaRPr/>
-          </a:p>
-          <a:p>
-            <a:pPr marL="457200" lvl="1" indent="0">
-              <a:buFont typeface="Arial"/>
-              <a:buNone/>
-              <a:defRPr/>
-            </a:pPr>
-            <a:r>
-              <a:rPr lang="pl-PL" sz="2800" b="0" i="0" u="none" strike="noStrike" cap="none" spc="0">
-                <a:solidFill>
-                  <a:schemeClr val="accent6">
-                    <a:lumMod val="50000"/>
-                  </a:schemeClr>
-                </a:solidFill>
-                <a:latin typeface="Nimbus Mono PS"/>
-                <a:ea typeface="Nimbus Mono PS"/>
-                <a:cs typeface="Nimbus Mono PS"/>
-              </a:rPr>
-              <a:t>python –m venv </a:t>
-            </a:r>
-            <a:r>
-              <a:rPr lang="pl-PL" sz="2800" b="0" i="0" u="none" strike="noStrike" cap="none" spc="0">
-                <a:solidFill>
-                  <a:schemeClr val="accent6">
-                    <a:lumMod val="50000"/>
-                  </a:schemeClr>
-                </a:solidFill>
-                <a:latin typeface="Nimbus Mono PS"/>
-                <a:ea typeface="Nimbus Mono PS"/>
-                <a:cs typeface="Nimbus Mono PS"/>
-              </a:rPr>
-              <a:t>/path/to/venv</a:t>
-            </a:r>
-            <a:endParaRPr sz="2800">
-              <a:latin typeface="Nimbus Mono PS"/>
-              <a:ea typeface="Nimbus Mono PS"/>
-              <a:cs typeface="Nimbus Mono PS"/>
-            </a:endParaRPr>
-          </a:p>
-          <a:p>
-            <a:pPr>
-              <a:defRPr/>
-            </a:pPr>
-            <a:r>
-              <a:rPr/>
-              <a:t>Pomoc:</a:t>
-            </a:r>
-            <a:endParaRPr/>
-          </a:p>
-          <a:p>
-            <a:pPr marL="457200" lvl="1" indent="0">
-              <a:buFont typeface="Arial"/>
-              <a:buNone/>
-              <a:defRPr/>
-            </a:pPr>
-            <a:r>
-              <a:rPr lang="pl-PL" sz="2800" b="0" i="0" u="none" strike="noStrike" cap="none" spc="0">
-                <a:solidFill>
-                  <a:schemeClr val="accent6">
-                    <a:lumMod val="50000"/>
-                  </a:schemeClr>
-                </a:solidFill>
-                <a:latin typeface="Nimbus Mono PS"/>
-                <a:ea typeface="Nimbus Mono PS"/>
-                <a:cs typeface="Nimbus Mono PS"/>
-              </a:rPr>
-              <a:t>python –h venv</a:t>
-            </a:r>
-            <a:endParaRPr/>
-          </a:p>
-          <a:p>
-            <a:pPr>
-              <a:defRPr/>
-            </a:pPr>
-            <a:r>
-              <a:rPr/>
-              <a:t>Aktywacja:</a:t>
-            </a:r>
-            <a:endParaRPr/>
-          </a:p>
-          <a:p>
-            <a:pPr marL="457200" lvl="1" indent="0">
-              <a:buFont typeface="Arial"/>
-              <a:buNone/>
-              <a:defRPr/>
-            </a:pPr>
-            <a:r>
-              <a:rPr lang="pl-PL" sz="2800" b="0" i="0" u="none" strike="noStrike" cap="none" spc="0">
-                <a:solidFill>
-                  <a:schemeClr val="accent6">
-                    <a:lumMod val="50000"/>
-                  </a:schemeClr>
-                </a:solidFill>
-                <a:latin typeface="Nimbus Mono PS"/>
-                <a:ea typeface="Nimbus Mono PS"/>
-                <a:cs typeface="Nimbus Mono PS"/>
-              </a:rPr>
-              <a:t>source </a:t>
-            </a:r>
-            <a:r>
-              <a:rPr lang="pl-PL" sz="2800" b="0" i="0" u="none" strike="noStrike" cap="none" spc="0">
-                <a:solidFill>
-                  <a:schemeClr val="accent6">
-                    <a:lumMod val="50000"/>
-                  </a:schemeClr>
-                </a:solidFill>
-                <a:latin typeface="Nimbus Mono PS"/>
-                <a:ea typeface="Nimbus Mono PS"/>
-                <a:cs typeface="Nimbus Mono PS"/>
-              </a:rPr>
-              <a:t>path/to/venv</a:t>
-            </a:r>
-            <a:r>
-              <a:rPr lang="pl-PL" sz="2800" b="0" i="0" u="none" strike="noStrike" cap="none" spc="0">
-                <a:solidFill>
-                  <a:schemeClr val="accent6">
-                    <a:lumMod val="50000"/>
-                  </a:schemeClr>
-                </a:solidFill>
-                <a:latin typeface="Nimbus Mono PS"/>
-                <a:ea typeface="Nimbus Mono PS"/>
-                <a:cs typeface="Nimbus Mono PS"/>
-              </a:rPr>
-              <a:t>/bin/</a:t>
-            </a:r>
-            <a:r>
-              <a:rPr lang="pl-PL" sz="2800" b="0" i="0" u="none" strike="noStrike" cap="none" spc="0">
-                <a:solidFill>
-                  <a:schemeClr val="accent6">
-                    <a:lumMod val="50000"/>
-                  </a:schemeClr>
-                </a:solidFill>
-                <a:latin typeface="Nimbus Mono PS"/>
-                <a:ea typeface="Nimbus Mono PS"/>
-                <a:cs typeface="Nimbus Mono PS"/>
-              </a:rPr>
-              <a:t>activate</a:t>
-            </a:r>
-            <a:endParaRPr lang="pl-PL" sz="2800" b="0" i="0" u="none" strike="noStrike" cap="none" spc="0">
-              <a:solidFill>
-                <a:schemeClr val="accent6">
-                  <a:lumMod val="50000"/>
-                </a:schemeClr>
-              </a:solidFill>
-              <a:latin typeface="Times New Roman"/>
-              <a:cs typeface="Times New Roman"/>
-            </a:endParaRPr>
-          </a:p>
-          <a:p>
-            <a:pPr>
-              <a:defRPr/>
-            </a:pPr>
-            <a:r>
-              <a:rPr lang="pl-PL" sz="2800" b="0" i="0" u="none" strike="noStrike" cap="none" spc="0">
-                <a:solidFill>
-                  <a:schemeClr val="accent6">
-                    <a:lumMod val="50000"/>
-                  </a:schemeClr>
-                </a:solidFill>
-                <a:latin typeface="+mn-lt"/>
-                <a:ea typeface="+mn-ea"/>
-                <a:cs typeface="+mn-cs"/>
-              </a:rPr>
-              <a:t>Dezaktywacja:</a:t>
-            </a:r>
-            <a:endParaRPr sz="2800"/>
-          </a:p>
-          <a:p>
-            <a:pPr marL="457200" lvl="1" indent="0">
-              <a:buFont typeface="Arial"/>
-              <a:buNone/>
-              <a:defRPr/>
-            </a:pPr>
-            <a:r>
-              <a:rPr lang="pl-PL" sz="2800" b="0" i="0" u="none" strike="noStrike" cap="none" spc="0">
-                <a:solidFill>
-                  <a:schemeClr val="accent6">
-                    <a:lumMod val="50000"/>
-                  </a:schemeClr>
-                </a:solidFill>
-                <a:latin typeface="Nimbus Mono PS"/>
-                <a:ea typeface="Nimbus Mono PS"/>
-                <a:cs typeface="Nimbus Mono PS"/>
-              </a:rPr>
-              <a:t>deactivate</a:t>
-            </a:r>
-            <a:endParaRPr sz="2800" b="0" i="0" u="none" strike="noStrike" cap="none" spc="0">
-              <a:solidFill>
-                <a:schemeClr val="accent6">
-                  <a:lumMod val="50000"/>
-                </a:schemeClr>
-              </a:solidFill>
-              <a:latin typeface="Times New Roman"/>
-              <a:cs typeface="Times New Roman"/>
-            </a:endParaRPr>
-          </a:p>
-          <a:p>
-            <a:pPr marL="457200" lvl="1" indent="0">
-              <a:buFont typeface="Arial"/>
-              <a:buNone/>
-              <a:defRPr/>
-            </a:pPr>
-            <a:endParaRPr>
-              <a:latin typeface="Nimbus Mono PS"/>
-              <a:ea typeface="Nimbus Mono PS"/>
-              <a:cs typeface="Nimbus Mono PS"/>
-            </a:endParaRPr>
+              <a:t>Środowiska wirtualne - wady</a:t>
+            </a:r>
+            <a:endParaRPr/>
           </a:p>
         </p:txBody>
       </p:sp>
@@ -14052,7 +14095,7 @@
       </p:grpSpPr>
       <p:sp>
         <p:nvSpPr>
-          <p:cNvPr id="287118708" name="Заголовок 1"/>
+          <p:cNvPr id="1560566706" name="Заголовок 1"/>
           <p:cNvSpPr>
             <a:spLocks noGrp="1"/>
           </p:cNvSpPr>
@@ -14070,15 +14113,15 @@
             </a:pPr>
             <a:r>
               <a:rPr/>
-              <a:t>Praca ze środowiskami wirtualnymi</a:t>
-            </a:r>
-            <a:endParaRPr/>
-          </a:p>
-        </p:txBody>
-      </p:sp>
-      <p:sp>
-        <p:nvSpPr>
-          <p:cNvPr id="1272238175" name="Объект 2"/>
+              <a:t>Środowiska wirtualne - wady</a:t>
+            </a:r>
+            <a:endParaRPr/>
+          </a:p>
+        </p:txBody>
+      </p:sp>
+      <p:sp>
+        <p:nvSpPr>
+          <p:cNvPr id="1473760466" name="Объект 2"/>
           <p:cNvSpPr>
             <a:spLocks noGrp="1"/>
           </p:cNvSpPr>
@@ -14086,296 +14129,32 @@
             <p:ph idx="1"/>
           </p:nvPr>
         </p:nvSpPr>
-        <p:spPr bwMode="auto"/>
-        <p:txBody>
-          <a:bodyPr vertOverflow="overflow" horzOverflow="overflow" vert="horz" wrap="square" lIns="91440" tIns="45720" rIns="91440" bIns="45720" numCol="1" spcCol="0" rtlCol="0" fromWordArt="0" anchor="t" anchorCtr="0" forceAA="0" upright="0" compatLnSpc="0">
-            <a:normAutofit fontScale="85000" lnSpcReduction="3000"/>
-          </a:bodyPr>
-          <a:lstStyle/>
-          <a:p>
-            <a:pPr>
-              <a:defRPr/>
-            </a:pPr>
-            <a:r>
-              <a:rPr/>
-              <a:t>Utworzenie środowiska:</a:t>
-            </a:r>
-            <a:endParaRPr/>
-          </a:p>
-          <a:p>
-            <a:pPr marL="457200" lvl="1" indent="0">
+        <p:spPr bwMode="auto">
+          <a:xfrm flipH="0" flipV="0">
+            <a:off x="655270" y="2631557"/>
+            <a:ext cx="10577332" cy="2697164"/>
+          </a:xfrm>
+        </p:spPr>
+        <p:txBody>
+          <a:bodyPr/>
+          <a:lstStyle/>
+          <a:p>
+            <a:pPr marL="0" indent="0" algn="ctr">
               <a:buFont typeface="Arial"/>
               <a:buNone/>
               <a:defRPr/>
             </a:pPr>
             <a:r>
-              <a:rPr lang="pl-PL" sz="2800" b="0" i="0" u="none" strike="noStrike" cap="none" spc="0">
-                <a:solidFill>
-                  <a:schemeClr val="accent6">
-                    <a:lumMod val="50000"/>
-                  </a:schemeClr>
-                </a:solidFill>
-                <a:latin typeface="Nimbus Mono PS"/>
-                <a:ea typeface="Nimbus Mono PS"/>
-                <a:cs typeface="Nimbus Mono PS"/>
+              <a:rPr sz="10000">
+                <a:latin typeface="Z003"/>
+                <a:ea typeface="Z003"/>
+                <a:cs typeface="Z003"/>
               </a:rPr>
-              <a:t>python –m venv </a:t>
-            </a:r>
-            <a:r>
-              <a:rPr lang="pl-PL" sz="2800" b="0" i="0" u="none" strike="noStrike" cap="none" spc="0">
-                <a:solidFill>
-                  <a:schemeClr val="accent6">
-                    <a:lumMod val="50000"/>
-                  </a:schemeClr>
-                </a:solidFill>
-                <a:latin typeface="Nimbus Mono PS"/>
-                <a:ea typeface="Nimbus Mono PS"/>
-                <a:cs typeface="Nimbus Mono PS"/>
-              </a:rPr>
-              <a:t>/path/to/venv</a:t>
-            </a:r>
-            <a:endParaRPr sz="2800">
-              <a:latin typeface="Nimbus Mono PS"/>
-              <a:ea typeface="Nimbus Mono PS"/>
-              <a:cs typeface="Nimbus Mono PS"/>
-            </a:endParaRPr>
-          </a:p>
-          <a:p>
-            <a:pPr>
-              <a:defRPr/>
-            </a:pPr>
-            <a:r>
-              <a:rPr/>
-              <a:t>Pomoc:</a:t>
-            </a:r>
-            <a:endParaRPr/>
-          </a:p>
-          <a:p>
-            <a:pPr marL="457200" lvl="1" indent="0">
-              <a:buFont typeface="Arial"/>
-              <a:buNone/>
-              <a:defRPr/>
-            </a:pPr>
-            <a:r>
-              <a:rPr lang="pl-PL" sz="2800" b="0" i="0" u="none" strike="noStrike" cap="none" spc="0">
-                <a:solidFill>
-                  <a:schemeClr val="accent6">
-                    <a:lumMod val="50000"/>
-                  </a:schemeClr>
-                </a:solidFill>
-                <a:latin typeface="Nimbus Mono PS"/>
-                <a:ea typeface="Nimbus Mono PS"/>
-                <a:cs typeface="Nimbus Mono PS"/>
-              </a:rPr>
-              <a:t>python –h venv</a:t>
-            </a:r>
-            <a:endParaRPr/>
-          </a:p>
-          <a:p>
-            <a:pPr>
-              <a:defRPr/>
-            </a:pPr>
-            <a:r>
-              <a:rPr/>
-              <a:t>Aktywacja:</a:t>
-            </a:r>
-            <a:endParaRPr/>
-          </a:p>
-          <a:p>
-            <a:pPr marL="457200" lvl="1" indent="0">
-              <a:buFont typeface="Arial"/>
-              <a:buNone/>
-              <a:defRPr/>
-            </a:pPr>
-            <a:r>
-              <a:rPr lang="pl-PL" sz="2800" b="0" i="0" u="none" strike="noStrike" cap="none" spc="0">
-                <a:solidFill>
-                  <a:schemeClr val="accent6">
-                    <a:lumMod val="50000"/>
-                  </a:schemeClr>
-                </a:solidFill>
-                <a:latin typeface="Nimbus Mono PS"/>
-                <a:ea typeface="Nimbus Mono PS"/>
-                <a:cs typeface="Nimbus Mono PS"/>
-              </a:rPr>
-              <a:t>source </a:t>
-            </a:r>
-            <a:r>
-              <a:rPr lang="pl-PL" sz="2800" b="0" i="0" u="none" strike="noStrike" cap="none" spc="0">
-                <a:solidFill>
-                  <a:schemeClr val="accent6">
-                    <a:lumMod val="50000"/>
-                  </a:schemeClr>
-                </a:solidFill>
-                <a:latin typeface="Nimbus Mono PS"/>
-                <a:ea typeface="Nimbus Mono PS"/>
-                <a:cs typeface="Nimbus Mono PS"/>
-              </a:rPr>
-              <a:t>path/to/venv</a:t>
-            </a:r>
-            <a:r>
-              <a:rPr lang="pl-PL" sz="2800" b="0" i="0" u="none" strike="noStrike" cap="none" spc="0">
-                <a:solidFill>
-                  <a:schemeClr val="accent6">
-                    <a:lumMod val="50000"/>
-                  </a:schemeClr>
-                </a:solidFill>
-                <a:latin typeface="Nimbus Mono PS"/>
-                <a:ea typeface="Nimbus Mono PS"/>
-                <a:cs typeface="Nimbus Mono PS"/>
-              </a:rPr>
-              <a:t>/bin/</a:t>
-            </a:r>
-            <a:r>
-              <a:rPr lang="pl-PL" sz="2800" b="0" i="0" u="none" strike="noStrike" cap="none" spc="0">
-                <a:solidFill>
-                  <a:schemeClr val="accent6">
-                    <a:lumMod val="50000"/>
-                  </a:schemeClr>
-                </a:solidFill>
-                <a:latin typeface="Nimbus Mono PS"/>
-                <a:ea typeface="Nimbus Mono PS"/>
-                <a:cs typeface="Nimbus Mono PS"/>
-              </a:rPr>
-              <a:t>activate</a:t>
-            </a:r>
-            <a:endParaRPr lang="pl-PL" sz="2800" b="0" i="0" u="none" strike="noStrike" cap="none" spc="0">
-              <a:solidFill>
-                <a:schemeClr val="accent6">
-                  <a:lumMod val="50000"/>
-                </a:schemeClr>
-              </a:solidFill>
-              <a:latin typeface="Times New Roman"/>
-              <a:cs typeface="Times New Roman"/>
-            </a:endParaRPr>
-          </a:p>
-          <a:p>
-            <a:pPr>
-              <a:defRPr/>
-            </a:pPr>
-            <a:r>
-              <a:rPr lang="pl-PL" sz="2800" b="0" i="0" u="none" strike="noStrike" cap="none" spc="0">
-                <a:solidFill>
-                  <a:schemeClr val="accent6">
-                    <a:lumMod val="50000"/>
-                  </a:schemeClr>
-                </a:solidFill>
-                <a:latin typeface="Arial"/>
-                <a:ea typeface="Arial"/>
-                <a:cs typeface="Arial"/>
-              </a:rPr>
-              <a:t>Dezaktywacja:</a:t>
-            </a:r>
-            <a:endParaRPr sz="2800"/>
-          </a:p>
-          <a:p>
-            <a:pPr marL="457200" lvl="1" indent="0">
-              <a:buFont typeface="Arial"/>
-              <a:buNone/>
-              <a:defRPr/>
-            </a:pPr>
-            <a:r>
-              <a:rPr lang="pl-PL" sz="2800" b="0" i="0" u="none" strike="noStrike" cap="none" spc="0">
-                <a:solidFill>
-                  <a:schemeClr val="accent6">
-                    <a:lumMod val="50000"/>
-                  </a:schemeClr>
-                </a:solidFill>
-                <a:latin typeface="Nimbus Mono PS"/>
-                <a:ea typeface="Nimbus Mono PS"/>
-                <a:cs typeface="Nimbus Mono PS"/>
-              </a:rPr>
-              <a:t>deactivate</a:t>
-            </a:r>
-            <a:endParaRPr/>
-          </a:p>
-          <a:p>
-            <a:pPr marL="457200" lvl="1" indent="0">
-              <a:buFont typeface="Arial"/>
-              <a:buNone/>
-              <a:defRPr/>
-            </a:pPr>
-            <a:endParaRPr sz="2800" b="0" i="0" u="none" strike="noStrike" cap="none" spc="0">
-              <a:solidFill>
-                <a:schemeClr val="accent6">
-                  <a:lumMod val="50000"/>
-                </a:schemeClr>
-              </a:solidFill>
-              <a:latin typeface="Times New Roman"/>
-              <a:cs typeface="Times New Roman"/>
-            </a:endParaRPr>
-          </a:p>
-          <a:p>
-            <a:pPr>
-              <a:defRPr/>
-            </a:pPr>
-            <a:r>
-              <a:rPr lang="pl-PL" sz="2800" b="0" i="0" u="none" strike="noStrike" cap="none" spc="0">
-                <a:solidFill>
-                  <a:schemeClr val="accent6">
-                    <a:lumMod val="50000"/>
-                  </a:schemeClr>
-                </a:solidFill>
-                <a:latin typeface="Arial"/>
-                <a:ea typeface="Arial"/>
-                <a:cs typeface="Arial"/>
-              </a:rPr>
-              <a:t>Zadanie: Przygotuj </a:t>
-            </a:r>
-            <a:r>
-              <a:rPr lang="pl-PL" sz="2800" b="0" i="0" u="none" strike="noStrike" cap="none" spc="0">
-                <a:solidFill>
-                  <a:schemeClr val="accent6">
-                    <a:lumMod val="50000"/>
-                  </a:schemeClr>
-                </a:solidFill>
-                <a:latin typeface="+mn-lt"/>
-                <a:ea typeface="+mn-ea"/>
-                <a:cs typeface="+mn-cs"/>
-              </a:rPr>
-              <a:t>środowisko wirtualne i zainstaluj bibliotekę </a:t>
-            </a:r>
-            <a:r>
-              <a:rPr lang="pl-PL" sz="2800" b="1" i="0" u="none" strike="noStrike" cap="none" spc="0">
-                <a:solidFill>
-                  <a:schemeClr val="accent6">
-                    <a:lumMod val="50000"/>
-                  </a:schemeClr>
-                </a:solidFill>
-                <a:latin typeface="Arial"/>
-                <a:ea typeface="Arial"/>
-                <a:cs typeface="Arial"/>
-              </a:rPr>
-              <a:t>bottle</a:t>
-            </a:r>
-            <a:endParaRPr sz="2800" b="0"/>
-          </a:p>
-          <a:p>
-            <a:pPr marL="457200" lvl="1" indent="0">
-              <a:buFont typeface="Arial"/>
-              <a:buNone/>
-              <a:defRPr/>
-            </a:pPr>
-            <a:endParaRPr sz="2800" b="0" i="0" u="none" strike="noStrike" cap="none" spc="0">
-              <a:solidFill>
-                <a:schemeClr val="accent6">
-                  <a:lumMod val="50000"/>
-                </a:schemeClr>
-              </a:solidFill>
-              <a:latin typeface="Times New Roman"/>
-              <a:cs typeface="Times New Roman"/>
-            </a:endParaRPr>
-          </a:p>
-          <a:p>
-            <a:pPr marL="457200" lvl="1" indent="0">
-              <a:buFont typeface="Arial"/>
-              <a:buNone/>
-              <a:defRPr/>
-            </a:pPr>
+              <a:t>Nie</a:t>
+            </a:r>
             <a:endParaRPr>
-              <a:latin typeface="Nimbus Mono PS"/>
-              <a:ea typeface="Nimbus Mono PS"/>
-              <a:cs typeface="Nimbus Mono PS"/>
+              <a:latin typeface="Z003"/>
+              <a:cs typeface="Z003"/>
             </a:endParaRPr>
           </a:p>
         </p:txBody>
@@ -14415,7 +14194,7 @@
       </p:grpSpPr>
       <p:sp>
         <p:nvSpPr>
-          <p:cNvPr id="1598429091" name="Заголовок 1"/>
+          <p:cNvPr id="803372487" name="Заголовок 1"/>
           <p:cNvSpPr>
             <a:spLocks noGrp="1"/>
           </p:cNvSpPr>
@@ -14425,25 +14204,23 @@
         </p:nvSpPr>
         <p:spPr bwMode="auto"/>
         <p:txBody>
-          <a:bodyPr vertOverflow="overflow" horzOverflow="overflow" vert="horz" wrap="square" lIns="91440" tIns="45720" rIns="91440" bIns="45720" numCol="1" spcCol="0" rtlCol="0" fromWordArt="0" anchor="ctr" anchorCtr="0" forceAA="0" upright="0" compatLnSpc="0">
-            <a:normAutofit fontScale="95000" lnSpcReduction="1000"/>
-          </a:bodyPr>
-          <a:lstStyle/>
-          <a:p>
-            <a:pPr>
-              <a:defRPr/>
-            </a:pPr>
-            <a:r>
-              <a:rPr/>
-              <a:t>Przygotowanie środowiska</a:t>
-            </a:r>
-            <a:endParaRPr/>
-          </a:p>
-        </p:txBody>
-      </p:sp>
-      <p:sp>
-        <p:nvSpPr>
-          <p:cNvPr id="2095708191" name="Объект 2"/>
+          <a:bodyPr/>
+          <a:lstStyle/>
+          <a:p>
+            <a:pPr>
+              <a:defRPr/>
+            </a:pPr>
+            <a:r>
+              <a:rPr/>
+              <a:t>Praca ze środowiskami wirtualnymi</a:t>
+            </a:r>
+            <a:endParaRPr/>
+          </a:p>
+        </p:txBody>
+      </p:sp>
+      <p:sp>
+        <p:nvSpPr>
+          <p:cNvPr id="407361843" name="Объект 2"/>
           <p:cNvSpPr>
             <a:spLocks noGrp="1"/>
           </p:cNvSpPr>
@@ -14461,22 +14238,18 @@
             </a:pPr>
             <a:r>
               <a:rPr/>
-              <a:t>Mając aktywne środowisko, możemy instalować w nim pakiety</a:t>
-            </a:r>
-            <a:endParaRPr/>
-          </a:p>
-          <a:p>
-            <a:pPr marL="0" indent="0">
+              <a:t>Utworzenie środowiska:</a:t>
+            </a:r>
+            <a:endParaRPr/>
+          </a:p>
+          <a:p>
+            <a:pPr marL="457200" lvl="1" indent="0">
               <a:buFont typeface="Arial"/>
               <a:buNone/>
               <a:defRPr/>
             </a:pPr>
             <a:r>
-              <a:rPr/>
-              <a:t>	</a:t>
-            </a:r>
-            <a:r>
-              <a:rPr lang="pl-PL" sz="3200" b="0" i="0" u="none" strike="noStrike" cap="none" spc="0">
+              <a:rPr lang="pl-PL" sz="2800" b="0" i="0" u="none" strike="noStrike" cap="none" spc="0">
                 <a:solidFill>
                   <a:schemeClr val="accent6">
                     <a:lumMod val="50000"/>
@@ -14486,10 +14259,10 @@
                 <a:ea typeface="Nimbus Mono PS"/>
                 <a:cs typeface="Nimbus Mono PS"/>
               </a:rPr>
-              <a:t>python </a:t>
-            </a:r>
-            <a:r>
-              <a:rPr lang="pl-PL" sz="3200" b="0" i="0" u="none" strike="noStrike" cap="none" spc="0">
+              <a:t>python –m venv </a:t>
+            </a:r>
+            <a:r>
+              <a:rPr lang="pl-PL" sz="2800" b="0" i="0" u="none" strike="noStrike" cap="none" spc="0">
                 <a:solidFill>
                   <a:schemeClr val="accent6">
                     <a:lumMod val="50000"/>
@@ -14499,10 +14272,32 @@
                 <a:ea typeface="Nimbus Mono PS"/>
                 <a:cs typeface="Nimbus Mono PS"/>
               </a:rPr>
-              <a:t>–m</a:t>
-            </a:r>
-            <a:r>
-              <a:rPr lang="pl-PL" sz="3200" b="0" i="0" u="none" strike="noStrike" cap="none" spc="0">
+              <a:t>/path/to/venv</a:t>
+            </a:r>
+            <a:endParaRPr sz="2800">
+              <a:latin typeface="Nimbus Mono PS"/>
+              <a:ea typeface="Nimbus Mono PS"/>
+              <a:cs typeface="Nimbus Mono PS"/>
+            </a:endParaRPr>
+          </a:p>
+          <a:p>
+            <a:pPr>
+              <a:defRPr/>
+            </a:pPr>
+            <a:r>
+              <a:rPr/>
+              <a:t>Pomoc:</a:t>
+            </a:r>
+            <a:endParaRPr/>
+          </a:p>
+          <a:p>
+            <a:pPr marL="457200" lvl="1" indent="0">
+              <a:buFont typeface="Arial"/>
+              <a:buNone/>
+              <a:defRPr/>
+            </a:pPr>
+            <a:r>
+              <a:rPr lang="pl-PL" sz="2800" b="0" i="0" u="none" strike="noStrike" cap="none" spc="0">
                 <a:solidFill>
                   <a:schemeClr val="accent6">
                     <a:lumMod val="50000"/>
@@ -14512,35 +14307,147 @@
                 <a:ea typeface="Nimbus Mono PS"/>
                 <a:cs typeface="Nimbus Mono PS"/>
               </a:rPr>
-              <a:t> pip install ‘nazwa_pakietu’</a:t>
-            </a:r>
-            <a:endParaRPr/>
-          </a:p>
-          <a:p>
-            <a:pPr>
-              <a:defRPr/>
-            </a:pPr>
-            <a:r>
-              <a:rPr/>
-              <a:t>Pakiety zostaną zainstalowane tylko w tym środowisku</a:t>
-            </a:r>
-            <a:endParaRPr/>
-          </a:p>
-          <a:p>
-            <a:pPr>
-              <a:defRPr/>
-            </a:pPr>
-            <a:r>
-              <a:rPr/>
-              <a:t>Zadanie: Sprawdzić czy dostępne są pakiety systemowe?</a:t>
-            </a:r>
-            <a:endParaRPr/>
-          </a:p>
-          <a:p>
-            <a:pPr>
-              <a:defRPr/>
-            </a:pPr>
-            <a:endParaRPr/>
+              <a:t>python –h venv</a:t>
+            </a:r>
+            <a:endParaRPr/>
+          </a:p>
+          <a:p>
+            <a:pPr>
+              <a:defRPr/>
+            </a:pPr>
+            <a:r>
+              <a:rPr/>
+              <a:t>Aktywacja:</a:t>
+            </a:r>
+            <a:endParaRPr/>
+          </a:p>
+          <a:p>
+            <a:pPr marL="457200" lvl="1" indent="0">
+              <a:buFont typeface="Arial"/>
+              <a:buNone/>
+              <a:defRPr/>
+            </a:pPr>
+            <a:r>
+              <a:rPr lang="pl-PL" sz="2800" b="0" i="0" u="none" strike="noStrike" cap="none" spc="0">
+                <a:solidFill>
+                  <a:schemeClr val="accent6">
+                    <a:lumMod val="50000"/>
+                  </a:schemeClr>
+                </a:solidFill>
+                <a:latin typeface="Nimbus Mono PS"/>
+                <a:ea typeface="Nimbus Mono PS"/>
+                <a:cs typeface="Nimbus Mono PS"/>
+              </a:rPr>
+              <a:t>source </a:t>
+            </a:r>
+            <a:r>
+              <a:rPr lang="pl-PL" sz="2800" b="0" i="0" u="none" strike="noStrike" cap="none" spc="0">
+                <a:solidFill>
+                  <a:schemeClr val="accent6">
+                    <a:lumMod val="50000"/>
+                  </a:schemeClr>
+                </a:solidFill>
+                <a:latin typeface="Nimbus Mono PS"/>
+                <a:ea typeface="Nimbus Mono PS"/>
+                <a:cs typeface="Nimbus Mono PS"/>
+              </a:rPr>
+              <a:t>path/to/venv</a:t>
+            </a:r>
+            <a:r>
+              <a:rPr lang="pl-PL" sz="2800" b="0" i="0" u="none" strike="noStrike" cap="none" spc="0">
+                <a:solidFill>
+                  <a:schemeClr val="accent6">
+                    <a:lumMod val="50000"/>
+                  </a:schemeClr>
+                </a:solidFill>
+                <a:latin typeface="Nimbus Mono PS"/>
+                <a:ea typeface="Nimbus Mono PS"/>
+                <a:cs typeface="Nimbus Mono PS"/>
+              </a:rPr>
+              <a:t>/bin/</a:t>
+            </a:r>
+            <a:r>
+              <a:rPr lang="pl-PL" sz="2800" b="0" i="0" u="none" strike="noStrike" cap="none" spc="0">
+                <a:solidFill>
+                  <a:schemeClr val="accent6">
+                    <a:lumMod val="50000"/>
+                  </a:schemeClr>
+                </a:solidFill>
+                <a:latin typeface="Nimbus Mono PS"/>
+                <a:ea typeface="Nimbus Mono PS"/>
+                <a:cs typeface="Nimbus Mono PS"/>
+              </a:rPr>
+              <a:t>activate</a:t>
+            </a:r>
+            <a:endParaRPr lang="pl-PL" sz="2800" b="0" i="0" u="none" strike="noStrike" cap="none" spc="0">
+              <a:solidFill>
+                <a:schemeClr val="accent6">
+                  <a:lumMod val="50000"/>
+                </a:schemeClr>
+              </a:solidFill>
+              <a:latin typeface="Times New Roman"/>
+              <a:cs typeface="Times New Roman"/>
+            </a:endParaRPr>
+          </a:p>
+          <a:p>
+            <a:pPr>
+              <a:defRPr/>
+            </a:pPr>
+            <a:r>
+              <a:rPr lang="pl-PL" sz="2800" b="0" i="0" u="none" strike="noStrike" cap="none" spc="0">
+                <a:solidFill>
+                  <a:schemeClr val="accent6">
+                    <a:lumMod val="50000"/>
+                  </a:schemeClr>
+                </a:solidFill>
+                <a:latin typeface="+mn-lt"/>
+                <a:ea typeface="+mn-ea"/>
+                <a:cs typeface="+mn-cs"/>
+              </a:rPr>
+              <a:t>Dezaktywacja:</a:t>
+            </a:r>
+            <a:endParaRPr sz="2800"/>
+          </a:p>
+          <a:p>
+            <a:pPr marL="457200" lvl="1" indent="0">
+              <a:buFont typeface="Arial"/>
+              <a:buNone/>
+              <a:defRPr/>
+            </a:pPr>
+            <a:r>
+              <a:rPr lang="pl-PL" sz="2800" b="0" i="0" u="none" strike="noStrike" cap="none" spc="0">
+                <a:solidFill>
+                  <a:schemeClr val="accent6">
+                    <a:lumMod val="50000"/>
+                  </a:schemeClr>
+                </a:solidFill>
+                <a:latin typeface="Nimbus Mono PS"/>
+                <a:ea typeface="Nimbus Mono PS"/>
+                <a:cs typeface="Nimbus Mono PS"/>
+              </a:rPr>
+              <a:t>deactivate</a:t>
+            </a:r>
+            <a:endParaRPr sz="2800" b="0" i="0" u="none" strike="noStrike" cap="none" spc="0">
+              <a:solidFill>
+                <a:schemeClr val="accent6">
+                  <a:lumMod val="50000"/>
+                </a:schemeClr>
+              </a:solidFill>
+              <a:latin typeface="Times New Roman"/>
+              <a:cs typeface="Times New Roman"/>
+            </a:endParaRPr>
+          </a:p>
+          <a:p>
+            <a:pPr marL="457200" lvl="1" indent="0">
+              <a:buFont typeface="Arial"/>
+              <a:buNone/>
+              <a:defRPr/>
+            </a:pPr>
+            <a:endParaRPr>
+              <a:latin typeface="Nimbus Mono PS"/>
+              <a:ea typeface="Nimbus Mono PS"/>
+              <a:cs typeface="Nimbus Mono PS"/>
+            </a:endParaRPr>
           </a:p>
         </p:txBody>
       </p:sp>
@@ -14579,7 +14486,7 @@
       </p:grpSpPr>
       <p:sp>
         <p:nvSpPr>
-          <p:cNvPr id="600439405" name="Заголовок 1"/>
+          <p:cNvPr id="287118708" name="Заголовок 1"/>
           <p:cNvSpPr>
             <a:spLocks noGrp="1"/>
           </p:cNvSpPr>
@@ -14589,8 +14496,34 @@
         </p:nvSpPr>
         <p:spPr bwMode="auto"/>
         <p:txBody>
-          <a:bodyPr vertOverflow="overflow" horzOverflow="overflow" vert="horz" wrap="square" lIns="91440" tIns="45720" rIns="91440" bIns="45720" numCol="1" spcCol="0" rtlCol="0" fromWordArt="0" anchor="ctr" anchorCtr="0" forceAA="0" upright="0" compatLnSpc="0">
-            <a:normAutofit fontScale="95000" lnSpcReduction="1000"/>
+          <a:bodyPr/>
+          <a:lstStyle/>
+          <a:p>
+            <a:pPr>
+              <a:defRPr/>
+            </a:pPr>
+            <a:r>
+              <a:rPr/>
+              <a:t>Praca ze środowiskami wirtualnymi</a:t>
+            </a:r>
+            <a:endParaRPr/>
+          </a:p>
+        </p:txBody>
+      </p:sp>
+      <p:sp>
+        <p:nvSpPr>
+          <p:cNvPr id="1272238175" name="Объект 2"/>
+          <p:cNvSpPr>
+            <a:spLocks noGrp="1"/>
+          </p:cNvSpPr>
+          <p:nvPr>
+            <p:ph idx="1"/>
+          </p:nvPr>
+        </p:nvSpPr>
+        <p:spPr bwMode="auto"/>
+        <p:txBody>
+          <a:bodyPr vertOverflow="overflow" horzOverflow="overflow" vert="horz" wrap="square" lIns="91440" tIns="45720" rIns="91440" bIns="45720" numCol="1" spcCol="0" rtlCol="0" fromWordArt="0" anchor="t" anchorCtr="0" forceAA="0" upright="0" compatLnSpc="0">
+            <a:normAutofit fontScale="85000" lnSpcReduction="3000"/>
           </a:bodyPr>
           <a:lstStyle/>
           <a:p>
@@ -14599,78 +14532,7 @@
             </a:pPr>
             <a:r>
               <a:rPr/>
-              <a:t>Przygotowanie środowiska</a:t>
-            </a:r>
-            <a:endParaRPr/>
-          </a:p>
-        </p:txBody>
-      </p:sp>
-      <p:sp>
-        <p:nvSpPr>
-          <p:cNvPr id="1724201726" name="Объект 2"/>
-          <p:cNvSpPr>
-            <a:spLocks noGrp="1"/>
-          </p:cNvSpPr>
-          <p:nvPr>
-            <p:ph idx="1"/>
-          </p:nvPr>
-        </p:nvSpPr>
-        <p:spPr bwMode="auto"/>
-        <p:txBody>
-          <a:bodyPr/>
-          <a:lstStyle/>
-          <a:p>
-            <a:pPr>
-              <a:defRPr/>
-            </a:pPr>
-            <a:r>
-              <a:rPr/>
-              <a:t>Mając aktywne środowisko, możemy instalować w nim pakiety</a:t>
-            </a:r>
-            <a:endParaRPr/>
-          </a:p>
-          <a:p>
-            <a:pPr marL="0" indent="0">
-              <a:buFont typeface="Arial"/>
-              <a:buNone/>
-              <a:defRPr/>
-            </a:pPr>
-            <a:r>
-              <a:rPr/>
-              <a:t>	</a:t>
-            </a:r>
-            <a:r>
-              <a:rPr lang="pl-PL" sz="3200" b="0" i="0" u="none" strike="noStrike" cap="none" spc="0">
-                <a:solidFill>
-                  <a:schemeClr val="accent6">
-                    <a:lumMod val="50000"/>
-                  </a:schemeClr>
-                </a:solidFill>
-                <a:latin typeface="Nimbus Mono PS"/>
-                <a:ea typeface="Nimbus Mono PS"/>
-                <a:cs typeface="Nimbus Mono PS"/>
-              </a:rPr>
-              <a:t>python –m pip install ‘nazwa_pakietu’</a:t>
-            </a:r>
-            <a:endParaRPr/>
-          </a:p>
-          <a:p>
-            <a:pPr>
-              <a:defRPr/>
-            </a:pPr>
-            <a:r>
-              <a:rPr/>
-              <a:t>Pakiety zostaną zainstalowane tylko w tym środowisku</a:t>
-            </a:r>
-            <a:endParaRPr/>
-          </a:p>
-          <a:p>
-            <a:pPr>
-              <a:defRPr/>
-            </a:pPr>
-            <a:r>
-              <a:rPr/>
-              <a:t>Zadanie: Sprawdzić czy dostępne są pakiety systemowe?</a:t>
+              <a:t>Utworzenie środowiska:</a:t>
             </a:r>
             <a:endParaRPr/>
           </a:p>
@@ -14680,10 +14542,6 @@
               <a:buNone/>
               <a:defRPr/>
             </a:pPr>
-            <a:r>
-              <a:rPr/>
-              <a:t>	</a:t>
-            </a:r>
             <a:r>
               <a:rPr lang="pl-PL" sz="2800" b="0" i="0" u="none" strike="noStrike" cap="none" spc="0">
                 <a:solidFill>
@@ -14695,7 +14553,7 @@
                 <a:ea typeface="Nimbus Mono PS"/>
                 <a:cs typeface="Nimbus Mono PS"/>
               </a:rPr>
-              <a:t>–—</a:t>
+              <a:t>python –m venv </a:t>
             </a:r>
             <a:r>
               <a:rPr lang="pl-PL" sz="2800" b="0" i="0" u="none" strike="noStrike" cap="none" spc="0">
@@ -14708,9 +14566,251 @@
                 <a:ea typeface="Nimbus Mono PS"/>
                 <a:cs typeface="Nimbus Mono PS"/>
               </a:rPr>
-              <a:t>system-site-packages</a:t>
-            </a:r>
-            <a:endParaRPr/>
+              <a:t>/path/to/venv</a:t>
+            </a:r>
+            <a:endParaRPr sz="2800">
+              <a:latin typeface="Nimbus Mono PS"/>
+              <a:ea typeface="Nimbus Mono PS"/>
+              <a:cs typeface="Nimbus Mono PS"/>
+            </a:endParaRPr>
+          </a:p>
+          <a:p>
+            <a:pPr>
+              <a:defRPr/>
+            </a:pPr>
+            <a:r>
+              <a:rPr/>
+              <a:t>Pomoc:</a:t>
+            </a:r>
+            <a:endParaRPr/>
+          </a:p>
+          <a:p>
+            <a:pPr marL="457200" lvl="1" indent="0">
+              <a:buFont typeface="Arial"/>
+              <a:buNone/>
+              <a:defRPr/>
+            </a:pPr>
+            <a:r>
+              <a:rPr lang="pl-PL" sz="2800" b="0" i="0" u="none" strike="noStrike" cap="none" spc="0">
+                <a:solidFill>
+                  <a:schemeClr val="accent6">
+                    <a:lumMod val="50000"/>
+                  </a:schemeClr>
+                </a:solidFill>
+                <a:latin typeface="Nimbus Mono PS"/>
+                <a:ea typeface="Nimbus Mono PS"/>
+                <a:cs typeface="Nimbus Mono PS"/>
+              </a:rPr>
+              <a:t>python –h venv</a:t>
+            </a:r>
+            <a:endParaRPr/>
+          </a:p>
+          <a:p>
+            <a:pPr>
+              <a:defRPr/>
+            </a:pPr>
+            <a:r>
+              <a:rPr/>
+              <a:t>Aktywacja:</a:t>
+            </a:r>
+            <a:endParaRPr/>
+          </a:p>
+          <a:p>
+            <a:pPr marL="457200" lvl="1" indent="0">
+              <a:buFont typeface="Arial"/>
+              <a:buNone/>
+              <a:defRPr/>
+            </a:pPr>
+            <a:r>
+              <a:rPr lang="pl-PL" sz="2800" b="0" i="0" u="none" strike="noStrike" cap="none" spc="0">
+                <a:solidFill>
+                  <a:schemeClr val="accent6">
+                    <a:lumMod val="50000"/>
+                  </a:schemeClr>
+                </a:solidFill>
+                <a:latin typeface="Nimbus Mono PS"/>
+                <a:ea typeface="Nimbus Mono PS"/>
+                <a:cs typeface="Nimbus Mono PS"/>
+              </a:rPr>
+              <a:t>source </a:t>
+            </a:r>
+            <a:r>
+              <a:rPr lang="pl-PL" sz="2800" b="0" i="0" u="none" strike="noStrike" cap="none" spc="0">
+                <a:solidFill>
+                  <a:schemeClr val="accent6">
+                    <a:lumMod val="50000"/>
+                  </a:schemeClr>
+                </a:solidFill>
+                <a:latin typeface="Nimbus Mono PS"/>
+                <a:ea typeface="Nimbus Mono PS"/>
+                <a:cs typeface="Nimbus Mono PS"/>
+              </a:rPr>
+              <a:t>path/to/venv</a:t>
+            </a:r>
+            <a:r>
+              <a:rPr lang="pl-PL" sz="2800" b="0" i="0" u="none" strike="noStrike" cap="none" spc="0">
+                <a:solidFill>
+                  <a:schemeClr val="accent6">
+                    <a:lumMod val="50000"/>
+                  </a:schemeClr>
+                </a:solidFill>
+                <a:latin typeface="Nimbus Mono PS"/>
+                <a:ea typeface="Nimbus Mono PS"/>
+                <a:cs typeface="Nimbus Mono PS"/>
+              </a:rPr>
+              <a:t>/bin/</a:t>
+            </a:r>
+            <a:r>
+              <a:rPr lang="pl-PL" sz="2800" b="0" i="0" u="none" strike="noStrike" cap="none" spc="0">
+                <a:solidFill>
+                  <a:schemeClr val="accent6">
+                    <a:lumMod val="50000"/>
+                  </a:schemeClr>
+                </a:solidFill>
+                <a:latin typeface="Nimbus Mono PS"/>
+                <a:ea typeface="Nimbus Mono PS"/>
+                <a:cs typeface="Nimbus Mono PS"/>
+              </a:rPr>
+              <a:t>activate</a:t>
+            </a:r>
+            <a:endParaRPr lang="pl-PL" sz="2800" b="0" i="0" u="none" strike="noStrike" cap="none" spc="0">
+              <a:solidFill>
+                <a:schemeClr val="accent6">
+                  <a:lumMod val="50000"/>
+                </a:schemeClr>
+              </a:solidFill>
+              <a:latin typeface="Times New Roman"/>
+              <a:cs typeface="Times New Roman"/>
+            </a:endParaRPr>
+          </a:p>
+          <a:p>
+            <a:pPr>
+              <a:defRPr/>
+            </a:pPr>
+            <a:r>
+              <a:rPr lang="pl-PL" sz="2800" b="0" i="0" u="none" strike="noStrike" cap="none" spc="0">
+                <a:solidFill>
+                  <a:schemeClr val="accent6">
+                    <a:lumMod val="50000"/>
+                  </a:schemeClr>
+                </a:solidFill>
+                <a:latin typeface="Arial"/>
+                <a:ea typeface="Arial"/>
+                <a:cs typeface="Arial"/>
+              </a:rPr>
+              <a:t>Dezaktywacja:</a:t>
+            </a:r>
+            <a:endParaRPr sz="2800"/>
+          </a:p>
+          <a:p>
+            <a:pPr marL="457200" lvl="1" indent="0">
+              <a:buFont typeface="Arial"/>
+              <a:buNone/>
+              <a:defRPr/>
+            </a:pPr>
+            <a:r>
+              <a:rPr lang="pl-PL" sz="2800" b="0" i="0" u="none" strike="noStrike" cap="none" spc="0">
+                <a:solidFill>
+                  <a:schemeClr val="accent6">
+                    <a:lumMod val="50000"/>
+                  </a:schemeClr>
+                </a:solidFill>
+                <a:latin typeface="Nimbus Mono PS"/>
+                <a:ea typeface="Nimbus Mono PS"/>
+                <a:cs typeface="Nimbus Mono PS"/>
+              </a:rPr>
+              <a:t>deactivate</a:t>
+            </a:r>
+            <a:endParaRPr/>
+          </a:p>
+          <a:p>
+            <a:pPr marL="457200" lvl="1" indent="0">
+              <a:buFont typeface="Arial"/>
+              <a:buNone/>
+              <a:defRPr/>
+            </a:pPr>
+            <a:endParaRPr sz="2800" b="0" i="0" u="none" strike="noStrike" cap="none" spc="0">
+              <a:solidFill>
+                <a:schemeClr val="accent6">
+                  <a:lumMod val="50000"/>
+                </a:schemeClr>
+              </a:solidFill>
+              <a:latin typeface="Times New Roman"/>
+              <a:cs typeface="Times New Roman"/>
+            </a:endParaRPr>
+          </a:p>
+          <a:p>
+            <a:pPr>
+              <a:defRPr/>
+            </a:pPr>
+            <a:r>
+              <a:rPr lang="pl-PL" sz="2800" b="0" i="0" u="none" strike="noStrike" cap="none" spc="0">
+                <a:solidFill>
+                  <a:schemeClr val="accent6">
+                    <a:lumMod val="50000"/>
+                  </a:schemeClr>
+                </a:solidFill>
+                <a:latin typeface="Arial"/>
+                <a:ea typeface="Arial"/>
+                <a:cs typeface="Arial"/>
+              </a:rPr>
+              <a:t>Zadanie: Przygotuj </a:t>
+            </a:r>
+            <a:r>
+              <a:rPr lang="pl-PL" sz="2800" b="0" i="0" u="none" strike="noStrike" cap="none" spc="0">
+                <a:solidFill>
+                  <a:schemeClr val="accent6">
+                    <a:lumMod val="50000"/>
+                  </a:schemeClr>
+                </a:solidFill>
+                <a:latin typeface="+mn-lt"/>
+                <a:ea typeface="+mn-ea"/>
+                <a:cs typeface="+mn-cs"/>
+              </a:rPr>
+              <a:t>środowisko wirtualne i zainstaluj bibliotekę </a:t>
+            </a:r>
+            <a:r>
+              <a:rPr lang="pl-PL" sz="2800" b="1" i="0" u="none" strike="noStrike" cap="none" spc="0">
+                <a:solidFill>
+                  <a:schemeClr val="accent6">
+                    <a:lumMod val="50000"/>
+                  </a:schemeClr>
+                </a:solidFill>
+                <a:latin typeface="Arial"/>
+                <a:ea typeface="Arial"/>
+                <a:cs typeface="Arial"/>
+              </a:rPr>
+              <a:t>bottle</a:t>
+            </a:r>
+            <a:endParaRPr sz="2800" b="0"/>
+          </a:p>
+          <a:p>
+            <a:pPr marL="457200" lvl="1" indent="0">
+              <a:buFont typeface="Arial"/>
+              <a:buNone/>
+              <a:defRPr/>
+            </a:pPr>
+            <a:endParaRPr sz="2800" b="0" i="0" u="none" strike="noStrike" cap="none" spc="0">
+              <a:solidFill>
+                <a:schemeClr val="accent6">
+                  <a:lumMod val="50000"/>
+                </a:schemeClr>
+              </a:solidFill>
+              <a:latin typeface="Times New Roman"/>
+              <a:cs typeface="Times New Roman"/>
+            </a:endParaRPr>
+          </a:p>
+          <a:p>
+            <a:pPr marL="457200" lvl="1" indent="0">
+              <a:buFont typeface="Arial"/>
+              <a:buNone/>
+              <a:defRPr/>
+            </a:pPr>
+            <a:endParaRPr>
+              <a:latin typeface="Nimbus Mono PS"/>
+              <a:ea typeface="Nimbus Mono PS"/>
+              <a:cs typeface="Nimbus Mono PS"/>
+            </a:endParaRPr>
           </a:p>
         </p:txBody>
       </p:sp>
@@ -14749,7 +14849,7 @@
       </p:grpSpPr>
       <p:sp>
         <p:nvSpPr>
-          <p:cNvPr id="124071451" name="Заголовок 1"/>
+          <p:cNvPr id="1598429091" name="Заголовок 1"/>
           <p:cNvSpPr>
             <a:spLocks noGrp="1"/>
           </p:cNvSpPr>
@@ -14760,7 +14860,7 @@
         <p:spPr bwMode="auto"/>
         <p:txBody>
           <a:bodyPr vertOverflow="overflow" horzOverflow="overflow" vert="horz" wrap="square" lIns="91440" tIns="45720" rIns="91440" bIns="45720" numCol="1" spcCol="0" rtlCol="0" fromWordArt="0" anchor="ctr" anchorCtr="0" forceAA="0" upright="0" compatLnSpc="0">
-            <a:normAutofit fontScale="90000" lnSpcReduction="2000"/>
+            <a:normAutofit fontScale="95000" lnSpcReduction="1000"/>
           </a:bodyPr>
           <a:lstStyle/>
           <a:p>
@@ -14768,19 +14868,113 @@
               <a:defRPr/>
             </a:pPr>
             <a:r>
-              <a:rPr lang="pl-PL" sz="4400" b="1" i="0" u="none" strike="noStrike" cap="none" spc="0">
+              <a:rPr/>
+              <a:t>Przygotowanie środowiska</a:t>
+            </a:r>
+            <a:endParaRPr/>
+          </a:p>
+        </p:txBody>
+      </p:sp>
+      <p:sp>
+        <p:nvSpPr>
+          <p:cNvPr id="2095708191" name="Объект 2"/>
+          <p:cNvSpPr>
+            <a:spLocks noGrp="1"/>
+          </p:cNvSpPr>
+          <p:nvPr>
+            <p:ph idx="1"/>
+          </p:nvPr>
+        </p:nvSpPr>
+        <p:spPr bwMode="auto"/>
+        <p:txBody>
+          <a:bodyPr/>
+          <a:lstStyle/>
+          <a:p>
+            <a:pPr>
+              <a:defRPr/>
+            </a:pPr>
+            <a:r>
+              <a:rPr/>
+              <a:t>Mając aktywne środowisko, możemy instalować w nim pakiety</a:t>
+            </a:r>
+            <a:endParaRPr/>
+          </a:p>
+          <a:p>
+            <a:pPr marL="0" indent="0">
+              <a:buFont typeface="Arial"/>
+              <a:buNone/>
+              <a:defRPr/>
+            </a:pPr>
+            <a:r>
+              <a:rPr/>
+              <a:t>	</a:t>
+            </a:r>
+            <a:r>
+              <a:rPr lang="pl-PL" sz="3200" b="0" i="0" u="none" strike="noStrike" cap="none" spc="0">
                 <a:solidFill>
                   <a:schemeClr val="accent6">
                     <a:lumMod val="50000"/>
                   </a:schemeClr>
                 </a:solidFill>
-                <a:latin typeface="+mj-lt"/>
-                <a:ea typeface="+mj-ea"/>
-                <a:cs typeface="Arial"/>
+                <a:latin typeface="Nimbus Mono PS"/>
+                <a:ea typeface="Nimbus Mono PS"/>
+                <a:cs typeface="Nimbus Mono PS"/>
               </a:rPr>
-              <a:t>Czy musimy wszystko instalować ręcznie?</a:t>
-            </a:r>
-            <a:endParaRPr sz="4400"/>
+              <a:t>python </a:t>
+            </a:r>
+            <a:r>
+              <a:rPr lang="pl-PL" sz="3200" b="0" i="0" u="none" strike="noStrike" cap="none" spc="0">
+                <a:solidFill>
+                  <a:schemeClr val="accent6">
+                    <a:lumMod val="50000"/>
+                  </a:schemeClr>
+                </a:solidFill>
+                <a:latin typeface="Nimbus Mono PS"/>
+                <a:ea typeface="Nimbus Mono PS"/>
+                <a:cs typeface="Nimbus Mono PS"/>
+              </a:rPr>
+              <a:t>–m</a:t>
+            </a:r>
+            <a:r>
+              <a:rPr lang="pl-PL" sz="3200" b="0" i="0" u="none" strike="noStrike" cap="none" spc="0">
+                <a:solidFill>
+                  <a:schemeClr val="accent6">
+                    <a:lumMod val="50000"/>
+                  </a:schemeClr>
+                </a:solidFill>
+                <a:latin typeface="Nimbus Mono PS"/>
+                <a:ea typeface="Nimbus Mono PS"/>
+                <a:cs typeface="Nimbus Mono PS"/>
+              </a:rPr>
+              <a:t> pip install ‘nazwa_pakietu’</a:t>
+            </a:r>
+            <a:endParaRPr/>
+          </a:p>
+          <a:p>
+            <a:pPr>
+              <a:defRPr/>
+            </a:pPr>
+            <a:r>
+              <a:rPr/>
+              <a:t>Pakiety zostaną zainstalowane tylko w tym środowisku</a:t>
+            </a:r>
+            <a:endParaRPr/>
+          </a:p>
+          <a:p>
+            <a:pPr>
+              <a:defRPr/>
+            </a:pPr>
+            <a:r>
+              <a:rPr/>
+              <a:t>Zadanie: Sprawdzić czy dostępne są pakiety systemowe?</a:t>
+            </a:r>
+            <a:endParaRPr/>
+          </a:p>
+          <a:p>
+            <a:pPr>
+              <a:defRPr/>
+            </a:pPr>
+            <a:endParaRPr/>
           </a:p>
         </p:txBody>
       </p:sp>
@@ -14819,7 +15013,7 @@
       </p:grpSpPr>
       <p:sp>
         <p:nvSpPr>
-          <p:cNvPr id="1293867124" name="Заголовок 1"/>
+          <p:cNvPr id="600439405" name="Заголовок 1"/>
           <p:cNvSpPr>
             <a:spLocks noGrp="1"/>
           </p:cNvSpPr>
@@ -14830,7 +15024,7 @@
         <p:spPr bwMode="auto"/>
         <p:txBody>
           <a:bodyPr vertOverflow="overflow" horzOverflow="overflow" vert="horz" wrap="square" lIns="91440" tIns="45720" rIns="91440" bIns="45720" numCol="1" spcCol="0" rtlCol="0" fromWordArt="0" anchor="ctr" anchorCtr="0" forceAA="0" upright="0" compatLnSpc="0">
-            <a:normAutofit fontScale="90000" lnSpcReduction="2000"/>
+            <a:normAutofit fontScale="95000" lnSpcReduction="1000"/>
           </a:bodyPr>
           <a:lstStyle/>
           <a:p>
@@ -14838,74 +15032,81 @@
               <a:defRPr/>
             </a:pPr>
             <a:r>
-              <a:rPr lang="pl-PL" sz="4400" b="1" i="0" u="none" strike="noStrike" cap="none" spc="0">
+              <a:rPr/>
+              <a:t>Przygotowanie środowiska</a:t>
+            </a:r>
+            <a:endParaRPr/>
+          </a:p>
+        </p:txBody>
+      </p:sp>
+      <p:sp>
+        <p:nvSpPr>
+          <p:cNvPr id="1724201726" name="Объект 2"/>
+          <p:cNvSpPr>
+            <a:spLocks noGrp="1"/>
+          </p:cNvSpPr>
+          <p:nvPr>
+            <p:ph idx="1"/>
+          </p:nvPr>
+        </p:nvSpPr>
+        <p:spPr bwMode="auto"/>
+        <p:txBody>
+          <a:bodyPr/>
+          <a:lstStyle/>
+          <a:p>
+            <a:pPr>
+              <a:defRPr/>
+            </a:pPr>
+            <a:r>
+              <a:rPr/>
+              <a:t>Mając aktywne środowisko, możemy instalować w nim pakiety</a:t>
+            </a:r>
+            <a:endParaRPr/>
+          </a:p>
+          <a:p>
+            <a:pPr marL="0" indent="0">
+              <a:buFont typeface="Arial"/>
+              <a:buNone/>
+              <a:defRPr/>
+            </a:pPr>
+            <a:r>
+              <a:rPr/>
+              <a:t>	</a:t>
+            </a:r>
+            <a:r>
+              <a:rPr lang="pl-PL" sz="3200" b="0" i="0" u="none" strike="noStrike" cap="none" spc="0">
                 <a:solidFill>
                   <a:schemeClr val="accent6">
                     <a:lumMod val="50000"/>
                   </a:schemeClr>
                 </a:solidFill>
-                <a:latin typeface="Arial"/>
-                <a:ea typeface="Arial"/>
-                <a:cs typeface="Arial"/>
-              </a:rPr>
-              <a:t>Czy musimy wszystko instalować ręcznie?</a:t>
-            </a:r>
-            <a:endParaRPr sz="4400"/>
-          </a:p>
-        </p:txBody>
-      </p:sp>
-      <p:sp>
-        <p:nvSpPr>
-          <p:cNvPr id="1838424619" name="Объект 2"/>
-          <p:cNvSpPr>
-            <a:spLocks noGrp="1"/>
-          </p:cNvSpPr>
-          <p:nvPr>
-            <p:ph idx="1"/>
-          </p:nvPr>
-        </p:nvSpPr>
-        <p:spPr bwMode="auto"/>
-        <p:txBody>
-          <a:bodyPr/>
-          <a:lstStyle/>
-          <a:p>
-            <a:pPr>
-              <a:defRPr/>
-            </a:pPr>
-            <a:r>
-              <a:rPr sz="3200"/>
-              <a:t>Plik z wymaganiami:</a:t>
-            </a:r>
-            <a:endParaRPr sz="3200"/>
-          </a:p>
-          <a:p>
-            <a:pPr marL="457200" lvl="1" indent="0">
-              <a:buFont typeface="Arial"/>
-              <a:buNone/>
-              <a:defRPr/>
-            </a:pPr>
-            <a:r>
-              <a:rPr sz="2800">
                 <a:latin typeface="Nimbus Mono PS"/>
                 <a:ea typeface="Nimbus Mono PS"/>
                 <a:cs typeface="Nimbus Mono PS"/>
               </a:rPr>
-              <a:t>python –m pip freeze &gt;requirements.txt</a:t>
-            </a:r>
-            <a:endParaRPr sz="3200">
-              <a:latin typeface="Nimbus Mono PS"/>
-              <a:cs typeface="Nimbus Mono PS"/>
-            </a:endParaRPr>
-          </a:p>
-          <a:p>
-            <a:pPr>
-              <a:defRPr/>
-            </a:pPr>
-            <a:r>
-              <a:rPr sz="3200"/>
-              <a:t>Instalacja z pliku z wymaganiami:</a:t>
-            </a:r>
-            <a:endParaRPr sz="3200"/>
+              <a:t>python –m pip install ‘nazwa_pakietu’</a:t>
+            </a:r>
+            <a:endParaRPr/>
+          </a:p>
+          <a:p>
+            <a:pPr>
+              <a:defRPr/>
+            </a:pPr>
+            <a:r>
+              <a:rPr/>
+              <a:t>Pakiety zostaną zainstalowane tylko w tym środowisku</a:t>
+            </a:r>
+            <a:endParaRPr/>
+          </a:p>
+          <a:p>
+            <a:pPr>
+              <a:defRPr/>
+            </a:pPr>
+            <a:r>
+              <a:rPr/>
+              <a:t>Zadanie: Sprawdzić czy dostępne są pakiety systemowe?</a:t>
+            </a:r>
+            <a:endParaRPr/>
           </a:p>
           <a:p>
             <a:pPr marL="457200" lvl="1" indent="0">
@@ -14914,34 +15115,36 @@
               <a:defRPr/>
             </a:pPr>
             <a:r>
-              <a:rPr sz="2800">
+              <a:rPr/>
+              <a:t>	</a:t>
+            </a:r>
+            <a:r>
+              <a:rPr lang="pl-PL" sz="2800" b="0" i="0" u="none" strike="noStrike" cap="none" spc="0">
+                <a:solidFill>
+                  <a:schemeClr val="accent6">
+                    <a:lumMod val="50000"/>
+                  </a:schemeClr>
+                </a:solidFill>
                 <a:latin typeface="Nimbus Mono PS"/>
                 <a:ea typeface="Nimbus Mono PS"/>
                 <a:cs typeface="Nimbus Mono PS"/>
               </a:rPr>
-              <a:t>Python –m pip install –r requirements.txt</a:t>
-            </a:r>
-            <a:endParaRPr sz="2800">
-              <a:latin typeface="Nimbus Mono PS"/>
-              <a:ea typeface="Nimbus Mono PS"/>
-              <a:cs typeface="Nimbus Mono PS"/>
-            </a:endParaRPr>
-          </a:p>
-          <a:p>
-            <a:pPr>
-              <a:defRPr/>
-            </a:pPr>
-            <a:endParaRPr sz="3200"/>
-          </a:p>
-          <a:p>
-            <a:pPr>
-              <a:defRPr/>
-            </a:pPr>
-            <a:r>
-              <a:rPr sz="3200"/>
-              <a:t>Nie należy zapominać o uprzednim uruchomieniu środowiska wirtualnego!</a:t>
-            </a:r>
-            <a:endParaRPr sz="3200"/>
+              <a:t>–—</a:t>
+            </a:r>
+            <a:r>
+              <a:rPr lang="pl-PL" sz="2800" b="0" i="0" u="none" strike="noStrike" cap="none" spc="0">
+                <a:solidFill>
+                  <a:schemeClr val="accent6">
+                    <a:lumMod val="50000"/>
+                  </a:schemeClr>
+                </a:solidFill>
+                <a:latin typeface="Nimbus Mono PS"/>
+                <a:ea typeface="Nimbus Mono PS"/>
+                <a:cs typeface="Nimbus Mono PS"/>
+              </a:rPr>
+              <a:t>system-site-packages</a:t>
+            </a:r>
+            <a:endParaRPr/>
           </a:p>
         </p:txBody>
       </p:sp>
@@ -14980,7 +15183,7 @@
       </p:grpSpPr>
       <p:sp>
         <p:nvSpPr>
-          <p:cNvPr id="428125877" name="Заголовок 1"/>
+          <p:cNvPr id="124071451" name="Заголовок 1"/>
           <p:cNvSpPr>
             <a:spLocks noGrp="1"/>
           </p:cNvSpPr>
@@ -14990,40 +15193,86 @@
         </p:nvSpPr>
         <p:spPr bwMode="auto"/>
         <p:txBody>
-          <a:bodyPr/>
-          <a:lstStyle/>
-          <a:p>
-            <a:pPr>
-              <a:defRPr/>
-            </a:pPr>
-            <a:r>
-              <a:rPr/>
-              <a:t>Żródła</a:t>
-            </a:r>
-            <a:endParaRPr/>
-          </a:p>
-        </p:txBody>
-      </p:sp>
-      <p:sp>
-        <p:nvSpPr>
-          <p:cNvPr id="1412043632" name="Объект 2"/>
-          <p:cNvSpPr>
-            <a:spLocks noGrp="1"/>
-          </p:cNvSpPr>
-          <p:nvPr>
-            <p:ph idx="1"/>
-          </p:nvPr>
-        </p:nvSpPr>
-        <p:spPr bwMode="auto"/>
-        <p:txBody>
-          <a:bodyPr/>
-          <a:lstStyle/>
-          <a:p>
-            <a:pPr>
-              <a:defRPr/>
-            </a:pPr>
-            <a:r>
-              <a:rPr lang="en-US" sz="3200" b="0" i="0" u="none" strike="noStrike" cap="none" spc="0">
+          <a:bodyPr vertOverflow="overflow" horzOverflow="overflow" vert="horz" wrap="square" lIns="91440" tIns="45720" rIns="91440" bIns="45720" numCol="1" spcCol="0" rtlCol="0" fromWordArt="0" anchor="ctr" anchorCtr="0" forceAA="0" upright="0" compatLnSpc="0">
+            <a:normAutofit fontScale="90000" lnSpcReduction="2000"/>
+          </a:bodyPr>
+          <a:lstStyle/>
+          <a:p>
+            <a:pPr>
+              <a:defRPr/>
+            </a:pPr>
+            <a:r>
+              <a:rPr lang="pl-PL" sz="4400" b="1" i="0" u="none" strike="noStrike" cap="none" spc="0">
+                <a:solidFill>
+                  <a:schemeClr val="accent6">
+                    <a:lumMod val="50000"/>
+                  </a:schemeClr>
+                </a:solidFill>
+                <a:latin typeface="+mj-lt"/>
+                <a:ea typeface="+mj-ea"/>
+                <a:cs typeface="Arial"/>
+              </a:rPr>
+              <a:t>Czy musimy wszystko instalować ręcznie?</a:t>
+            </a:r>
+            <a:endParaRPr sz="4400"/>
+          </a:p>
+        </p:txBody>
+      </p:sp>
+    </p:spTree>
+  </p:cSld>
+  <p:clrMapOvr>
+    <a:masterClrMapping/>
+  </p:clrMapOvr>
+  <mc:AlternateContent xmlns:mc="http://schemas.openxmlformats.org/markup-compatibility/2006">
+    <mc:Choice xmlns:p159="http://schemas.microsoft.com/office/powerpoint/2015/09/main" xmlns:p14="http://schemas.microsoft.com/office/powerpoint/2010/main" Requires="p159">
+      <p:transition p14:dur="2000" advClick="1"/>
+    </mc:Choice>
+    <mc:Fallback>
+      <p:transition advClick="1"/>
+    </mc:Fallback>
+  </mc:AlternateContent>
+</p:sld>
+</file>
+
+<file path=ppt/slides/slide39.xml><?xml version="1.0" encoding="utf-8"?>
+<p:sld xmlns:a="http://schemas.openxmlformats.org/drawingml/2006/main" xmlns:r="http://schemas.openxmlformats.org/officeDocument/2006/relationships" xmlns:p="http://schemas.openxmlformats.org/presentationml/2006/main" xmlns:m="http://schemas.openxmlformats.org/officeDocument/2006/math" xmlns:w="http://schemas.openxmlformats.org/wordprocessingml/2006/main" showMasterPhAnim="0" show="1">
+  <p:cSld name="">
+    <p:spTree>
+      <p:nvGrpSpPr>
+        <p:cNvPr id="1" name=""/>
+        <p:cNvGrpSpPr/>
+        <p:nvPr/>
+      </p:nvGrpSpPr>
+      <p:grpSpPr bwMode="auto">
+        <a:xfrm>
+          <a:off x="0" y="0"/>
+          <a:ext cx="0" cy="0"/>
+          <a:chOff x="0" y="0"/>
+          <a:chExt cx="0" cy="0"/>
+        </a:xfrm>
+      </p:grpSpPr>
+      <p:sp>
+        <p:nvSpPr>
+          <p:cNvPr id="1293867124" name="Заголовок 1"/>
+          <p:cNvSpPr>
+            <a:spLocks noGrp="1"/>
+          </p:cNvSpPr>
+          <p:nvPr>
+            <p:ph type="title"/>
+          </p:nvPr>
+        </p:nvSpPr>
+        <p:spPr bwMode="auto"/>
+        <p:txBody>
+          <a:bodyPr vertOverflow="overflow" horzOverflow="overflow" vert="horz" wrap="square" lIns="91440" tIns="45720" rIns="91440" bIns="45720" numCol="1" spcCol="0" rtlCol="0" fromWordArt="0" anchor="ctr" anchorCtr="0" forceAA="0" upright="0" compatLnSpc="0">
+            <a:normAutofit fontScale="90000" lnSpcReduction="2000"/>
+          </a:bodyPr>
+          <a:lstStyle/>
+          <a:p>
+            <a:pPr>
+              <a:defRPr/>
+            </a:pPr>
+            <a:r>
+              <a:rPr lang="pl-PL" sz="4400" b="1" i="0" u="none" strike="noStrike" cap="none" spc="0">
                 <a:solidFill>
                   <a:schemeClr val="accent6">
                     <a:lumMod val="50000"/>
@@ -15033,97 +15282,100 @@
                 <a:ea typeface="Arial"/>
                 <a:cs typeface="Arial"/>
               </a:rPr>
-              <a:t>https://docs.python.org/3/</a:t>
-            </a:r>
-            <a:endParaRPr/>
-          </a:p>
-          <a:p>
-            <a:pPr>
-              <a:defRPr/>
-            </a:pPr>
-            <a:r>
-              <a:rPr lang="en-US" sz="3200" b="0" i="0" u="sng" strike="noStrike" cap="none" spc="0">
-                <a:solidFill>
-                  <a:schemeClr val="accent6">
-                    <a:lumMod val="50000"/>
-                  </a:schemeClr>
-                </a:solidFill>
-                <a:latin typeface="Arial"/>
-                <a:ea typeface="Arial"/>
-                <a:cs typeface="Arial"/>
-                <a:hlinkClick r:id="rId3" tooltip="https://totalbooksforu.blogspot.com/2013/07/c-basic-programming-c-programming.html"/>
+              <a:t>Czy musimy wszystko instalować ręcznie?</a:t>
+            </a:r>
+            <a:endParaRPr sz="4400"/>
+          </a:p>
+        </p:txBody>
+      </p:sp>
+      <p:sp>
+        <p:nvSpPr>
+          <p:cNvPr id="1838424619" name="Объект 2"/>
+          <p:cNvSpPr>
+            <a:spLocks noGrp="1"/>
+          </p:cNvSpPr>
+          <p:nvPr>
+            <p:ph idx="1"/>
+          </p:nvPr>
+        </p:nvSpPr>
+        <p:spPr bwMode="auto"/>
+        <p:txBody>
+          <a:bodyPr/>
+          <a:lstStyle/>
+          <a:p>
+            <a:pPr>
+              <a:defRPr/>
+            </a:pPr>
+            <a:r>
+              <a:rPr sz="3200"/>
+              <a:t>Plik z wymaganiami:</a:t>
+            </a:r>
+            <a:endParaRPr sz="3200"/>
+          </a:p>
+          <a:p>
+            <a:pPr marL="457200" lvl="1" indent="0">
+              <a:buFont typeface="Arial"/>
+              <a:buNone/>
+              <a:defRPr/>
+            </a:pPr>
+            <a:r>
+              <a:rPr sz="2800">
+                <a:latin typeface="Nimbus Mono PS"/>
+                <a:ea typeface="Nimbus Mono PS"/>
+                <a:cs typeface="Nimbus Mono PS"/>
               </a:rPr>
-              <a:t>https://totalbooksforu.blogspot.com/2013/07/c-basic-programming-c-programming.html</a:t>
-            </a:r>
-            <a:endParaRPr/>
-          </a:p>
-          <a:p>
-            <a:pPr>
-              <a:defRPr/>
-            </a:pPr>
-            <a:r>
-              <a:rPr lang="en-US" sz="3200" b="0" i="0" u="sng" strike="noStrike" cap="none" spc="0">
-                <a:solidFill>
-                  <a:schemeClr val="accent6">
-                    <a:lumMod val="50000"/>
-                  </a:schemeClr>
-                </a:solidFill>
-                <a:latin typeface="Arial"/>
-                <a:ea typeface="Arial"/>
-                <a:cs typeface="Arial"/>
-                <a:hlinkClick r:id="rId4" tooltip="https://tenthousandmeters.com/blog/python-behind-the-scenes-1-how-the-cpython-vm-works/"/>
+              <a:t>python –m pip freeze &gt;requirements.txt</a:t>
+            </a:r>
+            <a:endParaRPr sz="3200">
+              <a:latin typeface="Nimbus Mono PS"/>
+              <a:cs typeface="Nimbus Mono PS"/>
+            </a:endParaRPr>
+          </a:p>
+          <a:p>
+            <a:pPr>
+              <a:defRPr/>
+            </a:pPr>
+            <a:r>
+              <a:rPr sz="3200"/>
+              <a:t>Instalacja z pliku z wymaganiami:</a:t>
+            </a:r>
+            <a:endParaRPr sz="3200"/>
+          </a:p>
+          <a:p>
+            <a:pPr marL="457200" lvl="1" indent="0">
+              <a:buFont typeface="Arial"/>
+              <a:buNone/>
+              <a:defRPr/>
+            </a:pPr>
+            <a:r>
+              <a:rPr sz="2800">
+                <a:latin typeface="Nimbus Mono PS"/>
+                <a:ea typeface="Nimbus Mono PS"/>
+                <a:cs typeface="Nimbus Mono PS"/>
               </a:rPr>
-              <a:t>https://tenthousandmeters.com/blog/python-behind-the-scenes-1-how-the-cpython-vm-works/</a:t>
-            </a:r>
-            <a:endParaRPr/>
-          </a:p>
-          <a:p>
-            <a:pPr>
-              <a:defRPr/>
-            </a:pPr>
-            <a:r>
-              <a:rPr lang="en-US" sz="3200" b="0" i="0" u="sng" strike="noStrike" cap="none" spc="0">
-                <a:solidFill>
-                  <a:schemeClr val="accent6">
-                    <a:lumMod val="50000"/>
-                  </a:schemeClr>
-                </a:solidFill>
-                <a:latin typeface="Arial"/>
-                <a:ea typeface="Arial"/>
-                <a:cs typeface="Arial"/>
-                <a:hlinkClick r:id="rId5" tooltip="https://towardsdatascience.com/how-does-python-work-6f21fd197888"/>
-              </a:rPr>
-              <a:t>https://towardsdatascience.com/how-does-python-work-6f21fd197888</a:t>
-            </a:r>
-            <a:endParaRPr lang="en-US" sz="3200" b="0" i="0" u="none" strike="noStrike" cap="none" spc="0">
-              <a:solidFill>
-                <a:schemeClr val="accent6">
-                  <a:lumMod val="50000"/>
-                </a:schemeClr>
-              </a:solidFill>
-              <a:latin typeface="Arial"/>
-              <a:ea typeface="Arial"/>
-              <a:cs typeface="Arial"/>
+              <a:t>Python –m pip install –r requirements.txt</a:t>
+            </a:r>
+            <a:endParaRPr sz="2800">
+              <a:latin typeface="Nimbus Mono PS"/>
+              <a:ea typeface="Nimbus Mono PS"/>
+              <a:cs typeface="Nimbus Mono PS"/>
             </a:endParaRPr>
           </a:p>
           <a:p>
             <a:pPr>
               <a:defRPr/>
             </a:pPr>
-            <a:r>
-              <a:rPr lang="en-US" sz="3200" b="0" i="0" u="none" strike="noStrike" cap="none" spc="0">
-                <a:solidFill>
-                  <a:schemeClr val="accent6">
-                    <a:lumMod val="50000"/>
-                  </a:schemeClr>
-                </a:solidFill>
-                <a:latin typeface="Arial"/>
-                <a:ea typeface="Arial"/>
-                <a:cs typeface="Arial"/>
-              </a:rPr>
-              <a:t>https://realpython.com/</a:t>
-            </a:r>
-            <a:endParaRPr/>
+            <a:endParaRPr sz="3200"/>
+          </a:p>
+          <a:p>
+            <a:pPr>
+              <a:defRPr/>
+            </a:pPr>
+            <a:r>
+              <a:rPr sz="3200"/>
+              <a:t>Nie należy zapominać o uprzednim uruchomieniu środowiska wirtualnego!</a:t>
+            </a:r>
+            <a:endParaRPr sz="3200"/>
           </a:p>
         </p:txBody>
       </p:sp>
@@ -15361,6 +15613,188 @@
           </a:prstGeom>
         </p:spPr>
       </p:pic>
+    </p:spTree>
+  </p:cSld>
+  <p:clrMapOvr>
+    <a:masterClrMapping/>
+  </p:clrMapOvr>
+  <mc:AlternateContent xmlns:mc="http://schemas.openxmlformats.org/markup-compatibility/2006">
+    <mc:Choice xmlns:p159="http://schemas.microsoft.com/office/powerpoint/2015/09/main" xmlns:p14="http://schemas.microsoft.com/office/powerpoint/2010/main" Requires="p159">
+      <p:transition p14:dur="2000" advClick="1"/>
+    </mc:Choice>
+    <mc:Fallback>
+      <p:transition advClick="1"/>
+    </mc:Fallback>
+  </mc:AlternateContent>
+</p:sld>
+</file>
+
+<file path=ppt/slides/slide40.xml><?xml version="1.0" encoding="utf-8"?>
+<p:sld xmlns:a="http://schemas.openxmlformats.org/drawingml/2006/main" xmlns:r="http://schemas.openxmlformats.org/officeDocument/2006/relationships" xmlns:p="http://schemas.openxmlformats.org/presentationml/2006/main" xmlns:m="http://schemas.openxmlformats.org/officeDocument/2006/math" xmlns:w="http://schemas.openxmlformats.org/wordprocessingml/2006/main" showMasterPhAnim="0" show="1">
+  <p:cSld name="">
+    <p:spTree>
+      <p:nvGrpSpPr>
+        <p:cNvPr id="1" name=""/>
+        <p:cNvGrpSpPr/>
+        <p:nvPr/>
+      </p:nvGrpSpPr>
+      <p:grpSpPr bwMode="auto">
+        <a:xfrm>
+          <a:off x="0" y="0"/>
+          <a:ext cx="0" cy="0"/>
+          <a:chOff x="0" y="0"/>
+          <a:chExt cx="0" cy="0"/>
+        </a:xfrm>
+      </p:grpSpPr>
+      <p:sp>
+        <p:nvSpPr>
+          <p:cNvPr id="428125877" name="Заголовок 1"/>
+          <p:cNvSpPr>
+            <a:spLocks noGrp="1"/>
+          </p:cNvSpPr>
+          <p:nvPr>
+            <p:ph type="title"/>
+          </p:nvPr>
+        </p:nvSpPr>
+        <p:spPr bwMode="auto"/>
+        <p:txBody>
+          <a:bodyPr/>
+          <a:lstStyle/>
+          <a:p>
+            <a:pPr>
+              <a:defRPr/>
+            </a:pPr>
+            <a:r>
+              <a:rPr/>
+              <a:t>Żródła</a:t>
+            </a:r>
+            <a:endParaRPr/>
+          </a:p>
+        </p:txBody>
+      </p:sp>
+      <p:sp>
+        <p:nvSpPr>
+          <p:cNvPr id="1412043632" name="Объект 2"/>
+          <p:cNvSpPr>
+            <a:spLocks noGrp="1"/>
+          </p:cNvSpPr>
+          <p:nvPr>
+            <p:ph idx="1"/>
+          </p:nvPr>
+        </p:nvSpPr>
+        <p:spPr bwMode="auto"/>
+        <p:txBody>
+          <a:bodyPr/>
+          <a:lstStyle/>
+          <a:p>
+            <a:pPr>
+              <a:defRPr/>
+            </a:pPr>
+            <a:r>
+              <a:rPr lang="en-US" sz="3200" b="0" i="0" u="none" strike="noStrike" cap="none" spc="0">
+                <a:solidFill>
+                  <a:schemeClr val="accent6">
+                    <a:lumMod val="50000"/>
+                  </a:schemeClr>
+                </a:solidFill>
+                <a:latin typeface="Arial"/>
+                <a:ea typeface="Arial"/>
+                <a:cs typeface="Arial"/>
+              </a:rPr>
+              <a:t>https://docs.python.org/3/</a:t>
+            </a:r>
+            <a:endParaRPr/>
+          </a:p>
+          <a:p>
+            <a:pPr>
+              <a:defRPr/>
+            </a:pPr>
+            <a:r>
+              <a:rPr lang="en-US" sz="3200" b="0" i="0" u="sng" strike="noStrike" cap="none" spc="0">
+                <a:solidFill>
+                  <a:schemeClr val="accent6">
+                    <a:lumMod val="50000"/>
+                  </a:schemeClr>
+                </a:solidFill>
+                <a:latin typeface="Arial"/>
+                <a:ea typeface="Arial"/>
+                <a:cs typeface="Arial"/>
+                <a:hlinkClick r:id="rId3" tooltip="https://totalbooksforu.blogspot.com/2013/07/c-basic-programming-c-programming.html"/>
+              </a:rPr>
+              <a:t>https://totalbooksforu.blogspot.com/2013/07/c-basic-programming-c-programming.html</a:t>
+            </a:r>
+            <a:endParaRPr/>
+          </a:p>
+          <a:p>
+            <a:pPr>
+              <a:defRPr/>
+            </a:pPr>
+            <a:r>
+              <a:rPr lang="en-US" sz="3200" b="0" i="0" u="sng" strike="noStrike" cap="none" spc="0">
+                <a:solidFill>
+                  <a:schemeClr val="accent6">
+                    <a:lumMod val="50000"/>
+                  </a:schemeClr>
+                </a:solidFill>
+                <a:latin typeface="Arial"/>
+                <a:ea typeface="Arial"/>
+                <a:cs typeface="Arial"/>
+                <a:hlinkClick r:id="rId4" tooltip="https://tenthousandmeters.com/blog/python-behind-the-scenes-1-how-the-cpython-vm-works/"/>
+              </a:rPr>
+              <a:t>https://tenthousandmeters.com/blog/python-behind-the-scenes-1-how-the-cpython-vm-works/</a:t>
+            </a:r>
+            <a:endParaRPr/>
+          </a:p>
+          <a:p>
+            <a:pPr>
+              <a:defRPr/>
+            </a:pPr>
+            <a:r>
+              <a:rPr lang="en-US" sz="3200" b="0" i="0" u="sng" strike="noStrike" cap="none" spc="0">
+                <a:solidFill>
+                  <a:schemeClr val="accent6">
+                    <a:lumMod val="50000"/>
+                  </a:schemeClr>
+                </a:solidFill>
+                <a:latin typeface="Arial"/>
+                <a:ea typeface="Arial"/>
+                <a:cs typeface="Arial"/>
+                <a:hlinkClick r:id="rId5" tooltip="https://towardsdatascience.com/how-does-python-work-6f21fd197888"/>
+              </a:rPr>
+              <a:t>https://towardsdatascience.com/how-does-python-work-6f21fd197888</a:t>
+            </a:r>
+            <a:endParaRPr lang="en-US" sz="3200" b="0" i="0" u="none" strike="noStrike" cap="none" spc="0">
+              <a:solidFill>
+                <a:schemeClr val="accent6">
+                  <a:lumMod val="50000"/>
+                </a:schemeClr>
+              </a:solidFill>
+              <a:latin typeface="Arial"/>
+              <a:ea typeface="Arial"/>
+              <a:cs typeface="Arial"/>
+            </a:endParaRPr>
+          </a:p>
+          <a:p>
+            <a:pPr>
+              <a:defRPr/>
+            </a:pPr>
+            <a:r>
+              <a:rPr lang="en-US" sz="3200" b="0" i="0" u="none" strike="noStrike" cap="none" spc="0">
+                <a:solidFill>
+                  <a:schemeClr val="accent6">
+                    <a:lumMod val="50000"/>
+                  </a:schemeClr>
+                </a:solidFill>
+                <a:latin typeface="Arial"/>
+                <a:ea typeface="Arial"/>
+                <a:cs typeface="Arial"/>
+              </a:rPr>
+              <a:t>https://realpython.com/</a:t>
+            </a:r>
+            <a:endParaRPr/>
+          </a:p>
+        </p:txBody>
+      </p:sp>
     </p:spTree>
   </p:cSld>
   <p:clrMapOvr>

</xml_diff>